<commit_message>
03_background: added zmp lip imgs
</commit_message>
<xml_diff>
--- a/windows/masters_thesis_imgs.pptx
+++ b/windows/masters_thesis_imgs.pptx
@@ -276,7 +276,7 @@
           <a:p>
             <a:fld id="{E9193408-0E9E-4716-B232-5E8342DA9E48}" type="datetimeFigureOut">
               <a:rPr lang="en-GB" smtClean="0"/>
-              <a:t>22/05/2019</a:t>
+              <a:t>25/05/2019</a:t>
             </a:fld>
             <a:endParaRPr lang="en-GB"/>
           </a:p>
@@ -476,7 +476,7 @@
           <a:p>
             <a:fld id="{E9193408-0E9E-4716-B232-5E8342DA9E48}" type="datetimeFigureOut">
               <a:rPr lang="en-GB" smtClean="0"/>
-              <a:t>22/05/2019</a:t>
+              <a:t>25/05/2019</a:t>
             </a:fld>
             <a:endParaRPr lang="en-GB"/>
           </a:p>
@@ -686,7 +686,7 @@
           <a:p>
             <a:fld id="{E9193408-0E9E-4716-B232-5E8342DA9E48}" type="datetimeFigureOut">
               <a:rPr lang="en-GB" smtClean="0"/>
-              <a:t>22/05/2019</a:t>
+              <a:t>25/05/2019</a:t>
             </a:fld>
             <a:endParaRPr lang="en-GB"/>
           </a:p>
@@ -886,7 +886,7 @@
           <a:p>
             <a:fld id="{E9193408-0E9E-4716-B232-5E8342DA9E48}" type="datetimeFigureOut">
               <a:rPr lang="en-GB" smtClean="0"/>
-              <a:t>22/05/2019</a:t>
+              <a:t>25/05/2019</a:t>
             </a:fld>
             <a:endParaRPr lang="en-GB"/>
           </a:p>
@@ -1162,7 +1162,7 @@
           <a:p>
             <a:fld id="{E9193408-0E9E-4716-B232-5E8342DA9E48}" type="datetimeFigureOut">
               <a:rPr lang="en-GB" smtClean="0"/>
-              <a:t>22/05/2019</a:t>
+              <a:t>25/05/2019</a:t>
             </a:fld>
             <a:endParaRPr lang="en-GB"/>
           </a:p>
@@ -1430,7 +1430,7 @@
           <a:p>
             <a:fld id="{E9193408-0E9E-4716-B232-5E8342DA9E48}" type="datetimeFigureOut">
               <a:rPr lang="en-GB" smtClean="0"/>
-              <a:t>22/05/2019</a:t>
+              <a:t>25/05/2019</a:t>
             </a:fld>
             <a:endParaRPr lang="en-GB"/>
           </a:p>
@@ -1845,7 +1845,7 @@
           <a:p>
             <a:fld id="{E9193408-0E9E-4716-B232-5E8342DA9E48}" type="datetimeFigureOut">
               <a:rPr lang="en-GB" smtClean="0"/>
-              <a:t>22/05/2019</a:t>
+              <a:t>25/05/2019</a:t>
             </a:fld>
             <a:endParaRPr lang="en-GB"/>
           </a:p>
@@ -1987,7 +1987,7 @@
           <a:p>
             <a:fld id="{E9193408-0E9E-4716-B232-5E8342DA9E48}" type="datetimeFigureOut">
               <a:rPr lang="en-GB" smtClean="0"/>
-              <a:t>22/05/2019</a:t>
+              <a:t>25/05/2019</a:t>
             </a:fld>
             <a:endParaRPr lang="en-GB"/>
           </a:p>
@@ -2100,7 +2100,7 @@
           <a:p>
             <a:fld id="{E9193408-0E9E-4716-B232-5E8342DA9E48}" type="datetimeFigureOut">
               <a:rPr lang="en-GB" smtClean="0"/>
-              <a:t>22/05/2019</a:t>
+              <a:t>25/05/2019</a:t>
             </a:fld>
             <a:endParaRPr lang="en-GB"/>
           </a:p>
@@ -2413,7 +2413,7 @@
           <a:p>
             <a:fld id="{E9193408-0E9E-4716-B232-5E8342DA9E48}" type="datetimeFigureOut">
               <a:rPr lang="en-GB" smtClean="0"/>
-              <a:t>22/05/2019</a:t>
+              <a:t>25/05/2019</a:t>
             </a:fld>
             <a:endParaRPr lang="en-GB"/>
           </a:p>
@@ -2702,7 +2702,7 @@
           <a:p>
             <a:fld id="{E9193408-0E9E-4716-B232-5E8342DA9E48}" type="datetimeFigureOut">
               <a:rPr lang="en-GB" smtClean="0"/>
-              <a:t>22/05/2019</a:t>
+              <a:t>25/05/2019</a:t>
             </a:fld>
             <a:endParaRPr lang="en-GB"/>
           </a:p>
@@ -2945,7 +2945,7 @@
           <a:p>
             <a:fld id="{E9193408-0E9E-4716-B232-5E8342DA9E48}" type="datetimeFigureOut">
               <a:rPr lang="en-GB" smtClean="0"/>
-              <a:t>22/05/2019</a:t>
+              <a:t>25/05/2019</a:t>
             </a:fld>
             <a:endParaRPr lang="en-GB"/>
           </a:p>
@@ -8947,10 +8947,10 @@
       </p:sp>
       <p:grpSp>
         <p:nvGrpSpPr>
-          <p:cNvPr id="275" name="Gruppieren 274">
+          <p:cNvPr id="9" name="Gruppieren 8">
             <a:extLst>
               <a:ext uri="{FF2B5EF4-FFF2-40B4-BE49-F238E27FC236}">
-                <a16:creationId xmlns:a16="http://schemas.microsoft.com/office/drawing/2014/main" id="{9CBD866A-7172-4A13-9D52-81ED3A786740}"/>
+                <a16:creationId xmlns:a16="http://schemas.microsoft.com/office/drawing/2014/main" id="{DF428158-18C6-4E9F-9C46-7D22956FCB11}"/>
               </a:ext>
             </a:extLst>
           </p:cNvPr>
@@ -9051,12 +9051,12 @@
               </p:cNvPicPr>
               <p:nvPr>
                 <p:custDataLst>
-                  <p:tags r:id="rId16"/>
+                  <p:tags r:id="rId18"/>
                 </p:custDataLst>
               </p:nvPr>
             </p:nvPicPr>
             <p:blipFill>
-              <a:blip r:embed="rId19">
+              <a:blip r:embed="rId21">
                 <a:extLst>
                   <a:ext uri="{28A0092B-C50C-407E-A947-70E740481C1C}">
                     <a14:useLocalDpi xmlns:a14="http://schemas.microsoft.com/office/drawing/2010/main" val="0"/>
@@ -9091,12 +9091,12 @@
               </p:cNvPicPr>
               <p:nvPr>
                 <p:custDataLst>
-                  <p:tags r:id="rId17"/>
+                  <p:tags r:id="rId19"/>
                 </p:custDataLst>
               </p:nvPr>
             </p:nvPicPr>
             <p:blipFill>
-              <a:blip r:embed="rId20">
+              <a:blip r:embed="rId22">
                 <a:extLst>
                   <a:ext uri="{28A0092B-C50C-407E-A947-70E740481C1C}">
                     <a14:useLocalDpi xmlns:a14="http://schemas.microsoft.com/office/drawing/2010/main" val="0"/>
@@ -9494,12 +9494,12 @@
               </p:cNvPicPr>
               <p:nvPr>
                 <p:custDataLst>
-                  <p:tags r:id="rId15"/>
+                  <p:tags r:id="rId17"/>
                 </p:custDataLst>
               </p:nvPr>
             </p:nvPicPr>
             <p:blipFill>
-              <a:blip r:embed="rId21">
+              <a:blip r:embed="rId23">
                 <a:extLst>
                   <a:ext uri="{28A0092B-C50C-407E-A947-70E740481C1C}">
                     <a14:useLocalDpi xmlns:a14="http://schemas.microsoft.com/office/drawing/2010/main" val="0"/>
@@ -9536,7 +9536,7 @@
             <p:nvPr/>
           </p:nvPicPr>
           <p:blipFill rotWithShape="1">
-            <a:blip r:embed="rId22">
+            <a:blip r:embed="rId24">
               <a:extLst>
                 <a:ext uri="{28A0092B-C50C-407E-A947-70E740481C1C}">
                   <a14:useLocalDpi xmlns:a14="http://schemas.microsoft.com/office/drawing/2010/main" val="0"/>
@@ -9571,7 +9571,7 @@
             <p:nvPr/>
           </p:nvPicPr>
           <p:blipFill rotWithShape="1">
-            <a:blip r:embed="rId23">
+            <a:blip r:embed="rId25">
               <a:extLst>
                 <a:ext uri="{28A0092B-C50C-407E-A947-70E740481C1C}">
                   <a14:useLocalDpi xmlns:a14="http://schemas.microsoft.com/office/drawing/2010/main" val="0"/>
@@ -9702,7 +9702,7 @@
             </p:nvPr>
           </p:nvPicPr>
           <p:blipFill>
-            <a:blip r:embed="rId24">
+            <a:blip r:embed="rId26">
               <a:extLst>
                 <a:ext uri="{28A0092B-C50C-407E-A947-70E740481C1C}">
                   <a14:useLocalDpi xmlns:a14="http://schemas.microsoft.com/office/drawing/2010/main" val="0"/>
@@ -9742,7 +9742,7 @@
             </p:nvPr>
           </p:nvPicPr>
           <p:blipFill>
-            <a:blip r:embed="rId25">
+            <a:blip r:embed="rId27">
               <a:extLst>
                 <a:ext uri="{28A0092B-C50C-407E-A947-70E740481C1C}">
                   <a14:useLocalDpi xmlns:a14="http://schemas.microsoft.com/office/drawing/2010/main" val="0"/>
@@ -9823,7 +9823,7 @@
             <p:nvPr/>
           </p:nvPicPr>
           <p:blipFill rotWithShape="1">
-            <a:blip r:embed="rId26">
+            <a:blip r:embed="rId28">
               <a:extLst>
                 <a:ext uri="{28A0092B-C50C-407E-A947-70E740481C1C}">
                   <a14:useLocalDpi xmlns:a14="http://schemas.microsoft.com/office/drawing/2010/main" val="0"/>
@@ -9904,7 +9904,7 @@
             <p:nvPr/>
           </p:nvPicPr>
           <p:blipFill rotWithShape="1">
-            <a:blip r:embed="rId27">
+            <a:blip r:embed="rId29">
               <a:extLst>
                 <a:ext uri="{28A0092B-C50C-407E-A947-70E740481C1C}">
                   <a14:useLocalDpi xmlns:a14="http://schemas.microsoft.com/office/drawing/2010/main" val="0"/>
@@ -9943,7 +9943,7 @@
             </p:nvPr>
           </p:nvPicPr>
           <p:blipFill>
-            <a:blip r:embed="rId28">
+            <a:blip r:embed="rId30">
               <a:extLst>
                 <a:ext uri="{28A0092B-C50C-407E-A947-70E740481C1C}">
                   <a14:useLocalDpi xmlns:a14="http://schemas.microsoft.com/office/drawing/2010/main" val="0"/>
@@ -9983,7 +9983,7 @@
             </p:nvPr>
           </p:nvPicPr>
           <p:blipFill>
-            <a:blip r:embed="rId29">
+            <a:blip r:embed="rId31">
               <a:extLst>
                 <a:ext uri="{28A0092B-C50C-407E-A947-70E740481C1C}">
                   <a14:useLocalDpi xmlns:a14="http://schemas.microsoft.com/office/drawing/2010/main" val="0"/>
@@ -10023,7 +10023,7 @@
             </p:nvPr>
           </p:nvPicPr>
           <p:blipFill>
-            <a:blip r:embed="rId30">
+            <a:blip r:embed="rId32">
               <a:extLst>
                 <a:ext uri="{28A0092B-C50C-407E-A947-70E740481C1C}">
                   <a14:useLocalDpi xmlns:a14="http://schemas.microsoft.com/office/drawing/2010/main" val="0"/>
@@ -10044,107 +10044,6 @@
             </a:prstGeom>
           </p:spPr>
         </p:pic>
-        <p:grpSp>
-          <p:nvGrpSpPr>
-            <p:cNvPr id="229" name="Gruppieren 228">
-              <a:extLst>
-                <a:ext uri="{FF2B5EF4-FFF2-40B4-BE49-F238E27FC236}">
-                  <a16:creationId xmlns:a16="http://schemas.microsoft.com/office/drawing/2014/main" id="{CE97AA5C-B66C-441C-9274-E347176F2D38}"/>
-                </a:ext>
-              </a:extLst>
-            </p:cNvPr>
-            <p:cNvGrpSpPr/>
-            <p:nvPr/>
-          </p:nvGrpSpPr>
-          <p:grpSpPr>
-            <a:xfrm rot="16200000">
-              <a:off x="5813930" y="3242578"/>
-              <a:ext cx="1482876" cy="372844"/>
-              <a:chOff x="7448108" y="591390"/>
-              <a:chExt cx="1482876" cy="372844"/>
-            </a:xfrm>
-          </p:grpSpPr>
-          <p:pic>
-            <p:nvPicPr>
-              <p:cNvPr id="212" name="Grafik 211">
-                <a:extLst>
-                  <a:ext uri="{FF2B5EF4-FFF2-40B4-BE49-F238E27FC236}">
-                    <a16:creationId xmlns:a16="http://schemas.microsoft.com/office/drawing/2014/main" id="{DB3DEFC3-9AEA-4BDB-94FE-8248450331D0}"/>
-                  </a:ext>
-                </a:extLst>
-              </p:cNvPr>
-              <p:cNvPicPr>
-                <a:picLocks noChangeAspect="1"/>
-              </p:cNvPicPr>
-              <p:nvPr>
-                <p:custDataLst>
-                  <p:tags r:id="rId13"/>
-                </p:custDataLst>
-              </p:nvPr>
-            </p:nvPicPr>
-            <p:blipFill>
-              <a:blip r:embed="rId31">
-                <a:extLst>
-                  <a:ext uri="{28A0092B-C50C-407E-A947-70E740481C1C}">
-                    <a14:useLocalDpi xmlns:a14="http://schemas.microsoft.com/office/drawing/2010/main" val="0"/>
-                  </a:ext>
-                </a:extLst>
-              </a:blip>
-              <a:stretch>
-                <a:fillRect/>
-              </a:stretch>
-            </p:blipFill>
-            <p:spPr>
-              <a:xfrm>
-                <a:off x="7448108" y="591390"/>
-                <a:ext cx="1482876" cy="150785"/>
-              </a:xfrm>
-              <a:prstGeom prst="rect">
-                <a:avLst/>
-              </a:prstGeom>
-            </p:spPr>
-          </p:pic>
-          <p:pic>
-            <p:nvPicPr>
-              <p:cNvPr id="215" name="Grafik 214">
-                <a:extLst>
-                  <a:ext uri="{FF2B5EF4-FFF2-40B4-BE49-F238E27FC236}">
-                    <a16:creationId xmlns:a16="http://schemas.microsoft.com/office/drawing/2014/main" id="{B4647DBB-55E0-4B67-B50F-0FFC24BBD133}"/>
-                  </a:ext>
-                </a:extLst>
-              </p:cNvPr>
-              <p:cNvPicPr>
-                <a:picLocks noChangeAspect="1"/>
-              </p:cNvPicPr>
-              <p:nvPr>
-                <p:custDataLst>
-                  <p:tags r:id="rId14"/>
-                </p:custDataLst>
-              </p:nvPr>
-            </p:nvPicPr>
-            <p:blipFill>
-              <a:blip r:embed="rId32">
-                <a:extLst>
-                  <a:ext uri="{28A0092B-C50C-407E-A947-70E740481C1C}">
-                    <a14:useLocalDpi xmlns:a14="http://schemas.microsoft.com/office/drawing/2010/main" val="0"/>
-                  </a:ext>
-                </a:extLst>
-              </a:blip>
-              <a:stretch>
-                <a:fillRect/>
-              </a:stretch>
-            </p:blipFill>
-            <p:spPr>
-              <a:xfrm>
-                <a:off x="7594923" y="819750"/>
-                <a:ext cx="1177568" cy="144484"/>
-              </a:xfrm>
-              <a:prstGeom prst="rect">
-                <a:avLst/>
-              </a:prstGeom>
-            </p:spPr>
-          </p:pic>
-        </p:grpSp>
         <p:grpSp>
           <p:nvGrpSpPr>
             <p:cNvPr id="216" name="Gruppieren 215">
@@ -10235,7 +10134,7 @@
               </p:cNvPicPr>
               <p:nvPr>
                 <p:custDataLst>
-                  <p:tags r:id="rId12"/>
+                  <p:tags r:id="rId16"/>
                 </p:custDataLst>
               </p:nvPr>
             </p:nvPicPr>
@@ -10255,107 +10154,6 @@
               <a:xfrm>
                 <a:off x="1595951" y="5562248"/>
                 <a:ext cx="1445933" cy="242003"/>
-              </a:xfrm>
-              <a:prstGeom prst="rect">
-                <a:avLst/>
-              </a:prstGeom>
-            </p:spPr>
-          </p:pic>
-        </p:grpSp>
-        <p:grpSp>
-          <p:nvGrpSpPr>
-            <p:cNvPr id="239" name="Gruppieren 238">
-              <a:extLst>
-                <a:ext uri="{FF2B5EF4-FFF2-40B4-BE49-F238E27FC236}">
-                  <a16:creationId xmlns:a16="http://schemas.microsoft.com/office/drawing/2014/main" id="{2DDAB05F-75CD-466F-84E1-699FA74B6BB3}"/>
-                </a:ext>
-              </a:extLst>
-            </p:cNvPr>
-            <p:cNvGrpSpPr/>
-            <p:nvPr/>
-          </p:nvGrpSpPr>
-          <p:grpSpPr>
-            <a:xfrm>
-              <a:off x="9190836" y="2701500"/>
-              <a:ext cx="349376" cy="1890431"/>
-              <a:chOff x="9226970" y="3102313"/>
-              <a:chExt cx="349376" cy="1890431"/>
-            </a:xfrm>
-          </p:grpSpPr>
-          <p:pic>
-            <p:nvPicPr>
-              <p:cNvPr id="238" name="Grafik 237">
-                <a:extLst>
-                  <a:ext uri="{FF2B5EF4-FFF2-40B4-BE49-F238E27FC236}">
-                    <a16:creationId xmlns:a16="http://schemas.microsoft.com/office/drawing/2014/main" id="{0EFE77B8-2BBF-4621-890B-89CF9CAE27FD}"/>
-                  </a:ext>
-                </a:extLst>
-              </p:cNvPr>
-              <p:cNvPicPr>
-                <a:picLocks noChangeAspect="1"/>
-              </p:cNvPicPr>
-              <p:nvPr>
-                <p:custDataLst>
-                  <p:tags r:id="rId10"/>
-                </p:custDataLst>
-              </p:nvPr>
-            </p:nvPicPr>
-            <p:blipFill>
-              <a:blip r:embed="rId34">
-                <a:extLst>
-                  <a:ext uri="{28A0092B-C50C-407E-A947-70E740481C1C}">
-                    <a14:useLocalDpi xmlns:a14="http://schemas.microsoft.com/office/drawing/2010/main" val="0"/>
-                  </a:ext>
-                </a:extLst>
-              </a:blip>
-              <a:stretch>
-                <a:fillRect/>
-              </a:stretch>
-            </p:blipFill>
-            <p:spPr>
-              <a:xfrm rot="16200000">
-                <a:off x="8375355" y="3953928"/>
-                <a:ext cx="1890431" cy="187201"/>
-              </a:xfrm>
-              <a:prstGeom prst="rect">
-                <a:avLst/>
-              </a:prstGeom>
-            </p:spPr>
-          </p:pic>
-          <p:pic>
-            <p:nvPicPr>
-              <p:cNvPr id="236" name="Grafik 235">
-                <a:extLst>
-                  <a:ext uri="{FF2B5EF4-FFF2-40B4-BE49-F238E27FC236}">
-                    <a16:creationId xmlns:a16="http://schemas.microsoft.com/office/drawing/2014/main" id="{50A273CC-9120-4563-91A4-5615FD135860}"/>
-                  </a:ext>
-                </a:extLst>
-              </p:cNvPr>
-              <p:cNvPicPr>
-                <a:picLocks noChangeAspect="1"/>
-              </p:cNvPicPr>
-              <p:nvPr>
-                <p:custDataLst>
-                  <p:tags r:id="rId11"/>
-                </p:custDataLst>
-              </p:nvPr>
-            </p:nvPicPr>
-            <p:blipFill>
-              <a:blip r:embed="rId32">
-                <a:extLst>
-                  <a:ext uri="{28A0092B-C50C-407E-A947-70E740481C1C}">
-                    <a14:useLocalDpi xmlns:a14="http://schemas.microsoft.com/office/drawing/2010/main" val="0"/>
-                  </a:ext>
-                </a:extLst>
-              </a:blip>
-              <a:stretch>
-                <a:fillRect/>
-              </a:stretch>
-            </p:blipFill>
-            <p:spPr>
-              <a:xfrm rot="16200000">
-                <a:off x="8915320" y="3991386"/>
-                <a:ext cx="1177568" cy="144484"/>
               </a:xfrm>
               <a:prstGeom prst="rect">
                 <a:avLst/>
@@ -10449,12 +10247,12 @@
               </p:cNvPicPr>
               <p:nvPr>
                 <p:custDataLst>
-                  <p:tags r:id="rId8"/>
+                  <p:tags r:id="rId14"/>
                 </p:custDataLst>
               </p:nvPr>
             </p:nvPicPr>
             <p:blipFill>
-              <a:blip r:embed="rId35">
+              <a:blip r:embed="rId34">
                 <a:extLst>
                   <a:ext uri="{28A0092B-C50C-407E-A947-70E740481C1C}">
                     <a14:useLocalDpi xmlns:a14="http://schemas.microsoft.com/office/drawing/2010/main" val="0"/>
@@ -10489,12 +10287,12 @@
               </p:cNvPicPr>
               <p:nvPr>
                 <p:custDataLst>
-                  <p:tags r:id="rId9"/>
+                  <p:tags r:id="rId15"/>
                 </p:custDataLst>
               </p:nvPr>
             </p:nvPicPr>
             <p:blipFill>
-              <a:blip r:embed="rId36">
+              <a:blip r:embed="rId35">
                 <a:extLst>
                   <a:ext uri="{28A0092B-C50C-407E-A947-70E740481C1C}">
                     <a14:useLocalDpi xmlns:a14="http://schemas.microsoft.com/office/drawing/2010/main" val="0"/>
@@ -10602,12 +10400,12 @@
               </p:cNvPicPr>
               <p:nvPr>
                 <p:custDataLst>
-                  <p:tags r:id="rId6"/>
+                  <p:tags r:id="rId12"/>
                 </p:custDataLst>
               </p:nvPr>
             </p:nvPicPr>
             <p:blipFill>
-              <a:blip r:embed="rId37">
+              <a:blip r:embed="rId36">
                 <a:extLst>
                   <a:ext uri="{28A0092B-C50C-407E-A947-70E740481C1C}">
                     <a14:useLocalDpi xmlns:a14="http://schemas.microsoft.com/office/drawing/2010/main" val="0"/>
@@ -10642,12 +10440,12 @@
               </p:cNvPicPr>
               <p:nvPr>
                 <p:custDataLst>
-                  <p:tags r:id="rId7"/>
+                  <p:tags r:id="rId13"/>
                 </p:custDataLst>
               </p:nvPr>
             </p:nvPicPr>
             <p:blipFill>
-              <a:blip r:embed="rId36">
+              <a:blip r:embed="rId35">
                 <a:extLst>
                   <a:ext uri="{28A0092B-C50C-407E-A947-70E740481C1C}">
                     <a14:useLocalDpi xmlns:a14="http://schemas.microsoft.com/office/drawing/2010/main" val="0"/>
@@ -10662,6 +10460,288 @@
               <a:xfrm>
                 <a:off x="7668287" y="1493748"/>
                 <a:ext cx="1238118" cy="193164"/>
+              </a:xfrm>
+              <a:prstGeom prst="rect">
+                <a:avLst/>
+              </a:prstGeom>
+            </p:spPr>
+          </p:pic>
+        </p:grpSp>
+        <p:grpSp>
+          <p:nvGrpSpPr>
+            <p:cNvPr id="8" name="Gruppieren 7">
+              <a:extLst>
+                <a:ext uri="{FF2B5EF4-FFF2-40B4-BE49-F238E27FC236}">
+                  <a16:creationId xmlns:a16="http://schemas.microsoft.com/office/drawing/2014/main" id="{F4B3FA6B-816A-4925-B57D-610CF62858BF}"/>
+                </a:ext>
+              </a:extLst>
+            </p:cNvPr>
+            <p:cNvGrpSpPr/>
+            <p:nvPr/>
+          </p:nvGrpSpPr>
+          <p:grpSpPr>
+            <a:xfrm>
+              <a:off x="6266931" y="2812495"/>
+              <a:ext cx="552140" cy="1557662"/>
+              <a:chOff x="6252106" y="2650169"/>
+              <a:chExt cx="552140" cy="1557662"/>
+            </a:xfrm>
+          </p:grpSpPr>
+          <p:pic>
+            <p:nvPicPr>
+              <p:cNvPr id="212" name="Grafik 211">
+                <a:extLst>
+                  <a:ext uri="{FF2B5EF4-FFF2-40B4-BE49-F238E27FC236}">
+                    <a16:creationId xmlns:a16="http://schemas.microsoft.com/office/drawing/2014/main" id="{DB3DEFC3-9AEA-4BDB-94FE-8248450331D0}"/>
+                  </a:ext>
+                </a:extLst>
+              </p:cNvPr>
+              <p:cNvPicPr>
+                <a:picLocks noChangeAspect="1"/>
+              </p:cNvPicPr>
+              <p:nvPr>
+                <p:custDataLst>
+                  <p:tags r:id="rId9"/>
+                </p:custDataLst>
+              </p:nvPr>
+            </p:nvPicPr>
+            <p:blipFill>
+              <a:blip r:embed="rId37">
+                <a:extLst>
+                  <a:ext uri="{28A0092B-C50C-407E-A947-70E740481C1C}">
+                    <a14:useLocalDpi xmlns:a14="http://schemas.microsoft.com/office/drawing/2010/main" val="0"/>
+                  </a:ext>
+                </a:extLst>
+              </a:blip>
+              <a:stretch>
+                <a:fillRect/>
+              </a:stretch>
+            </p:blipFill>
+            <p:spPr>
+              <a:xfrm rot="16200000">
+                <a:off x="5586061" y="3353608"/>
+                <a:ext cx="1482876" cy="150785"/>
+              </a:xfrm>
+              <a:prstGeom prst="rect">
+                <a:avLst/>
+              </a:prstGeom>
+            </p:spPr>
+          </p:pic>
+          <p:pic>
+            <p:nvPicPr>
+              <p:cNvPr id="3" name="Grafik 2">
+                <a:extLst>
+                  <a:ext uri="{FF2B5EF4-FFF2-40B4-BE49-F238E27FC236}">
+                    <a16:creationId xmlns:a16="http://schemas.microsoft.com/office/drawing/2014/main" id="{DF86A9FF-1DFD-4E4B-8E3A-784F6EFAFB43}"/>
+                  </a:ext>
+                </a:extLst>
+              </p:cNvPr>
+              <p:cNvPicPr>
+                <a:picLocks noChangeAspect="1"/>
+              </p:cNvPicPr>
+              <p:nvPr>
+                <p:custDataLst>
+                  <p:tags r:id="rId10"/>
+                </p:custDataLst>
+              </p:nvPr>
+            </p:nvPicPr>
+            <p:blipFill>
+              <a:blip r:embed="rId38">
+                <a:extLst>
+                  <a:ext uri="{28A0092B-C50C-407E-A947-70E740481C1C}">
+                    <a14:useLocalDpi xmlns:a14="http://schemas.microsoft.com/office/drawing/2010/main" val="0"/>
+                  </a:ext>
+                </a:extLst>
+              </a:blip>
+              <a:stretch>
+                <a:fillRect/>
+              </a:stretch>
+            </p:blipFill>
+            <p:spPr>
+              <a:xfrm rot="16200000">
+                <a:off x="5750121" y="3355297"/>
+                <a:ext cx="1557662" cy="147406"/>
+              </a:xfrm>
+              <a:prstGeom prst="rect">
+                <a:avLst/>
+              </a:prstGeom>
+            </p:spPr>
+          </p:pic>
+          <p:pic>
+            <p:nvPicPr>
+              <p:cNvPr id="6" name="Grafik 5">
+                <a:extLst>
+                  <a:ext uri="{FF2B5EF4-FFF2-40B4-BE49-F238E27FC236}">
+                    <a16:creationId xmlns:a16="http://schemas.microsoft.com/office/drawing/2014/main" id="{805CA09A-F5B2-42B7-96F8-CF207092FE50}"/>
+                  </a:ext>
+                </a:extLst>
+              </p:cNvPr>
+              <p:cNvPicPr>
+                <a:picLocks noChangeAspect="1"/>
+              </p:cNvPicPr>
+              <p:nvPr>
+                <p:custDataLst>
+                  <p:tags r:id="rId11"/>
+                </p:custDataLst>
+              </p:nvPr>
+            </p:nvPicPr>
+            <p:blipFill>
+              <a:blip r:embed="rId39">
+                <a:extLst>
+                  <a:ext uri="{28A0092B-C50C-407E-A947-70E740481C1C}">
+                    <a14:useLocalDpi xmlns:a14="http://schemas.microsoft.com/office/drawing/2010/main" val="0"/>
+                  </a:ext>
+                </a:extLst>
+              </a:blip>
+              <a:stretch>
+                <a:fillRect/>
+              </a:stretch>
+            </p:blipFill>
+            <p:spPr>
+              <a:xfrm rot="16200000">
+                <a:off x="6207764" y="3352437"/>
+                <a:ext cx="1039223" cy="153740"/>
+              </a:xfrm>
+              <a:prstGeom prst="rect">
+                <a:avLst/>
+              </a:prstGeom>
+            </p:spPr>
+          </p:pic>
+        </p:grpSp>
+        <p:grpSp>
+          <p:nvGrpSpPr>
+            <p:cNvPr id="7" name="Gruppieren 6">
+              <a:extLst>
+                <a:ext uri="{FF2B5EF4-FFF2-40B4-BE49-F238E27FC236}">
+                  <a16:creationId xmlns:a16="http://schemas.microsoft.com/office/drawing/2014/main" id="{09AC91DB-CF92-4597-BADD-715736E97241}"/>
+                </a:ext>
+              </a:extLst>
+            </p:cNvPr>
+            <p:cNvGrpSpPr/>
+            <p:nvPr/>
+          </p:nvGrpSpPr>
+          <p:grpSpPr>
+            <a:xfrm>
+              <a:off x="9074378" y="2672113"/>
+              <a:ext cx="583856" cy="1890431"/>
+              <a:chOff x="9109556" y="2701500"/>
+              <a:chExt cx="583856" cy="1890431"/>
+            </a:xfrm>
+          </p:grpSpPr>
+          <p:pic>
+            <p:nvPicPr>
+              <p:cNvPr id="238" name="Grafik 237">
+                <a:extLst>
+                  <a:ext uri="{FF2B5EF4-FFF2-40B4-BE49-F238E27FC236}">
+                    <a16:creationId xmlns:a16="http://schemas.microsoft.com/office/drawing/2014/main" id="{0EFE77B8-2BBF-4621-890B-89CF9CAE27FD}"/>
+                  </a:ext>
+                </a:extLst>
+              </p:cNvPr>
+              <p:cNvPicPr>
+                <a:picLocks noChangeAspect="1"/>
+              </p:cNvPicPr>
+              <p:nvPr>
+                <p:custDataLst>
+                  <p:tags r:id="rId6"/>
+                </p:custDataLst>
+              </p:nvPr>
+            </p:nvPicPr>
+            <p:blipFill>
+              <a:blip r:embed="rId40">
+                <a:extLst>
+                  <a:ext uri="{28A0092B-C50C-407E-A947-70E740481C1C}">
+                    <a14:useLocalDpi xmlns:a14="http://schemas.microsoft.com/office/drawing/2010/main" val="0"/>
+                  </a:ext>
+                </a:extLst>
+              </a:blip>
+              <a:stretch>
+                <a:fillRect/>
+              </a:stretch>
+            </p:blipFill>
+            <p:spPr>
+              <a:xfrm rot="16200000">
+                <a:off x="8257941" y="3553115"/>
+                <a:ext cx="1890431" cy="187201"/>
+              </a:xfrm>
+              <a:prstGeom prst="rect">
+                <a:avLst/>
+              </a:prstGeom>
+            </p:spPr>
+          </p:pic>
+          <p:pic>
+            <p:nvPicPr>
+              <p:cNvPr id="52" name="Grafik 51">
+                <a:extLst>
+                  <a:ext uri="{FF2B5EF4-FFF2-40B4-BE49-F238E27FC236}">
+                    <a16:creationId xmlns:a16="http://schemas.microsoft.com/office/drawing/2014/main" id="{A7965B54-FC5D-42AB-97F0-D1D92A924575}"/>
+                  </a:ext>
+                </a:extLst>
+              </p:cNvPr>
+              <p:cNvPicPr>
+                <a:picLocks noChangeAspect="1"/>
+              </p:cNvPicPr>
+              <p:nvPr>
+                <p:custDataLst>
+                  <p:tags r:id="rId7"/>
+                </p:custDataLst>
+              </p:nvPr>
+            </p:nvPicPr>
+            <p:blipFill>
+              <a:blip r:embed="rId38">
+                <a:extLst>
+                  <a:ext uri="{28A0092B-C50C-407E-A947-70E740481C1C}">
+                    <a14:useLocalDpi xmlns:a14="http://schemas.microsoft.com/office/drawing/2010/main" val="0"/>
+                  </a:ext>
+                </a:extLst>
+              </a:blip>
+              <a:stretch>
+                <a:fillRect/>
+              </a:stretch>
+            </p:blipFill>
+            <p:spPr>
+              <a:xfrm rot="16200000">
+                <a:off x="8641731" y="3573012"/>
+                <a:ext cx="1557662" cy="147406"/>
+              </a:xfrm>
+              <a:prstGeom prst="rect">
+                <a:avLst/>
+              </a:prstGeom>
+            </p:spPr>
+          </p:pic>
+          <p:pic>
+            <p:nvPicPr>
+              <p:cNvPr id="53" name="Grafik 52">
+                <a:extLst>
+                  <a:ext uri="{FF2B5EF4-FFF2-40B4-BE49-F238E27FC236}">
+                    <a16:creationId xmlns:a16="http://schemas.microsoft.com/office/drawing/2014/main" id="{62AE832D-4832-4A1A-B422-D9952AD6CAE0}"/>
+                  </a:ext>
+                </a:extLst>
+              </p:cNvPr>
+              <p:cNvPicPr>
+                <a:picLocks noChangeAspect="1"/>
+              </p:cNvPicPr>
+              <p:nvPr>
+                <p:custDataLst>
+                  <p:tags r:id="rId8"/>
+                </p:custDataLst>
+              </p:nvPr>
+            </p:nvPicPr>
+            <p:blipFill>
+              <a:blip r:embed="rId39">
+                <a:extLst>
+                  <a:ext uri="{28A0092B-C50C-407E-A947-70E740481C1C}">
+                    <a14:useLocalDpi xmlns:a14="http://schemas.microsoft.com/office/drawing/2010/main" val="0"/>
+                  </a:ext>
+                </a:extLst>
+              </a:blip>
+              <a:stretch>
+                <a:fillRect/>
+              </a:stretch>
+            </p:blipFill>
+            <p:spPr>
+              <a:xfrm rot="16200000">
+                <a:off x="9096930" y="3538911"/>
+                <a:ext cx="1039223" cy="153740"/>
               </a:xfrm>
               <a:prstGeom prst="rect">
                 <a:avLst/>
@@ -11191,6 +11271,120 @@
 <file path=ppt/tags/tag32.xml><?xml version="1.0" encoding="utf-8"?>
 <p:tagLst xmlns:a="http://schemas.openxmlformats.org/drawingml/2006/main" xmlns:r="http://schemas.openxmlformats.org/officeDocument/2006/relationships" xmlns:p="http://schemas.openxmlformats.org/presentationml/2006/main">
   <p:tag name="OUTPUTDPI" val="1200"/>
+  <p:tag name="ORIGINALHEIGHT" val="111,7361"/>
+  <p:tag name="ORIGINALWIDTH" val="1211,099"/>
+  <p:tag name="LATEXADDIN" val="\documentclass{article}&#10;\usepackage{amsmath}&#10;\usepackage{color}&#10;\pagestyle{empty}&#10;\begin{document}&#10;%\color{white}&#10;Interpolated CoM and&#10;\end{document}"/>
+  <p:tag name="IGUANATEXSIZE" val="20"/>
+  <p:tag name="IGUANATEXCURSOR" val="126"/>
+  <p:tag name="TRANSPARENCY" val="Wahr"/>
+  <p:tag name="FILENAME" val=""/>
+  <p:tag name="LATEXENGINEID" val="0"/>
+  <p:tag name="TEMPFOLDER" val="c:\temp\"/>
+  <p:tag name="LATEXFORMHEIGHT" val="312"/>
+  <p:tag name="LATEXFORMWIDTH" val="384"/>
+  <p:tag name="LATEXFORMWRAP" val="Wahr"/>
+  <p:tag name="BITMAPVECTOR" val="0"/>
+</p:tagLst>
+</file>
+
+<file path=ppt/tags/tag33.xml><?xml version="1.0" encoding="utf-8"?>
+<p:tagLst xmlns:a="http://schemas.openxmlformats.org/drawingml/2006/main" xmlns:r="http://schemas.openxmlformats.org/officeDocument/2006/relationships" xmlns:p="http://schemas.openxmlformats.org/presentationml/2006/main">
+  <p:tag name="OUTPUTDPI" val="1200"/>
+  <p:tag name="ORIGINALHEIGHT" val="87,73905"/>
+  <p:tag name="ORIGINALWIDTH" val="997,3754"/>
+  <p:tag name="LATEXADDIN" val="\documentclass{article}&#10;\usepackage{amsmath}&#10;\usepackage{color}&#10;\pagestyle{empty}&#10;\begin{document}&#10;%\color{white}&#10;Feet Positions and&#10;\end{document}"/>
+  <p:tag name="IGUANATEXSIZE" val="20"/>
+  <p:tag name="IGUANATEXCURSOR" val="132"/>
+  <p:tag name="TRANSPARENCY" val="Wahr"/>
+  <p:tag name="FILENAME" val=""/>
+  <p:tag name="LATEXENGINEID" val="0"/>
+  <p:tag name="TEMPFOLDER" val="c:\temp\"/>
+  <p:tag name="LATEXFORMHEIGHT" val="312"/>
+  <p:tag name="LATEXFORMWIDTH" val="384"/>
+  <p:tag name="LATEXFORMWRAP" val="Wahr"/>
+  <p:tag name="BITMAPVECTOR" val="0"/>
+</p:tagLst>
+</file>
+
+<file path=ppt/tags/tag34.xml><?xml version="1.0" encoding="utf-8"?>
+<p:tagLst xmlns:a="http://schemas.openxmlformats.org/drawingml/2006/main" xmlns:r="http://schemas.openxmlformats.org/officeDocument/2006/relationships" xmlns:p="http://schemas.openxmlformats.org/presentationml/2006/main">
+  <p:tag name="OUTPUTDPI" val="1200"/>
+  <p:tag name="ORIGINALHEIGHT" val="90,73866"/>
+  <p:tag name="ORIGINALWIDTH" val="665,1669"/>
+  <p:tag name="LATEXADDIN" val="\documentclass{article}&#10;\usepackage{amsmath}&#10;\usepackage{color}&#10;\pagestyle{empty}&#10;\begin{document}&#10;%\color{white}&#10;Orientations&#10;\end{document}"/>
+  <p:tag name="IGUANATEXSIZE" val="20"/>
+  <p:tag name="IGUANATEXCURSOR" val="126"/>
+  <p:tag name="TRANSPARENCY" val="Wahr"/>
+  <p:tag name="FILENAME" val=""/>
+  <p:tag name="LATEXENGINEID" val="0"/>
+  <p:tag name="TEMPFOLDER" val="c:\temp\"/>
+  <p:tag name="LATEXFORMHEIGHT" val="312"/>
+  <p:tag name="LATEXFORMWIDTH" val="384"/>
+  <p:tag name="LATEXFORMWRAP" val="Wahr"/>
+  <p:tag name="BITMAPVECTOR" val="0"/>
+</p:tagLst>
+</file>
+
+<file path=ppt/tags/tag35.xml><?xml version="1.0" encoding="utf-8"?>
+<p:tagLst xmlns:a="http://schemas.openxmlformats.org/drawingml/2006/main" xmlns:r="http://schemas.openxmlformats.org/officeDocument/2006/relationships" xmlns:p="http://schemas.openxmlformats.org/presentationml/2006/main">
+  <p:tag name="OUTPUTDPI" val="1200"/>
+  <p:tag name="ORIGINALHEIGHT" val="90,73866"/>
+  <p:tag name="ORIGINALWIDTH" val="950,1313"/>
+  <p:tag name="LATEXADDIN" val="\documentclass{article}&#10;\usepackage{amsmath}&#10;\usepackage{color}&#10;\pagestyle{empty}&#10;\begin{document}&#10;%\color{white}&#10;Desired CoM and&#10;\end{document}"/>
+  <p:tag name="IGUANATEXSIZE" val="20"/>
+  <p:tag name="IGUANATEXCURSOR" val="129"/>
+  <p:tag name="TRANSPARENCY" val="Wahr"/>
+  <p:tag name="FILENAME" val=""/>
+  <p:tag name="LATEXENGINEID" val="0"/>
+  <p:tag name="TEMPFOLDER" val="c:\temp\"/>
+  <p:tag name="LATEXFORMHEIGHT" val="312"/>
+  <p:tag name="LATEXFORMWIDTH" val="384"/>
+  <p:tag name="LATEXFORMWRAP" val="Wahr"/>
+  <p:tag name="BITMAPVECTOR" val="0"/>
+</p:tagLst>
+</file>
+
+<file path=ppt/tags/tag36.xml><?xml version="1.0" encoding="utf-8"?>
+<p:tagLst xmlns:a="http://schemas.openxmlformats.org/drawingml/2006/main" xmlns:r="http://schemas.openxmlformats.org/officeDocument/2006/relationships" xmlns:p="http://schemas.openxmlformats.org/presentationml/2006/main">
+  <p:tag name="OUTPUTDPI" val="1200"/>
+  <p:tag name="ORIGINALHEIGHT" val="87,73905"/>
+  <p:tag name="ORIGINALWIDTH" val="997,3754"/>
+  <p:tag name="LATEXADDIN" val="\documentclass{article}&#10;\usepackage{amsmath}&#10;\usepackage{color}&#10;\pagestyle{empty}&#10;\begin{document}&#10;%\color{white}&#10;Feet Positions and&#10;\end{document}"/>
+  <p:tag name="IGUANATEXSIZE" val="20"/>
+  <p:tag name="IGUANATEXCURSOR" val="132"/>
+  <p:tag name="TRANSPARENCY" val="Wahr"/>
+  <p:tag name="FILENAME" val=""/>
+  <p:tag name="LATEXENGINEID" val="0"/>
+  <p:tag name="TEMPFOLDER" val="c:\temp\"/>
+  <p:tag name="LATEXFORMHEIGHT" val="312"/>
+  <p:tag name="LATEXFORMWIDTH" val="384"/>
+  <p:tag name="LATEXFORMWRAP" val="Wahr"/>
+  <p:tag name="BITMAPVECTOR" val="0"/>
+</p:tagLst>
+</file>
+
+<file path=ppt/tags/tag37.xml><?xml version="1.0" encoding="utf-8"?>
+<p:tagLst xmlns:a="http://schemas.openxmlformats.org/drawingml/2006/main" xmlns:r="http://schemas.openxmlformats.org/officeDocument/2006/relationships" xmlns:p="http://schemas.openxmlformats.org/presentationml/2006/main">
+  <p:tag name="OUTPUTDPI" val="1200"/>
+  <p:tag name="ORIGINALHEIGHT" val="90,73866"/>
+  <p:tag name="ORIGINALWIDTH" val="665,1669"/>
+  <p:tag name="LATEXADDIN" val="\documentclass{article}&#10;\usepackage{amsmath}&#10;\usepackage{color}&#10;\pagestyle{empty}&#10;\begin{document}&#10;%\color{white}&#10;Orientations&#10;\end{document}"/>
+  <p:tag name="IGUANATEXSIZE" val="20"/>
+  <p:tag name="IGUANATEXCURSOR" val="126"/>
+  <p:tag name="TRANSPARENCY" val="Wahr"/>
+  <p:tag name="FILENAME" val=""/>
+  <p:tag name="LATEXENGINEID" val="0"/>
+  <p:tag name="TEMPFOLDER" val="c:\temp\"/>
+  <p:tag name="LATEXFORMHEIGHT" val="312"/>
+  <p:tag name="LATEXFORMWIDTH" val="384"/>
+  <p:tag name="LATEXFORMWRAP" val="Wahr"/>
+  <p:tag name="BITMAPVECTOR" val="0"/>
+</p:tagLst>
+</file>
+
+<file path=ppt/tags/tag38.xml><?xml version="1.0" encoding="utf-8"?>
+<p:tagLst xmlns:a="http://schemas.openxmlformats.org/drawingml/2006/main" xmlns:r="http://schemas.openxmlformats.org/officeDocument/2006/relationships" xmlns:p="http://schemas.openxmlformats.org/presentationml/2006/main">
+  <p:tag name="OUTPUTDPI" val="1200"/>
   <p:tag name="ORIGINALHEIGHT" val="86,98914"/>
   <p:tag name="ORIGINALWIDTH" val="374,9532"/>
   <p:tag name="LATEXADDIN" val="\documentclass{article}&#10;\usepackage{amsmath}&#10;\usepackage{color}&#10;\pagestyle{empty}&#10;\begin{document}&#10;Inverse&#10;\end{document}"/>
@@ -11207,7 +11401,7 @@
 </p:tagLst>
 </file>
 
-<file path=ppt/tags/tag33.xml><?xml version="1.0" encoding="utf-8"?>
+<file path=ppt/tags/tag39.xml><?xml version="1.0" encoding="utf-8"?>
 <p:tagLst xmlns:a="http://schemas.openxmlformats.org/drawingml/2006/main" xmlns:r="http://schemas.openxmlformats.org/officeDocument/2006/relationships" xmlns:p="http://schemas.openxmlformats.org/presentationml/2006/main">
   <p:tag name="OUTPUTDPI" val="1200"/>
   <p:tag name="ORIGINALHEIGHT" val="86,98914"/>
@@ -11215,120 +11409,6 @@
   <p:tag name="LATEXADDIN" val="\documentclass{article}&#10;\usepackage{amsmath}&#10;\usepackage{color}&#10;\pagestyle{empty}&#10;\begin{document}&#10;Kinematics&#10;\end{document}"/>
   <p:tag name="IGUANATEXSIZE" val="20"/>
   <p:tag name="IGUANATEXCURSOR" val="109"/>
-  <p:tag name="TRANSPARENCY" val="Wahr"/>
-  <p:tag name="FILENAME" val=""/>
-  <p:tag name="LATEXENGINEID" val="0"/>
-  <p:tag name="TEMPFOLDER" val="c:\temp\"/>
-  <p:tag name="LATEXFORMHEIGHT" val="312"/>
-  <p:tag name="LATEXFORMWIDTH" val="384"/>
-  <p:tag name="LATEXFORMWRAP" val="Wahr"/>
-  <p:tag name="BITMAPVECTOR" val="0"/>
-</p:tagLst>
-</file>
-
-<file path=ppt/tags/tag34.xml><?xml version="1.0" encoding="utf-8"?>
-<p:tagLst xmlns:a="http://schemas.openxmlformats.org/drawingml/2006/main" xmlns:r="http://schemas.openxmlformats.org/officeDocument/2006/relationships" xmlns:p="http://schemas.openxmlformats.org/presentationml/2006/main">
-  <p:tag name="OUTPUTDPI" val="1200"/>
-  <p:tag name="ORIGINALHEIGHT" val="87,73905"/>
-  <p:tag name="ORIGINALWIDTH" val="441,6948"/>
-  <p:tag name="LATEXADDIN" val="\documentclass{article}&#10;\usepackage{amsmath}&#10;\usepackage{color}&#10;\pagestyle{empty}&#10;\begin{document}&#10;Forward&#10;\end{document}"/>
-  <p:tag name="IGUANATEXSIZE" val="20"/>
-  <p:tag name="IGUANATEXCURSOR" val="106"/>
-  <p:tag name="TRANSPARENCY" val="Wahr"/>
-  <p:tag name="FILENAME" val=""/>
-  <p:tag name="LATEXENGINEID" val="0"/>
-  <p:tag name="TEMPFOLDER" val="c:\temp\"/>
-  <p:tag name="LATEXFORMHEIGHT" val="312"/>
-  <p:tag name="LATEXFORMWIDTH" val="384"/>
-  <p:tag name="LATEXFORMWRAP" val="Wahr"/>
-  <p:tag name="BITMAPVECTOR" val="0"/>
-</p:tagLst>
-</file>
-
-<file path=ppt/tags/tag35.xml><?xml version="1.0" encoding="utf-8"?>
-<p:tagLst xmlns:a="http://schemas.openxmlformats.org/drawingml/2006/main" xmlns:r="http://schemas.openxmlformats.org/officeDocument/2006/relationships" xmlns:p="http://schemas.openxmlformats.org/presentationml/2006/main">
-  <p:tag name="OUTPUTDPI" val="1200"/>
-  <p:tag name="ORIGINALHEIGHT" val="86,98914"/>
-  <p:tag name="ORIGINALWIDTH" val="601,4248"/>
-  <p:tag name="LATEXADDIN" val="\documentclass{article}&#10;\usepackage{amsmath}&#10;\usepackage{color}&#10;\pagestyle{empty}&#10;\begin{document}&#10;Kinematics&#10;\end{document}"/>
-  <p:tag name="IGUANATEXSIZE" val="20"/>
-  <p:tag name="IGUANATEXCURSOR" val="109"/>
-  <p:tag name="TRANSPARENCY" val="Wahr"/>
-  <p:tag name="FILENAME" val=""/>
-  <p:tag name="LATEXENGINEID" val="0"/>
-  <p:tag name="TEMPFOLDER" val="c:\temp\"/>
-  <p:tag name="LATEXFORMHEIGHT" val="312"/>
-  <p:tag name="LATEXFORMWIDTH" val="384"/>
-  <p:tag name="LATEXFORMWRAP" val="Wahr"/>
-  <p:tag name="BITMAPVECTOR" val="0"/>
-</p:tagLst>
-</file>
-
-<file path=ppt/tags/tag36.xml><?xml version="1.0" encoding="utf-8"?>
-<p:tagLst xmlns:a="http://schemas.openxmlformats.org/drawingml/2006/main" xmlns:r="http://schemas.openxmlformats.org/officeDocument/2006/relationships" xmlns:p="http://schemas.openxmlformats.org/presentationml/2006/main">
-  <p:tag name="OUTPUTDPI" val="1200"/>
-  <p:tag name="ORIGINALHEIGHT" val="111,7361"/>
-  <p:tag name="ORIGINALWIDTH" val="1211,099"/>
-  <p:tag name="LATEXADDIN" val="\documentclass{article}&#10;\usepackage{amsmath}&#10;\usepackage{color}&#10;\pagestyle{empty}&#10;\begin{document}&#10;%\color{white}&#10;Interpolated CoM and&#10;\end{document}"/>
-  <p:tag name="IGUANATEXSIZE" val="20"/>
-  <p:tag name="IGUANATEXCURSOR" val="126"/>
-  <p:tag name="TRANSPARENCY" val="Wahr"/>
-  <p:tag name="FILENAME" val=""/>
-  <p:tag name="LATEXENGINEID" val="0"/>
-  <p:tag name="TEMPFOLDER" val="c:\temp\"/>
-  <p:tag name="LATEXFORMHEIGHT" val="312"/>
-  <p:tag name="LATEXFORMWIDTH" val="384"/>
-  <p:tag name="LATEXFORMWRAP" val="Wahr"/>
-  <p:tag name="BITMAPVECTOR" val="0"/>
-</p:tagLst>
-</file>
-
-<file path=ppt/tags/tag37.xml><?xml version="1.0" encoding="utf-8"?>
-<p:tagLst xmlns:a="http://schemas.openxmlformats.org/drawingml/2006/main" xmlns:r="http://schemas.openxmlformats.org/officeDocument/2006/relationships" xmlns:p="http://schemas.openxmlformats.org/presentationml/2006/main">
-  <p:tag name="OUTPUTDPI" val="1200"/>
-  <p:tag name="ORIGINALHEIGHT" val="86,23921"/>
-  <p:tag name="ORIGINALWIDTH" val="754,4056"/>
-  <p:tag name="LATEXADDIN" val="\documentclass{article}&#10;\usepackage{amsmath}&#10;\usepackage{color}&#10;\pagestyle{empty}&#10;\begin{document}&#10;%\color{white}&#10;Feet Positions&#10;\end{document}"/>
-  <p:tag name="IGUANATEXSIZE" val="20"/>
-  <p:tag name="IGUANATEXCURSOR" val="128"/>
-  <p:tag name="TRANSPARENCY" val="Wahr"/>
-  <p:tag name="FILENAME" val=""/>
-  <p:tag name="LATEXENGINEID" val="0"/>
-  <p:tag name="TEMPFOLDER" val="c:\temp\"/>
-  <p:tag name="LATEXFORMHEIGHT" val="312"/>
-  <p:tag name="LATEXFORMWIDTH" val="384"/>
-  <p:tag name="LATEXFORMWRAP" val="Wahr"/>
-  <p:tag name="BITMAPVECTOR" val="0"/>
-</p:tagLst>
-</file>
-
-<file path=ppt/tags/tag38.xml><?xml version="1.0" encoding="utf-8"?>
-<p:tagLst xmlns:a="http://schemas.openxmlformats.org/drawingml/2006/main" xmlns:r="http://schemas.openxmlformats.org/officeDocument/2006/relationships" xmlns:p="http://schemas.openxmlformats.org/presentationml/2006/main">
-  <p:tag name="OUTPUTDPI" val="1200"/>
-  <p:tag name="ORIGINALHEIGHT" val="110,2362"/>
-  <p:tag name="ORIGINALWIDTH" val="704,162"/>
-  <p:tag name="LATEXADDIN" val="\documentclass{article}&#10;\usepackage{amsmath}&#10;\usepackage{color}&#10;\pagestyle{empty}&#10;\begin{document}&#10;Interpolation&#10;\end{document}"/>
-  <p:tag name="IGUANATEXSIZE" val="20"/>
-  <p:tag name="IGUANATEXCURSOR" val="112"/>
-  <p:tag name="TRANSPARENCY" val="Wahr"/>
-  <p:tag name="FILENAME" val=""/>
-  <p:tag name="LATEXENGINEID" val="0"/>
-  <p:tag name="TEMPFOLDER" val="c:\temp\"/>
-  <p:tag name="LATEXFORMHEIGHT" val="312"/>
-  <p:tag name="LATEXFORMWIDTH" val="384"/>
-  <p:tag name="LATEXFORMWRAP" val="Wahr"/>
-  <p:tag name="BITMAPVECTOR" val="0"/>
-</p:tagLst>
-</file>
-
-<file path=ppt/tags/tag39.xml><?xml version="1.0" encoding="utf-8"?>
-<p:tagLst xmlns:a="http://schemas.openxmlformats.org/drawingml/2006/main" xmlns:r="http://schemas.openxmlformats.org/officeDocument/2006/relationships" xmlns:p="http://schemas.openxmlformats.org/presentationml/2006/main">
-  <p:tag name="OUTPUTDPI" val="1200"/>
-  <p:tag name="ORIGINALHEIGHT" val="90,73866"/>
-  <p:tag name="ORIGINALWIDTH" val="950,1313"/>
-  <p:tag name="LATEXADDIN" val="\documentclass{article}&#10;\usepackage{amsmath}&#10;\usepackage{color}&#10;\pagestyle{empty}&#10;\begin{document}&#10;%\color{white}&#10;Desired CoM and&#10;\end{document}"/>
-  <p:tag name="IGUANATEXSIZE" val="20"/>
-  <p:tag name="IGUANATEXCURSOR" val="129"/>
   <p:tag name="TRANSPARENCY" val="Wahr"/>
   <p:tag name="FILENAME" val=""/>
   <p:tag name="LATEXENGINEID" val="0"/>
@@ -11362,11 +11442,11 @@
 <file path=ppt/tags/tag40.xml><?xml version="1.0" encoding="utf-8"?>
 <p:tagLst xmlns:a="http://schemas.openxmlformats.org/drawingml/2006/main" xmlns:r="http://schemas.openxmlformats.org/officeDocument/2006/relationships" xmlns:p="http://schemas.openxmlformats.org/presentationml/2006/main">
   <p:tag name="OUTPUTDPI" val="1200"/>
-  <p:tag name="ORIGINALHEIGHT" val="86,23921"/>
-  <p:tag name="ORIGINALWIDTH" val="754,4056"/>
-  <p:tag name="LATEXADDIN" val="\documentclass{article}&#10;\usepackage{amsmath}&#10;\usepackage{color}&#10;\pagestyle{empty}&#10;\begin{document}&#10;%\color{white}&#10;Feet Positions&#10;\end{document}"/>
+  <p:tag name="ORIGINALHEIGHT" val="87,73905"/>
+  <p:tag name="ORIGINALWIDTH" val="441,6948"/>
+  <p:tag name="LATEXADDIN" val="\documentclass{article}&#10;\usepackage{amsmath}&#10;\usepackage{color}&#10;\pagestyle{empty}&#10;\begin{document}&#10;Forward&#10;\end{document}"/>
   <p:tag name="IGUANATEXSIZE" val="20"/>
-  <p:tag name="IGUANATEXCURSOR" val="128"/>
+  <p:tag name="IGUANATEXCURSOR" val="106"/>
   <p:tag name="TRANSPARENCY" val="Wahr"/>
   <p:tag name="FILENAME" val=""/>
   <p:tag name="LATEXENGINEID" val="0"/>
@@ -11379,6 +11459,44 @@
 </file>
 
 <file path=ppt/tags/tag41.xml><?xml version="1.0" encoding="utf-8"?>
+<p:tagLst xmlns:a="http://schemas.openxmlformats.org/drawingml/2006/main" xmlns:r="http://schemas.openxmlformats.org/officeDocument/2006/relationships" xmlns:p="http://schemas.openxmlformats.org/presentationml/2006/main">
+  <p:tag name="OUTPUTDPI" val="1200"/>
+  <p:tag name="ORIGINALHEIGHT" val="86,98914"/>
+  <p:tag name="ORIGINALWIDTH" val="601,4248"/>
+  <p:tag name="LATEXADDIN" val="\documentclass{article}&#10;\usepackage{amsmath}&#10;\usepackage{color}&#10;\pagestyle{empty}&#10;\begin{document}&#10;Kinematics&#10;\end{document}"/>
+  <p:tag name="IGUANATEXSIZE" val="20"/>
+  <p:tag name="IGUANATEXCURSOR" val="109"/>
+  <p:tag name="TRANSPARENCY" val="Wahr"/>
+  <p:tag name="FILENAME" val=""/>
+  <p:tag name="LATEXENGINEID" val="0"/>
+  <p:tag name="TEMPFOLDER" val="c:\temp\"/>
+  <p:tag name="LATEXFORMHEIGHT" val="312"/>
+  <p:tag name="LATEXFORMWIDTH" val="384"/>
+  <p:tag name="LATEXFORMWRAP" val="Wahr"/>
+  <p:tag name="BITMAPVECTOR" val="0"/>
+</p:tagLst>
+</file>
+
+<file path=ppt/tags/tag42.xml><?xml version="1.0" encoding="utf-8"?>
+<p:tagLst xmlns:a="http://schemas.openxmlformats.org/drawingml/2006/main" xmlns:r="http://schemas.openxmlformats.org/officeDocument/2006/relationships" xmlns:p="http://schemas.openxmlformats.org/presentationml/2006/main">
+  <p:tag name="OUTPUTDPI" val="1200"/>
+  <p:tag name="ORIGINALHEIGHT" val="110,2362"/>
+  <p:tag name="ORIGINALWIDTH" val="704,162"/>
+  <p:tag name="LATEXADDIN" val="\documentclass{article}&#10;\usepackage{amsmath}&#10;\usepackage{color}&#10;\pagestyle{empty}&#10;\begin{document}&#10;Interpolation&#10;\end{document}"/>
+  <p:tag name="IGUANATEXSIZE" val="20"/>
+  <p:tag name="IGUANATEXCURSOR" val="112"/>
+  <p:tag name="TRANSPARENCY" val="Wahr"/>
+  <p:tag name="FILENAME" val=""/>
+  <p:tag name="LATEXENGINEID" val="0"/>
+  <p:tag name="TEMPFOLDER" val="c:\temp\"/>
+  <p:tag name="LATEXFORMHEIGHT" val="312"/>
+  <p:tag name="LATEXFORMWIDTH" val="384"/>
+  <p:tag name="LATEXFORMWRAP" val="Wahr"/>
+  <p:tag name="BITMAPVECTOR" val="0"/>
+</p:tagLst>
+</file>
+
+<file path=ppt/tags/tag43.xml><?xml version="1.0" encoding="utf-8"?>
 <p:tagLst xmlns:a="http://schemas.openxmlformats.org/drawingml/2006/main" xmlns:r="http://schemas.openxmlformats.org/officeDocument/2006/relationships" xmlns:p="http://schemas.openxmlformats.org/presentationml/2006/main">
   <p:tag name="OUTPUTDPI" val="1200"/>
   <p:tag name="ORIGINALHEIGHT" val="90,73866"/>
@@ -11397,7 +11515,7 @@
 </p:tagLst>
 </file>
 
-<file path=ppt/tags/tag42.xml><?xml version="1.0" encoding="utf-8"?>
+<file path=ppt/tags/tag44.xml><?xml version="1.0" encoding="utf-8"?>
 <p:tagLst xmlns:a="http://schemas.openxmlformats.org/drawingml/2006/main" xmlns:r="http://schemas.openxmlformats.org/officeDocument/2006/relationships" xmlns:p="http://schemas.openxmlformats.org/presentationml/2006/main">
   <p:tag name="OUTPUTDPI" val="1200"/>
   <p:tag name="ORIGINALHEIGHT" val="86,23921"/>
@@ -11416,7 +11534,7 @@
 </p:tagLst>
 </file>
 
-<file path=ppt/tags/tag43.xml><?xml version="1.0" encoding="utf-8"?>
+<file path=ppt/tags/tag45.xml><?xml version="1.0" encoding="utf-8"?>
 <p:tagLst xmlns:a="http://schemas.openxmlformats.org/drawingml/2006/main" xmlns:r="http://schemas.openxmlformats.org/officeDocument/2006/relationships" xmlns:p="http://schemas.openxmlformats.org/presentationml/2006/main">
   <p:tag name="OUTPUTDPI" val="1200"/>
   <p:tag name="ORIGINALHEIGHT" val="90,73866"/>

</xml_diff>

<commit_message>
windows: disp map imgs
</commit_message>
<xml_diff>
--- a/windows/masters_thesis_imgs.pptx
+++ b/windows/masters_thesis_imgs.pptx
@@ -11,6 +11,8 @@
     <p:sldId id="258" r:id="rId5"/>
     <p:sldId id="261" r:id="rId6"/>
     <p:sldId id="260" r:id="rId7"/>
+    <p:sldId id="262" r:id="rId8"/>
+    <p:sldId id="263" r:id="rId9"/>
   </p:sldIdLst>
   <p:sldSz cx="12192000" cy="6858000"/>
   <p:notesSz cx="6858000" cy="9144000"/>
@@ -112,7 +114,7 @@
   <p:extLst>
     <p:ext uri="{EFAFB233-063F-42B5-8137-9DF3F51BA10A}">
       <p15:sldGuideLst xmlns:p15="http://schemas.microsoft.com/office/powerpoint/2012/main">
-        <p15:guide id="1" orient="horz" pos="2908" userDrawn="1">
+        <p15:guide id="1" orient="horz" pos="2886" userDrawn="1">
           <p15:clr>
             <a:srgbClr val="A4A3A4"/>
           </p15:clr>
@@ -277,7 +279,7 @@
           <a:p>
             <a:fld id="{E9193408-0E9E-4716-B232-5E8342DA9E48}" type="datetimeFigureOut">
               <a:rPr lang="en-GB" smtClean="0"/>
-              <a:t>30/05/2019</a:t>
+              <a:t>11/06/2019</a:t>
             </a:fld>
             <a:endParaRPr lang="en-GB"/>
           </a:p>
@@ -477,7 +479,7 @@
           <a:p>
             <a:fld id="{E9193408-0E9E-4716-B232-5E8342DA9E48}" type="datetimeFigureOut">
               <a:rPr lang="en-GB" smtClean="0"/>
-              <a:t>30/05/2019</a:t>
+              <a:t>11/06/2019</a:t>
             </a:fld>
             <a:endParaRPr lang="en-GB"/>
           </a:p>
@@ -687,7 +689,7 @@
           <a:p>
             <a:fld id="{E9193408-0E9E-4716-B232-5E8342DA9E48}" type="datetimeFigureOut">
               <a:rPr lang="en-GB" smtClean="0"/>
-              <a:t>30/05/2019</a:t>
+              <a:t>11/06/2019</a:t>
             </a:fld>
             <a:endParaRPr lang="en-GB"/>
           </a:p>
@@ -887,7 +889,7 @@
           <a:p>
             <a:fld id="{E9193408-0E9E-4716-B232-5E8342DA9E48}" type="datetimeFigureOut">
               <a:rPr lang="en-GB" smtClean="0"/>
-              <a:t>30/05/2019</a:t>
+              <a:t>11/06/2019</a:t>
             </a:fld>
             <a:endParaRPr lang="en-GB"/>
           </a:p>
@@ -1163,7 +1165,7 @@
           <a:p>
             <a:fld id="{E9193408-0E9E-4716-B232-5E8342DA9E48}" type="datetimeFigureOut">
               <a:rPr lang="en-GB" smtClean="0"/>
-              <a:t>30/05/2019</a:t>
+              <a:t>11/06/2019</a:t>
             </a:fld>
             <a:endParaRPr lang="en-GB"/>
           </a:p>
@@ -1431,7 +1433,7 @@
           <a:p>
             <a:fld id="{E9193408-0E9E-4716-B232-5E8342DA9E48}" type="datetimeFigureOut">
               <a:rPr lang="en-GB" smtClean="0"/>
-              <a:t>30/05/2019</a:t>
+              <a:t>11/06/2019</a:t>
             </a:fld>
             <a:endParaRPr lang="en-GB"/>
           </a:p>
@@ -1846,7 +1848,7 @@
           <a:p>
             <a:fld id="{E9193408-0E9E-4716-B232-5E8342DA9E48}" type="datetimeFigureOut">
               <a:rPr lang="en-GB" smtClean="0"/>
-              <a:t>30/05/2019</a:t>
+              <a:t>11/06/2019</a:t>
             </a:fld>
             <a:endParaRPr lang="en-GB"/>
           </a:p>
@@ -1988,7 +1990,7 @@
           <a:p>
             <a:fld id="{E9193408-0E9E-4716-B232-5E8342DA9E48}" type="datetimeFigureOut">
               <a:rPr lang="en-GB" smtClean="0"/>
-              <a:t>30/05/2019</a:t>
+              <a:t>11/06/2019</a:t>
             </a:fld>
             <a:endParaRPr lang="en-GB"/>
           </a:p>
@@ -2101,7 +2103,7 @@
           <a:p>
             <a:fld id="{E9193408-0E9E-4716-B232-5E8342DA9E48}" type="datetimeFigureOut">
               <a:rPr lang="en-GB" smtClean="0"/>
-              <a:t>30/05/2019</a:t>
+              <a:t>11/06/2019</a:t>
             </a:fld>
             <a:endParaRPr lang="en-GB"/>
           </a:p>
@@ -2414,7 +2416,7 @@
           <a:p>
             <a:fld id="{E9193408-0E9E-4716-B232-5E8342DA9E48}" type="datetimeFigureOut">
               <a:rPr lang="en-GB" smtClean="0"/>
-              <a:t>30/05/2019</a:t>
+              <a:t>11/06/2019</a:t>
             </a:fld>
             <a:endParaRPr lang="en-GB"/>
           </a:p>
@@ -2703,7 +2705,7 @@
           <a:p>
             <a:fld id="{E9193408-0E9E-4716-B232-5E8342DA9E48}" type="datetimeFigureOut">
               <a:rPr lang="en-GB" smtClean="0"/>
-              <a:t>30/05/2019</a:t>
+              <a:t>11/06/2019</a:t>
             </a:fld>
             <a:endParaRPr lang="en-GB"/>
           </a:p>
@@ -2946,7 +2948,7 @@
           <a:p>
             <a:fld id="{E9193408-0E9E-4716-B232-5E8342DA9E48}" type="datetimeFigureOut">
               <a:rPr lang="en-GB" smtClean="0"/>
-              <a:t>30/05/2019</a:t>
+              <a:t>11/06/2019</a:t>
             </a:fld>
             <a:endParaRPr lang="en-GB"/>
           </a:p>
@@ -12097,12 +12099,12 @@
             </p:cNvPicPr>
             <p:nvPr>
               <p:custDataLst>
-                <p:tags r:id="rId5"/>
+                <p:tags r:id="rId4"/>
               </p:custDataLst>
             </p:nvPr>
           </p:nvPicPr>
           <p:blipFill>
-            <a:blip r:embed="rId13">
+            <a:blip r:embed="rId11">
               <a:extLst>
                 <a:ext uri="{28A0092B-C50C-407E-A947-70E740481C1C}">
                   <a14:useLocalDpi xmlns:a14="http://schemas.microsoft.com/office/drawing/2010/main" val="0"/>
@@ -12137,12 +12139,12 @@
             </p:cNvPicPr>
             <p:nvPr>
               <p:custDataLst>
-                <p:tags r:id="rId6"/>
+                <p:tags r:id="rId5"/>
               </p:custDataLst>
             </p:nvPr>
           </p:nvPicPr>
           <p:blipFill>
-            <a:blip r:embed="rId14">
+            <a:blip r:embed="rId12">
               <a:extLst>
                 <a:ext uri="{28A0092B-C50C-407E-A947-70E740481C1C}">
                   <a14:useLocalDpi xmlns:a14="http://schemas.microsoft.com/office/drawing/2010/main" val="0"/>
@@ -12571,12 +12573,12 @@
             </p:cNvPicPr>
             <p:nvPr>
               <p:custDataLst>
-                <p:tags r:id="rId7"/>
+                <p:tags r:id="rId6"/>
               </p:custDataLst>
             </p:nvPr>
           </p:nvPicPr>
           <p:blipFill>
-            <a:blip r:embed="rId15">
+            <a:blip r:embed="rId13">
               <a:extLst>
                 <a:ext uri="{28A0092B-C50C-407E-A947-70E740481C1C}">
                   <a14:useLocalDpi xmlns:a14="http://schemas.microsoft.com/office/drawing/2010/main" val="0"/>
@@ -12611,12 +12613,12 @@
             </p:cNvPicPr>
             <p:nvPr>
               <p:custDataLst>
-                <p:tags r:id="rId8"/>
+                <p:tags r:id="rId7"/>
               </p:custDataLst>
             </p:nvPr>
           </p:nvPicPr>
           <p:blipFill>
-            <a:blip r:embed="rId16">
+            <a:blip r:embed="rId14">
               <a:extLst>
                 <a:ext uri="{28A0092B-C50C-407E-A947-70E740481C1C}">
                   <a14:useLocalDpi xmlns:a14="http://schemas.microsoft.com/office/drawing/2010/main" val="0"/>
@@ -12651,12 +12653,12 @@
             </p:cNvPicPr>
             <p:nvPr>
               <p:custDataLst>
-                <p:tags r:id="rId9"/>
+                <p:tags r:id="rId8"/>
               </p:custDataLst>
             </p:nvPr>
           </p:nvPicPr>
           <p:blipFill>
-            <a:blip r:embed="rId17">
+            <a:blip r:embed="rId15">
               <a:extLst>
                 <a:ext uri="{28A0092B-C50C-407E-A947-70E740481C1C}">
                   <a14:useLocalDpi xmlns:a14="http://schemas.microsoft.com/office/drawing/2010/main" val="0"/>
@@ -12671,46 +12673,6 @@
             <a:xfrm>
               <a:off x="577798" y="5748275"/>
               <a:ext cx="591974" cy="392288"/>
-            </a:xfrm>
-            <a:prstGeom prst="rect">
-              <a:avLst/>
-            </a:prstGeom>
-          </p:spPr>
-        </p:pic>
-        <p:pic>
-          <p:nvPicPr>
-            <p:cNvPr id="72" name="Grafik 71">
-              <a:extLst>
-                <a:ext uri="{FF2B5EF4-FFF2-40B4-BE49-F238E27FC236}">
-                  <a16:creationId xmlns:a16="http://schemas.microsoft.com/office/drawing/2014/main" id="{6FF618E1-C8AD-4133-A18B-FBC7AFF8DA50}"/>
-                </a:ext>
-              </a:extLst>
-            </p:cNvPr>
-            <p:cNvPicPr>
-              <a:picLocks noChangeAspect="1"/>
-            </p:cNvPicPr>
-            <p:nvPr>
-              <p:custDataLst>
-                <p:tags r:id="rId10"/>
-              </p:custDataLst>
-            </p:nvPr>
-          </p:nvPicPr>
-          <p:blipFill>
-            <a:blip r:embed="rId18">
-              <a:extLst>
-                <a:ext uri="{28A0092B-C50C-407E-A947-70E740481C1C}">
-                  <a14:useLocalDpi xmlns:a14="http://schemas.microsoft.com/office/drawing/2010/main" val="0"/>
-                </a:ext>
-              </a:extLst>
-            </a:blip>
-            <a:stretch>
-              <a:fillRect/>
-            </a:stretch>
-          </p:blipFill>
-          <p:spPr>
-            <a:xfrm>
-              <a:off x="2311163" y="5770156"/>
-              <a:ext cx="808185" cy="295187"/>
             </a:xfrm>
             <a:prstGeom prst="rect">
               <a:avLst/>
@@ -12775,12 +12737,12 @@
             </p:cNvPicPr>
             <p:nvPr>
               <p:custDataLst>
-                <p:tags r:id="rId11"/>
+                <p:tags r:id="rId9"/>
               </p:custDataLst>
             </p:nvPr>
           </p:nvPicPr>
           <p:blipFill>
-            <a:blip r:embed="rId19">
+            <a:blip r:embed="rId16">
               <a:extLst>
                 <a:ext uri="{28A0092B-C50C-407E-A947-70E740481C1C}">
                   <a14:useLocalDpi xmlns:a14="http://schemas.microsoft.com/office/drawing/2010/main" val="0"/>
@@ -12804,10 +12766,10 @@
       </p:grpSp>
       <p:grpSp>
         <p:nvGrpSpPr>
-          <p:cNvPr id="32" name="Gruppieren 31">
+          <p:cNvPr id="2" name="Gruppieren 1">
             <a:extLst>
               <a:ext uri="{FF2B5EF4-FFF2-40B4-BE49-F238E27FC236}">
-                <a16:creationId xmlns:a16="http://schemas.microsoft.com/office/drawing/2014/main" id="{00A3EBDB-B471-4E4C-A231-0F77F2A3C7D6}"/>
+                <a16:creationId xmlns:a16="http://schemas.microsoft.com/office/drawing/2014/main" id="{17F45F4F-F8FA-42EF-86A0-42102D057447}"/>
               </a:ext>
             </a:extLst>
           </p:cNvPr>
@@ -12816,10 +12778,10 @@
         </p:nvGrpSpPr>
         <p:grpSpPr>
           <a:xfrm>
-            <a:off x="2575314" y="905893"/>
-            <a:ext cx="8964405" cy="1865268"/>
-            <a:chOff x="2575314" y="905893"/>
-            <a:chExt cx="8964405" cy="1865268"/>
+            <a:off x="4896124" y="1118584"/>
+            <a:ext cx="5700018" cy="1428473"/>
+            <a:chOff x="4896124" y="1118584"/>
+            <a:chExt cx="5700018" cy="1428473"/>
           </a:xfrm>
         </p:grpSpPr>
         <p:grpSp>
@@ -13015,10 +12977,10 @@
         </p:grpSp>
         <p:pic>
           <p:nvPicPr>
-            <p:cNvPr id="9" name="Grafik 8">
+            <p:cNvPr id="16" name="Grafik 15">
               <a:extLst>
                 <a:ext uri="{FF2B5EF4-FFF2-40B4-BE49-F238E27FC236}">
-                  <a16:creationId xmlns:a16="http://schemas.microsoft.com/office/drawing/2014/main" id="{A7C6B47D-9F34-408B-AB44-FFEAFBCD4B1B}"/>
+                  <a16:creationId xmlns:a16="http://schemas.microsoft.com/office/drawing/2014/main" id="{07D0CF08-889E-450B-8C12-6FEC3878E3F7}"/>
                 </a:ext>
               </a:extLst>
             </p:cNvPr>
@@ -13032,7 +12994,7 @@
             </p:nvPr>
           </p:nvPicPr>
           <p:blipFill>
-            <a:blip r:embed="rId20">
+            <a:blip r:embed="rId17">
               <a:extLst>
                 <a:ext uri="{28A0092B-C50C-407E-A947-70E740481C1C}">
                   <a14:useLocalDpi xmlns:a14="http://schemas.microsoft.com/office/drawing/2010/main" val="0"/>
@@ -13045,8 +13007,8 @@
           </p:blipFill>
           <p:spPr>
             <a:xfrm>
-              <a:off x="6529441" y="2387798"/>
-              <a:ext cx="3100135" cy="383363"/>
+              <a:off x="7040990" y="1118584"/>
+              <a:ext cx="1321485" cy="222793"/>
             </a:xfrm>
             <a:prstGeom prst="rect">
               <a:avLst/>
@@ -13055,10 +13017,10 @@
         </p:pic>
         <p:pic>
           <p:nvPicPr>
-            <p:cNvPr id="16" name="Grafik 15">
+            <p:cNvPr id="14" name="Grafik 13">
               <a:extLst>
                 <a:ext uri="{FF2B5EF4-FFF2-40B4-BE49-F238E27FC236}">
-                  <a16:creationId xmlns:a16="http://schemas.microsoft.com/office/drawing/2014/main" id="{07D0CF08-889E-450B-8C12-6FEC3878E3F7}"/>
+                  <a16:creationId xmlns:a16="http://schemas.microsoft.com/office/drawing/2014/main" id="{D962F7C1-3BED-4BE9-9DA8-A4A0D5F7529D}"/>
                 </a:ext>
               </a:extLst>
             </p:cNvPr>
@@ -13072,7 +13034,7 @@
             </p:nvPr>
           </p:nvPicPr>
           <p:blipFill>
-            <a:blip r:embed="rId21">
+            <a:blip r:embed="rId18">
               <a:extLst>
                 <a:ext uri="{28A0092B-C50C-407E-A947-70E740481C1C}">
                   <a14:useLocalDpi xmlns:a14="http://schemas.microsoft.com/office/drawing/2010/main" val="0"/>
@@ -13085,48 +13047,8 @@
           </p:blipFill>
           <p:spPr>
             <a:xfrm>
-              <a:off x="6502717" y="905893"/>
-              <a:ext cx="2268545" cy="382460"/>
-            </a:xfrm>
-            <a:prstGeom prst="rect">
-              <a:avLst/>
-            </a:prstGeom>
-          </p:spPr>
-        </p:pic>
-        <p:pic>
-          <p:nvPicPr>
-            <p:cNvPr id="14" name="Grafik 13">
-              <a:extLst>
-                <a:ext uri="{FF2B5EF4-FFF2-40B4-BE49-F238E27FC236}">
-                  <a16:creationId xmlns:a16="http://schemas.microsoft.com/office/drawing/2014/main" id="{D962F7C1-3BED-4BE9-9DA8-A4A0D5F7529D}"/>
-                </a:ext>
-              </a:extLst>
-            </p:cNvPr>
-            <p:cNvPicPr>
-              <a:picLocks noChangeAspect="1"/>
-            </p:cNvPicPr>
-            <p:nvPr>
-              <p:custDataLst>
-                <p:tags r:id="rId3"/>
-              </p:custDataLst>
-            </p:nvPr>
-          </p:nvPicPr>
-          <p:blipFill>
-            <a:blip r:embed="rId22">
-              <a:extLst>
-                <a:ext uri="{28A0092B-C50C-407E-A947-70E740481C1C}">
-                  <a14:useLocalDpi xmlns:a14="http://schemas.microsoft.com/office/drawing/2010/main" val="0"/>
-                </a:ext>
-              </a:extLst>
-            </a:blip>
-            <a:stretch>
-              <a:fillRect/>
-            </a:stretch>
-          </p:blipFill>
-          <p:spPr>
-            <a:xfrm>
-              <a:off x="9383706" y="1725169"/>
-              <a:ext cx="2156013" cy="305454"/>
+              <a:off x="9340210" y="1811244"/>
+              <a:ext cx="1255932" cy="177935"/>
             </a:xfrm>
             <a:prstGeom prst="rect">
               <a:avLst/>
@@ -14768,12 +14690,12 @@
             </p:cNvPicPr>
             <p:nvPr>
               <p:custDataLst>
-                <p:tags r:id="rId4"/>
+                <p:tags r:id="rId3"/>
               </p:custDataLst>
             </p:nvPr>
           </p:nvPicPr>
           <p:blipFill>
-            <a:blip r:embed="rId23">
+            <a:blip r:embed="rId19">
               <a:extLst>
                 <a:ext uri="{28A0092B-C50C-407E-A947-70E740481C1C}">
                   <a14:useLocalDpi xmlns:a14="http://schemas.microsoft.com/office/drawing/2010/main" val="0"/>
@@ -14786,8 +14708,8 @@
           </p:blipFill>
           <p:spPr>
             <a:xfrm>
-              <a:off x="2575314" y="2085187"/>
-              <a:ext cx="2953967" cy="385026"/>
+              <a:off x="4896124" y="2322770"/>
+              <a:ext cx="1720761" cy="224287"/>
             </a:xfrm>
             <a:prstGeom prst="rect">
               <a:avLst/>
@@ -16423,6 +16345,1978 @@
     <p:extLst>
       <p:ext uri="{BB962C8B-B14F-4D97-AF65-F5344CB8AC3E}">
         <p14:creationId xmlns:p14="http://schemas.microsoft.com/office/powerpoint/2010/main" val="2434083157"/>
+      </p:ext>
+    </p:extLst>
+  </p:cSld>
+  <p:clrMapOvr>
+    <a:masterClrMapping/>
+  </p:clrMapOvr>
+</p:sld>
+</file>
+
+<file path=ppt/slides/slide7.xml><?xml version="1.0" encoding="utf-8"?>
+<p:sld xmlns:a="http://schemas.openxmlformats.org/drawingml/2006/main" xmlns:r="http://schemas.openxmlformats.org/officeDocument/2006/relationships" xmlns:p="http://schemas.openxmlformats.org/presentationml/2006/main">
+  <p:cSld>
+    <p:spTree>
+      <p:nvGrpSpPr>
+        <p:cNvPr id="1" name=""/>
+        <p:cNvGrpSpPr/>
+        <p:nvPr/>
+      </p:nvGrpSpPr>
+      <p:grpSpPr>
+        <a:xfrm>
+          <a:off x="0" y="0"/>
+          <a:ext cx="0" cy="0"/>
+          <a:chOff x="0" y="0"/>
+          <a:chExt cx="0" cy="0"/>
+        </a:xfrm>
+      </p:grpSpPr>
+      <p:sp>
+        <p:nvSpPr>
+          <p:cNvPr id="4" name="Textfeld 3">
+            <a:extLst>
+              <a:ext uri="{FF2B5EF4-FFF2-40B4-BE49-F238E27FC236}">
+                <a16:creationId xmlns:a16="http://schemas.microsoft.com/office/drawing/2014/main" id="{058C6F85-BBC9-4CAE-95D4-0CC8587FB1D8}"/>
+              </a:ext>
+            </a:extLst>
+          </p:cNvPr>
+          <p:cNvSpPr txBox="1"/>
+          <p:nvPr/>
+        </p:nvSpPr>
+        <p:spPr>
+          <a:xfrm>
+            <a:off x="76199" y="66675"/>
+            <a:ext cx="2088017" cy="369332"/>
+          </a:xfrm>
+          <a:prstGeom prst="rect">
+            <a:avLst/>
+          </a:prstGeom>
+          <a:noFill/>
+        </p:spPr>
+        <p:txBody>
+          <a:bodyPr wrap="square" rtlCol="0">
+            <a:spAutoFit/>
+          </a:bodyPr>
+          <a:lstStyle/>
+          <a:p>
+            <a:r>
+              <a:rPr lang="de-DE" dirty="0"/>
+              <a:t>Zero Moment Point</a:t>
+            </a:r>
+            <a:endParaRPr lang="en-GB" dirty="0"/>
+          </a:p>
+        </p:txBody>
+      </p:sp>
+    </p:spTree>
+    <p:extLst>
+      <p:ext uri="{BB962C8B-B14F-4D97-AF65-F5344CB8AC3E}">
+        <p14:creationId xmlns:p14="http://schemas.microsoft.com/office/powerpoint/2010/main" val="3922077207"/>
+      </p:ext>
+    </p:extLst>
+  </p:cSld>
+  <p:clrMapOvr>
+    <a:masterClrMapping/>
+  </p:clrMapOvr>
+</p:sld>
+</file>
+
+<file path=ppt/slides/slide8.xml><?xml version="1.0" encoding="utf-8"?>
+<p:sld xmlns:a="http://schemas.openxmlformats.org/drawingml/2006/main" xmlns:r="http://schemas.openxmlformats.org/officeDocument/2006/relationships" xmlns:p="http://schemas.openxmlformats.org/presentationml/2006/main">
+  <p:cSld>
+    <p:spTree>
+      <p:nvGrpSpPr>
+        <p:cNvPr id="1" name=""/>
+        <p:cNvGrpSpPr/>
+        <p:nvPr/>
+      </p:nvGrpSpPr>
+      <p:grpSpPr>
+        <a:xfrm>
+          <a:off x="0" y="0"/>
+          <a:ext cx="0" cy="0"/>
+          <a:chOff x="0" y="0"/>
+          <a:chExt cx="0" cy="0"/>
+        </a:xfrm>
+      </p:grpSpPr>
+      <p:pic>
+        <p:nvPicPr>
+          <p:cNvPr id="28" name="Grafik 27" descr="Ein Bild, das Foto, Boden, sitzend enthält.&#10;&#10;Automatisch generierte Beschreibung">
+            <a:extLst>
+              <a:ext uri="{FF2B5EF4-FFF2-40B4-BE49-F238E27FC236}">
+                <a16:creationId xmlns:a16="http://schemas.microsoft.com/office/drawing/2014/main" id="{4BFEB59D-944B-4E5F-9F21-9004F2EE9077}"/>
+              </a:ext>
+            </a:extLst>
+          </p:cNvPr>
+          <p:cNvPicPr>
+            <a:picLocks noChangeAspect="1"/>
+          </p:cNvPicPr>
+          <p:nvPr/>
+        </p:nvPicPr>
+        <p:blipFill>
+          <a:blip r:embed="rId13">
+            <a:extLst>
+              <a:ext uri="{28A0092B-C50C-407E-A947-70E740481C1C}">
+                <a14:useLocalDpi xmlns:a14="http://schemas.microsoft.com/office/drawing/2010/main" val="0"/>
+              </a:ext>
+            </a:extLst>
+          </a:blip>
+          <a:stretch>
+            <a:fillRect/>
+          </a:stretch>
+        </p:blipFill>
+        <p:spPr>
+          <a:xfrm>
+            <a:off x="-5125355" y="8458200"/>
+            <a:ext cx="6096000" cy="4572000"/>
+          </a:xfrm>
+          <a:prstGeom prst="rect">
+            <a:avLst/>
+          </a:prstGeom>
+        </p:spPr>
+      </p:pic>
+      <p:pic>
+        <p:nvPicPr>
+          <p:cNvPr id="35" name="Grafik 34" descr="Ein Bild, das sitzend, Foto enthält.&#10;&#10;Automatisch generierte Beschreibung">
+            <a:extLst>
+              <a:ext uri="{FF2B5EF4-FFF2-40B4-BE49-F238E27FC236}">
+                <a16:creationId xmlns:a16="http://schemas.microsoft.com/office/drawing/2014/main" id="{EBA20801-66C5-4B6E-A2E0-8C1AC252E6C5}"/>
+              </a:ext>
+            </a:extLst>
+          </p:cNvPr>
+          <p:cNvPicPr>
+            <a:picLocks noChangeAspect="1"/>
+          </p:cNvPicPr>
+          <p:nvPr/>
+        </p:nvPicPr>
+        <p:blipFill>
+          <a:blip r:embed="rId14">
+            <a:extLst>
+              <a:ext uri="{28A0092B-C50C-407E-A947-70E740481C1C}">
+                <a14:useLocalDpi xmlns:a14="http://schemas.microsoft.com/office/drawing/2010/main" val="0"/>
+              </a:ext>
+            </a:extLst>
+          </a:blip>
+          <a:stretch>
+            <a:fillRect/>
+          </a:stretch>
+        </p:blipFill>
+        <p:spPr>
+          <a:xfrm>
+            <a:off x="1361019" y="8458200"/>
+            <a:ext cx="6096000" cy="4572000"/>
+          </a:xfrm>
+          <a:prstGeom prst="rect">
+            <a:avLst/>
+          </a:prstGeom>
+        </p:spPr>
+      </p:pic>
+      <p:pic>
+        <p:nvPicPr>
+          <p:cNvPr id="37" name="Grafik 36">
+            <a:extLst>
+              <a:ext uri="{FF2B5EF4-FFF2-40B4-BE49-F238E27FC236}">
+                <a16:creationId xmlns:a16="http://schemas.microsoft.com/office/drawing/2014/main" id="{24A1620A-6317-43B3-9215-8F173F26EF8C}"/>
+              </a:ext>
+            </a:extLst>
+          </p:cNvPr>
+          <p:cNvPicPr>
+            <a:picLocks noChangeAspect="1"/>
+          </p:cNvPicPr>
+          <p:nvPr/>
+        </p:nvPicPr>
+        <p:blipFill>
+          <a:blip r:embed="rId15">
+            <a:extLst>
+              <a:ext uri="{28A0092B-C50C-407E-A947-70E740481C1C}">
+                <a14:useLocalDpi xmlns:a14="http://schemas.microsoft.com/office/drawing/2010/main" val="0"/>
+              </a:ext>
+            </a:extLst>
+          </a:blip>
+          <a:stretch>
+            <a:fillRect/>
+          </a:stretch>
+        </p:blipFill>
+        <p:spPr>
+          <a:xfrm>
+            <a:off x="7847393" y="8458200"/>
+            <a:ext cx="6096000" cy="4572000"/>
+          </a:xfrm>
+          <a:prstGeom prst="rect">
+            <a:avLst/>
+          </a:prstGeom>
+        </p:spPr>
+      </p:pic>
+      <p:grpSp>
+        <p:nvGrpSpPr>
+          <p:cNvPr id="53" name="Gruppieren 52">
+            <a:extLst>
+              <a:ext uri="{FF2B5EF4-FFF2-40B4-BE49-F238E27FC236}">
+                <a16:creationId xmlns:a16="http://schemas.microsoft.com/office/drawing/2014/main" id="{CFDC3D16-5F0D-4154-BDDB-5EE207B9B3D3}"/>
+              </a:ext>
+            </a:extLst>
+          </p:cNvPr>
+          <p:cNvGrpSpPr/>
+          <p:nvPr/>
+        </p:nvGrpSpPr>
+        <p:grpSpPr>
+          <a:xfrm>
+            <a:off x="-5125355" y="-2742260"/>
+            <a:ext cx="19116418" cy="5019467"/>
+            <a:chOff x="-9978709" y="-1194814"/>
+            <a:chExt cx="19116418" cy="5019467"/>
+          </a:xfrm>
+        </p:grpSpPr>
+        <p:grpSp>
+          <p:nvGrpSpPr>
+            <p:cNvPr id="18" name="Gruppieren 17">
+              <a:extLst>
+                <a:ext uri="{FF2B5EF4-FFF2-40B4-BE49-F238E27FC236}">
+                  <a16:creationId xmlns:a16="http://schemas.microsoft.com/office/drawing/2014/main" id="{62FB9D64-5D0F-4AC3-90AA-39D2B78FEB94}"/>
+                </a:ext>
+              </a:extLst>
+            </p:cNvPr>
+            <p:cNvGrpSpPr/>
+            <p:nvPr/>
+          </p:nvGrpSpPr>
+          <p:grpSpPr>
+            <a:xfrm>
+              <a:off x="-9978709" y="-531695"/>
+              <a:ext cx="5808466" cy="4356348"/>
+              <a:chOff x="-3247471" y="942999"/>
+              <a:chExt cx="5808466" cy="4356348"/>
+            </a:xfrm>
+          </p:grpSpPr>
+          <p:pic>
+            <p:nvPicPr>
+              <p:cNvPr id="3" name="Grafik 2" descr="Ein Bild, das orange, Himmel enthält.&#10;&#10;Automatisch generierte Beschreibung">
+                <a:extLst>
+                  <a:ext uri="{FF2B5EF4-FFF2-40B4-BE49-F238E27FC236}">
+                    <a16:creationId xmlns:a16="http://schemas.microsoft.com/office/drawing/2014/main" id="{93016A23-2B1F-499C-A062-DF2F9CD19448}"/>
+                  </a:ext>
+                </a:extLst>
+              </p:cNvPr>
+              <p:cNvPicPr>
+                <a:picLocks noChangeAspect="1"/>
+              </p:cNvPicPr>
+              <p:nvPr/>
+            </p:nvPicPr>
+            <p:blipFill>
+              <a:blip r:embed="rId16">
+                <a:extLst>
+                  <a:ext uri="{28A0092B-C50C-407E-A947-70E740481C1C}">
+                    <a14:useLocalDpi xmlns:a14="http://schemas.microsoft.com/office/drawing/2010/main" val="0"/>
+                  </a:ext>
+                </a:extLst>
+              </a:blip>
+              <a:stretch>
+                <a:fillRect/>
+              </a:stretch>
+            </p:blipFill>
+            <p:spPr>
+              <a:xfrm>
+                <a:off x="-3247471" y="942999"/>
+                <a:ext cx="3872311" cy="2904233"/>
+              </a:xfrm>
+              <a:prstGeom prst="rect">
+                <a:avLst/>
+              </a:prstGeom>
+            </p:spPr>
+          </p:pic>
+          <p:pic>
+            <p:nvPicPr>
+              <p:cNvPr id="6" name="Grafik 5" descr="Ein Bild, das orange enthält.&#10;&#10;Automatisch generierte Beschreibung">
+                <a:extLst>
+                  <a:ext uri="{FF2B5EF4-FFF2-40B4-BE49-F238E27FC236}">
+                    <a16:creationId xmlns:a16="http://schemas.microsoft.com/office/drawing/2014/main" id="{2B1813E7-8D2F-44A6-B642-A32D73716C33}"/>
+                  </a:ext>
+                </a:extLst>
+              </p:cNvPr>
+              <p:cNvPicPr>
+                <a:picLocks noChangeAspect="1"/>
+              </p:cNvPicPr>
+              <p:nvPr/>
+            </p:nvPicPr>
+            <p:blipFill>
+              <a:blip r:embed="rId17">
+                <a:extLst>
+                  <a:ext uri="{28A0092B-C50C-407E-A947-70E740481C1C}">
+                    <a14:useLocalDpi xmlns:a14="http://schemas.microsoft.com/office/drawing/2010/main" val="0"/>
+                  </a:ext>
+                </a:extLst>
+              </a:blip>
+              <a:stretch>
+                <a:fillRect/>
+              </a:stretch>
+            </p:blipFill>
+            <p:spPr>
+              <a:xfrm>
+                <a:off x="-1311316" y="2395114"/>
+                <a:ext cx="3872311" cy="2904233"/>
+              </a:xfrm>
+              <a:prstGeom prst="rect">
+                <a:avLst/>
+              </a:prstGeom>
+            </p:spPr>
+          </p:pic>
+        </p:grpSp>
+        <p:grpSp>
+          <p:nvGrpSpPr>
+            <p:cNvPr id="19" name="Gruppieren 18">
+              <a:extLst>
+                <a:ext uri="{FF2B5EF4-FFF2-40B4-BE49-F238E27FC236}">
+                  <a16:creationId xmlns:a16="http://schemas.microsoft.com/office/drawing/2014/main" id="{16ED38AC-BB82-4940-8F36-140C36AB1B85}"/>
+                </a:ext>
+              </a:extLst>
+            </p:cNvPr>
+            <p:cNvGrpSpPr/>
+            <p:nvPr/>
+          </p:nvGrpSpPr>
+          <p:grpSpPr>
+            <a:xfrm>
+              <a:off x="-3332582" y="-531696"/>
+              <a:ext cx="5808466" cy="4356349"/>
+              <a:chOff x="3000929" y="930168"/>
+              <a:chExt cx="5808466" cy="4356349"/>
+            </a:xfrm>
+          </p:grpSpPr>
+          <p:pic>
+            <p:nvPicPr>
+              <p:cNvPr id="8" name="Grafik 7" descr="Ein Bild, das Straße, draußen, Himmel enthält.&#10;&#10;Automatisch generierte Beschreibung">
+                <a:extLst>
+                  <a:ext uri="{FF2B5EF4-FFF2-40B4-BE49-F238E27FC236}">
+                    <a16:creationId xmlns:a16="http://schemas.microsoft.com/office/drawing/2014/main" id="{E1E14157-297C-47BB-ADD7-4B0BD45C8282}"/>
+                  </a:ext>
+                </a:extLst>
+              </p:cNvPr>
+              <p:cNvPicPr>
+                <a:picLocks noChangeAspect="1"/>
+              </p:cNvPicPr>
+              <p:nvPr/>
+            </p:nvPicPr>
+            <p:blipFill>
+              <a:blip r:embed="rId18">
+                <a:extLst>
+                  <a:ext uri="{28A0092B-C50C-407E-A947-70E740481C1C}">
+                    <a14:useLocalDpi xmlns:a14="http://schemas.microsoft.com/office/drawing/2010/main" val="0"/>
+                  </a:ext>
+                </a:extLst>
+              </a:blip>
+              <a:stretch>
+                <a:fillRect/>
+              </a:stretch>
+            </p:blipFill>
+            <p:spPr>
+              <a:xfrm>
+                <a:off x="3000929" y="930168"/>
+                <a:ext cx="3872311" cy="2904233"/>
+              </a:xfrm>
+              <a:prstGeom prst="rect">
+                <a:avLst/>
+              </a:prstGeom>
+            </p:spPr>
+          </p:pic>
+          <p:pic>
+            <p:nvPicPr>
+              <p:cNvPr id="12" name="Grafik 11" descr="Ein Bild, das Himmel, Straße, draußen, Kraftrad enthält.&#10;&#10;Automatisch generierte Beschreibung">
+                <a:extLst>
+                  <a:ext uri="{FF2B5EF4-FFF2-40B4-BE49-F238E27FC236}">
+                    <a16:creationId xmlns:a16="http://schemas.microsoft.com/office/drawing/2014/main" id="{576EFE56-556D-4672-B5E9-90BDCFB61458}"/>
+                  </a:ext>
+                </a:extLst>
+              </p:cNvPr>
+              <p:cNvPicPr>
+                <a:picLocks noChangeAspect="1"/>
+              </p:cNvPicPr>
+              <p:nvPr/>
+            </p:nvPicPr>
+            <p:blipFill>
+              <a:blip r:embed="rId19">
+                <a:extLst>
+                  <a:ext uri="{28A0092B-C50C-407E-A947-70E740481C1C}">
+                    <a14:useLocalDpi xmlns:a14="http://schemas.microsoft.com/office/drawing/2010/main" val="0"/>
+                  </a:ext>
+                </a:extLst>
+              </a:blip>
+              <a:stretch>
+                <a:fillRect/>
+              </a:stretch>
+            </p:blipFill>
+            <p:spPr>
+              <a:xfrm>
+                <a:off x="4937084" y="2382284"/>
+                <a:ext cx="3872311" cy="2904233"/>
+              </a:xfrm>
+              <a:prstGeom prst="rect">
+                <a:avLst/>
+              </a:prstGeom>
+            </p:spPr>
+          </p:pic>
+        </p:grpSp>
+        <p:grpSp>
+          <p:nvGrpSpPr>
+            <p:cNvPr id="20" name="Gruppieren 19">
+              <a:extLst>
+                <a:ext uri="{FF2B5EF4-FFF2-40B4-BE49-F238E27FC236}">
+                  <a16:creationId xmlns:a16="http://schemas.microsoft.com/office/drawing/2014/main" id="{348D24EC-205D-49EE-9B0A-B15FAF9A70B9}"/>
+                </a:ext>
+              </a:extLst>
+            </p:cNvPr>
+            <p:cNvGrpSpPr/>
+            <p:nvPr/>
+          </p:nvGrpSpPr>
+          <p:grpSpPr>
+            <a:xfrm>
+              <a:off x="3329243" y="-510304"/>
+              <a:ext cx="5808466" cy="4334957"/>
+              <a:chOff x="9205635" y="951559"/>
+              <a:chExt cx="5808466" cy="4334957"/>
+            </a:xfrm>
+          </p:grpSpPr>
+          <p:pic>
+            <p:nvPicPr>
+              <p:cNvPr id="14" name="Grafik 13">
+                <a:extLst>
+                  <a:ext uri="{FF2B5EF4-FFF2-40B4-BE49-F238E27FC236}">
+                    <a16:creationId xmlns:a16="http://schemas.microsoft.com/office/drawing/2014/main" id="{74FC11F3-3B81-4B43-828B-13EEC8C19CCA}"/>
+                  </a:ext>
+                </a:extLst>
+              </p:cNvPr>
+              <p:cNvPicPr>
+                <a:picLocks noChangeAspect="1"/>
+              </p:cNvPicPr>
+              <p:nvPr/>
+            </p:nvPicPr>
+            <p:blipFill>
+              <a:blip r:embed="rId20">
+                <a:extLst>
+                  <a:ext uri="{28A0092B-C50C-407E-A947-70E740481C1C}">
+                    <a14:useLocalDpi xmlns:a14="http://schemas.microsoft.com/office/drawing/2010/main" val="0"/>
+                  </a:ext>
+                </a:extLst>
+              </a:blip>
+              <a:stretch>
+                <a:fillRect/>
+              </a:stretch>
+            </p:blipFill>
+            <p:spPr>
+              <a:xfrm>
+                <a:off x="9205635" y="951559"/>
+                <a:ext cx="3872311" cy="2904233"/>
+              </a:xfrm>
+              <a:prstGeom prst="rect">
+                <a:avLst/>
+              </a:prstGeom>
+            </p:spPr>
+          </p:pic>
+          <p:pic>
+            <p:nvPicPr>
+              <p:cNvPr id="16" name="Grafik 15">
+                <a:extLst>
+                  <a:ext uri="{FF2B5EF4-FFF2-40B4-BE49-F238E27FC236}">
+                    <a16:creationId xmlns:a16="http://schemas.microsoft.com/office/drawing/2014/main" id="{6FE8EC74-EE81-4577-8F33-F4EB7193F5DE}"/>
+                  </a:ext>
+                </a:extLst>
+              </p:cNvPr>
+              <p:cNvPicPr>
+                <a:picLocks noChangeAspect="1"/>
+              </p:cNvPicPr>
+              <p:nvPr/>
+            </p:nvPicPr>
+            <p:blipFill>
+              <a:blip r:embed="rId21">
+                <a:extLst>
+                  <a:ext uri="{28A0092B-C50C-407E-A947-70E740481C1C}">
+                    <a14:useLocalDpi xmlns:a14="http://schemas.microsoft.com/office/drawing/2010/main" val="0"/>
+                  </a:ext>
+                </a:extLst>
+              </a:blip>
+              <a:stretch>
+                <a:fillRect/>
+              </a:stretch>
+            </p:blipFill>
+            <p:spPr>
+              <a:xfrm>
+                <a:off x="11141790" y="2382283"/>
+                <a:ext cx="3872311" cy="2904233"/>
+              </a:xfrm>
+              <a:prstGeom prst="rect">
+                <a:avLst/>
+              </a:prstGeom>
+            </p:spPr>
+          </p:pic>
+        </p:grpSp>
+        <p:cxnSp>
+          <p:nvCxnSpPr>
+            <p:cNvPr id="26" name="Gerade Verbindung mit Pfeil 25">
+              <a:extLst>
+                <a:ext uri="{FF2B5EF4-FFF2-40B4-BE49-F238E27FC236}">
+                  <a16:creationId xmlns:a16="http://schemas.microsoft.com/office/drawing/2014/main" id="{9F23A5C3-C591-4ED9-B96E-8AB89680638C}"/>
+                </a:ext>
+              </a:extLst>
+            </p:cNvPr>
+            <p:cNvCxnSpPr>
+              <a:cxnSpLocks/>
+            </p:cNvCxnSpPr>
+            <p:nvPr/>
+          </p:nvCxnSpPr>
+          <p:spPr>
+            <a:xfrm>
+              <a:off x="-4010490" y="1646479"/>
+              <a:ext cx="518155" cy="0"/>
+            </a:xfrm>
+            <a:prstGeom prst="straightConnector1">
+              <a:avLst/>
+            </a:prstGeom>
+            <a:ln w="25400">
+              <a:solidFill>
+                <a:schemeClr val="tx1"/>
+              </a:solidFill>
+              <a:tailEnd type="triangle"/>
+            </a:ln>
+          </p:spPr>
+          <p:style>
+            <a:lnRef idx="1">
+              <a:schemeClr val="accent1"/>
+            </a:lnRef>
+            <a:fillRef idx="0">
+              <a:schemeClr val="accent1"/>
+            </a:fillRef>
+            <a:effectRef idx="0">
+              <a:schemeClr val="accent1"/>
+            </a:effectRef>
+            <a:fontRef idx="minor">
+              <a:schemeClr val="tx1"/>
+            </a:fontRef>
+          </p:style>
+        </p:cxnSp>
+        <p:cxnSp>
+          <p:nvCxnSpPr>
+            <p:cNvPr id="30" name="Gerade Verbindung mit Pfeil 29">
+              <a:extLst>
+                <a:ext uri="{FF2B5EF4-FFF2-40B4-BE49-F238E27FC236}">
+                  <a16:creationId xmlns:a16="http://schemas.microsoft.com/office/drawing/2014/main" id="{4B582DA5-AE0F-4E3D-AE76-47E83092ED2A}"/>
+                </a:ext>
+              </a:extLst>
+            </p:cNvPr>
+            <p:cNvCxnSpPr>
+              <a:cxnSpLocks/>
+            </p:cNvCxnSpPr>
+            <p:nvPr/>
+          </p:nvCxnSpPr>
+          <p:spPr>
+            <a:xfrm>
+              <a:off x="2643486" y="1646479"/>
+              <a:ext cx="518155" cy="0"/>
+            </a:xfrm>
+            <a:prstGeom prst="straightConnector1">
+              <a:avLst/>
+            </a:prstGeom>
+            <a:ln w="25400">
+              <a:solidFill>
+                <a:schemeClr val="tx1"/>
+              </a:solidFill>
+              <a:tailEnd type="triangle"/>
+            </a:ln>
+          </p:spPr>
+          <p:style>
+            <a:lnRef idx="1">
+              <a:schemeClr val="accent1"/>
+            </a:lnRef>
+            <a:fillRef idx="0">
+              <a:schemeClr val="accent1"/>
+            </a:fillRef>
+            <a:effectRef idx="0">
+              <a:schemeClr val="accent1"/>
+            </a:effectRef>
+            <a:fontRef idx="minor">
+              <a:schemeClr val="tx1"/>
+            </a:fontRef>
+          </p:style>
+        </p:cxnSp>
+        <p:pic>
+          <p:nvPicPr>
+            <p:cNvPr id="44" name="Grafik 43">
+              <a:extLst>
+                <a:ext uri="{FF2B5EF4-FFF2-40B4-BE49-F238E27FC236}">
+                  <a16:creationId xmlns:a16="http://schemas.microsoft.com/office/drawing/2014/main" id="{DCE30507-EB74-47D4-B4D5-1198E33FA7E6}"/>
+                </a:ext>
+              </a:extLst>
+            </p:cNvPr>
+            <p:cNvPicPr>
+              <a:picLocks noChangeAspect="1"/>
+            </p:cNvPicPr>
+            <p:nvPr>
+              <p:custDataLst>
+                <p:tags r:id="rId9"/>
+              </p:custDataLst>
+            </p:nvPr>
+          </p:nvPicPr>
+          <p:blipFill>
+            <a:blip r:embed="rId22">
+              <a:extLst>
+                <a:ext uri="{28A0092B-C50C-407E-A947-70E740481C1C}">
+                  <a14:useLocalDpi xmlns:a14="http://schemas.microsoft.com/office/drawing/2010/main" val="0"/>
+                </a:ext>
+              </a:extLst>
+            </a:blip>
+            <a:stretch>
+              <a:fillRect/>
+            </a:stretch>
+          </p:blipFill>
+          <p:spPr>
+            <a:xfrm>
+              <a:off x="-8574013" y="-1187116"/>
+              <a:ext cx="3031045" cy="427127"/>
+            </a:xfrm>
+            <a:prstGeom prst="rect">
+              <a:avLst/>
+            </a:prstGeom>
+          </p:spPr>
+        </p:pic>
+        <p:pic>
+          <p:nvPicPr>
+            <p:cNvPr id="47" name="Grafik 46">
+              <a:extLst>
+                <a:ext uri="{FF2B5EF4-FFF2-40B4-BE49-F238E27FC236}">
+                  <a16:creationId xmlns:a16="http://schemas.microsoft.com/office/drawing/2014/main" id="{2CC68F51-F244-4663-84F0-06B56A1B7343}"/>
+                </a:ext>
+              </a:extLst>
+            </p:cNvPr>
+            <p:cNvPicPr>
+              <a:picLocks noChangeAspect="1"/>
+            </p:cNvPicPr>
+            <p:nvPr>
+              <p:custDataLst>
+                <p:tags r:id="rId10"/>
+              </p:custDataLst>
+            </p:nvPr>
+          </p:nvPicPr>
+          <p:blipFill>
+            <a:blip r:embed="rId23">
+              <a:extLst>
+                <a:ext uri="{28A0092B-C50C-407E-A947-70E740481C1C}">
+                  <a14:useLocalDpi xmlns:a14="http://schemas.microsoft.com/office/drawing/2010/main" val="0"/>
+                </a:ext>
+              </a:extLst>
+            </a:blip>
+            <a:stretch>
+              <a:fillRect/>
+            </a:stretch>
+          </p:blipFill>
+          <p:spPr>
+            <a:xfrm>
+              <a:off x="-2094745" y="-1189667"/>
+              <a:ext cx="3911198" cy="429678"/>
+            </a:xfrm>
+            <a:prstGeom prst="rect">
+              <a:avLst/>
+            </a:prstGeom>
+          </p:spPr>
+        </p:pic>
+        <p:pic>
+          <p:nvPicPr>
+            <p:cNvPr id="52" name="Grafik 51">
+              <a:extLst>
+                <a:ext uri="{FF2B5EF4-FFF2-40B4-BE49-F238E27FC236}">
+                  <a16:creationId xmlns:a16="http://schemas.microsoft.com/office/drawing/2014/main" id="{A2A65E11-C8B1-4BC7-A43C-CF0A69766BA4}"/>
+                </a:ext>
+              </a:extLst>
+            </p:cNvPr>
+            <p:cNvPicPr>
+              <a:picLocks noChangeAspect="1"/>
+            </p:cNvPicPr>
+            <p:nvPr>
+              <p:custDataLst>
+                <p:tags r:id="rId11"/>
+              </p:custDataLst>
+            </p:nvPr>
+          </p:nvPicPr>
+          <p:blipFill>
+            <a:blip r:embed="rId24">
+              <a:extLst>
+                <a:ext uri="{28A0092B-C50C-407E-A947-70E740481C1C}">
+                  <a14:useLocalDpi xmlns:a14="http://schemas.microsoft.com/office/drawing/2010/main" val="0"/>
+                </a:ext>
+              </a:extLst>
+            </a:blip>
+            <a:stretch>
+              <a:fillRect/>
+            </a:stretch>
+          </p:blipFill>
+          <p:spPr>
+            <a:xfrm>
+              <a:off x="3773548" y="-1194814"/>
+              <a:ext cx="4644904" cy="434825"/>
+            </a:xfrm>
+            <a:prstGeom prst="rect">
+              <a:avLst/>
+            </a:prstGeom>
+          </p:spPr>
+        </p:pic>
+      </p:grpSp>
+      <p:grpSp>
+        <p:nvGrpSpPr>
+          <p:cNvPr id="171" name="Gruppieren 170">
+            <a:extLst>
+              <a:ext uri="{FF2B5EF4-FFF2-40B4-BE49-F238E27FC236}">
+                <a16:creationId xmlns:a16="http://schemas.microsoft.com/office/drawing/2014/main" id="{1839B7DB-9657-4AB9-98FA-7ADD0540A219}"/>
+              </a:ext>
+            </a:extLst>
+          </p:cNvPr>
+          <p:cNvGrpSpPr/>
+          <p:nvPr/>
+        </p:nvGrpSpPr>
+        <p:grpSpPr>
+          <a:xfrm>
+            <a:off x="-3314758" y="2760878"/>
+            <a:ext cx="16057931" cy="4097122"/>
+            <a:chOff x="-3314758" y="2502938"/>
+            <a:chExt cx="16057931" cy="4097122"/>
+          </a:xfrm>
+        </p:grpSpPr>
+        <p:pic>
+          <p:nvPicPr>
+            <p:cNvPr id="41" name="Grafik 40">
+              <a:extLst>
+                <a:ext uri="{FF2B5EF4-FFF2-40B4-BE49-F238E27FC236}">
+                  <a16:creationId xmlns:a16="http://schemas.microsoft.com/office/drawing/2014/main" id="{4393CF99-AD04-458B-BFE2-9E431C4C8E1C}"/>
+                </a:ext>
+              </a:extLst>
+            </p:cNvPr>
+            <p:cNvPicPr>
+              <a:picLocks noChangeAspect="1"/>
+            </p:cNvPicPr>
+            <p:nvPr/>
+          </p:nvPicPr>
+          <p:blipFill>
+            <a:blip r:embed="rId21">
+              <a:extLst>
+                <a:ext uri="{28A0092B-C50C-407E-A947-70E740481C1C}">
+                  <a14:useLocalDpi xmlns:a14="http://schemas.microsoft.com/office/drawing/2010/main" val="0"/>
+                </a:ext>
+              </a:extLst>
+            </a:blip>
+            <a:stretch>
+              <a:fillRect/>
+            </a:stretch>
+          </p:blipFill>
+          <p:spPr>
+            <a:xfrm>
+              <a:off x="2422906" y="3014794"/>
+              <a:ext cx="4780353" cy="3585265"/>
+            </a:xfrm>
+            <a:prstGeom prst="rect">
+              <a:avLst/>
+            </a:prstGeom>
+          </p:spPr>
+        </p:pic>
+        <p:pic>
+          <p:nvPicPr>
+            <p:cNvPr id="39" name="Grafik 38">
+              <a:extLst>
+                <a:ext uri="{FF2B5EF4-FFF2-40B4-BE49-F238E27FC236}">
+                  <a16:creationId xmlns:a16="http://schemas.microsoft.com/office/drawing/2014/main" id="{5AF8FADF-01A3-4501-AA19-C8AE39D90051}"/>
+                </a:ext>
+              </a:extLst>
+            </p:cNvPr>
+            <p:cNvPicPr>
+              <a:picLocks noChangeAspect="1"/>
+            </p:cNvPicPr>
+            <p:nvPr/>
+          </p:nvPicPr>
+          <p:blipFill>
+            <a:blip r:embed="rId20">
+              <a:extLst>
+                <a:ext uri="{28A0092B-C50C-407E-A947-70E740481C1C}">
+                  <a14:useLocalDpi xmlns:a14="http://schemas.microsoft.com/office/drawing/2010/main" val="0"/>
+                </a:ext>
+              </a:extLst>
+            </a:blip>
+            <a:stretch>
+              <a:fillRect/>
+            </a:stretch>
+          </p:blipFill>
+          <p:spPr>
+            <a:xfrm>
+              <a:off x="-3314758" y="3014794"/>
+              <a:ext cx="4780353" cy="3585265"/>
+            </a:xfrm>
+            <a:prstGeom prst="rect">
+              <a:avLst/>
+            </a:prstGeom>
+          </p:spPr>
+        </p:pic>
+        <p:cxnSp>
+          <p:nvCxnSpPr>
+            <p:cNvPr id="58" name="Gerader Verbinder 57">
+              <a:extLst>
+                <a:ext uri="{FF2B5EF4-FFF2-40B4-BE49-F238E27FC236}">
+                  <a16:creationId xmlns:a16="http://schemas.microsoft.com/office/drawing/2014/main" id="{233A7B5A-6F7B-4047-8F33-2E3D04C9FF42}"/>
+                </a:ext>
+              </a:extLst>
+            </p:cNvPr>
+            <p:cNvCxnSpPr>
+              <a:cxnSpLocks/>
+            </p:cNvCxnSpPr>
+            <p:nvPr/>
+          </p:nvCxnSpPr>
+          <p:spPr>
+            <a:xfrm>
+              <a:off x="-3314758" y="4679629"/>
+              <a:ext cx="4780353" cy="0"/>
+            </a:xfrm>
+            <a:prstGeom prst="line">
+              <a:avLst/>
+            </a:prstGeom>
+            <a:ln w="25400">
+              <a:solidFill>
+                <a:srgbClr val="FF7F2B"/>
+              </a:solidFill>
+            </a:ln>
+          </p:spPr>
+          <p:style>
+            <a:lnRef idx="1">
+              <a:schemeClr val="accent1"/>
+            </a:lnRef>
+            <a:fillRef idx="0">
+              <a:schemeClr val="accent1"/>
+            </a:fillRef>
+            <a:effectRef idx="0">
+              <a:schemeClr val="accent1"/>
+            </a:effectRef>
+            <a:fontRef idx="minor">
+              <a:schemeClr val="tx1"/>
+            </a:fontRef>
+          </p:style>
+        </p:cxnSp>
+        <p:cxnSp>
+          <p:nvCxnSpPr>
+            <p:cNvPr id="75" name="Gerade Verbindung mit Pfeil 74">
+              <a:extLst>
+                <a:ext uri="{FF2B5EF4-FFF2-40B4-BE49-F238E27FC236}">
+                  <a16:creationId xmlns:a16="http://schemas.microsoft.com/office/drawing/2014/main" id="{2CBF674E-EE6F-4D89-AC7E-3AF22645396E}"/>
+                </a:ext>
+              </a:extLst>
+            </p:cNvPr>
+            <p:cNvCxnSpPr>
+              <a:cxnSpLocks/>
+            </p:cNvCxnSpPr>
+            <p:nvPr/>
+          </p:nvCxnSpPr>
+          <p:spPr>
+            <a:xfrm>
+              <a:off x="-1996464" y="4288050"/>
+              <a:ext cx="540000" cy="0"/>
+            </a:xfrm>
+            <a:prstGeom prst="straightConnector1">
+              <a:avLst/>
+            </a:prstGeom>
+            <a:ln w="25400">
+              <a:solidFill>
+                <a:srgbClr val="FF7F2B"/>
+              </a:solidFill>
+              <a:headEnd type="triangle"/>
+              <a:tailEnd type="triangle"/>
+            </a:ln>
+          </p:spPr>
+          <p:style>
+            <a:lnRef idx="1">
+              <a:schemeClr val="accent1"/>
+            </a:lnRef>
+            <a:fillRef idx="0">
+              <a:schemeClr val="accent1"/>
+            </a:fillRef>
+            <a:effectRef idx="0">
+              <a:schemeClr val="accent1"/>
+            </a:effectRef>
+            <a:fontRef idx="minor">
+              <a:schemeClr val="tx1"/>
+            </a:fontRef>
+          </p:style>
+        </p:cxnSp>
+        <p:pic>
+          <p:nvPicPr>
+            <p:cNvPr id="81" name="Grafik 80">
+              <a:extLst>
+                <a:ext uri="{FF2B5EF4-FFF2-40B4-BE49-F238E27FC236}">
+                  <a16:creationId xmlns:a16="http://schemas.microsoft.com/office/drawing/2014/main" id="{98AA26A0-A281-40DD-B2D1-4F9BCAC3BD4F}"/>
+                </a:ext>
+              </a:extLst>
+            </p:cNvPr>
+            <p:cNvPicPr>
+              <a:picLocks noChangeAspect="1"/>
+            </p:cNvPicPr>
+            <p:nvPr>
+              <p:custDataLst>
+                <p:tags r:id="rId1"/>
+              </p:custDataLst>
+            </p:nvPr>
+          </p:nvPicPr>
+          <p:blipFill>
+            <a:blip r:embed="rId25">
+              <a:extLst>
+                <a:ext uri="{28A0092B-C50C-407E-A947-70E740481C1C}">
+                  <a14:useLocalDpi xmlns:a14="http://schemas.microsoft.com/office/drawing/2010/main" val="0"/>
+                </a:ext>
+              </a:extLst>
+            </a:blip>
+            <a:stretch>
+              <a:fillRect/>
+            </a:stretch>
+          </p:blipFill>
+          <p:spPr>
+            <a:xfrm>
+              <a:off x="150553" y="4466909"/>
+              <a:ext cx="1181113" cy="177331"/>
+            </a:xfrm>
+            <a:prstGeom prst="rect">
+              <a:avLst/>
+            </a:prstGeom>
+          </p:spPr>
+        </p:pic>
+        <p:cxnSp>
+          <p:nvCxnSpPr>
+            <p:cNvPr id="82" name="Gerade Verbindung mit Pfeil 81">
+              <a:extLst>
+                <a:ext uri="{FF2B5EF4-FFF2-40B4-BE49-F238E27FC236}">
+                  <a16:creationId xmlns:a16="http://schemas.microsoft.com/office/drawing/2014/main" id="{84554DDB-BF6B-44A2-9100-920D910E73A9}"/>
+                </a:ext>
+              </a:extLst>
+            </p:cNvPr>
+            <p:cNvCxnSpPr>
+              <a:cxnSpLocks/>
+            </p:cNvCxnSpPr>
+            <p:nvPr/>
+          </p:nvCxnSpPr>
+          <p:spPr>
+            <a:xfrm>
+              <a:off x="-2112264" y="4422617"/>
+              <a:ext cx="0" cy="540000"/>
+            </a:xfrm>
+            <a:prstGeom prst="straightConnector1">
+              <a:avLst/>
+            </a:prstGeom>
+            <a:ln w="25400">
+              <a:solidFill>
+                <a:srgbClr val="FF7F2B"/>
+              </a:solidFill>
+              <a:headEnd type="triangle"/>
+              <a:tailEnd type="triangle"/>
+            </a:ln>
+          </p:spPr>
+          <p:style>
+            <a:lnRef idx="1">
+              <a:schemeClr val="accent1"/>
+            </a:lnRef>
+            <a:fillRef idx="0">
+              <a:schemeClr val="accent1"/>
+            </a:fillRef>
+            <a:effectRef idx="0">
+              <a:schemeClr val="accent1"/>
+            </a:effectRef>
+            <a:fontRef idx="minor">
+              <a:schemeClr val="tx1"/>
+            </a:fontRef>
+          </p:style>
+        </p:cxnSp>
+        <p:grpSp>
+          <p:nvGrpSpPr>
+            <p:cNvPr id="94" name="Gruppieren 93">
+              <a:extLst>
+                <a:ext uri="{FF2B5EF4-FFF2-40B4-BE49-F238E27FC236}">
+                  <a16:creationId xmlns:a16="http://schemas.microsoft.com/office/drawing/2014/main" id="{820234CE-A644-48F1-A8C1-36F60893E4B3}"/>
+                </a:ext>
+              </a:extLst>
+            </p:cNvPr>
+            <p:cNvGrpSpPr/>
+            <p:nvPr/>
+          </p:nvGrpSpPr>
+          <p:grpSpPr>
+            <a:xfrm>
+              <a:off x="-1996464" y="4405164"/>
+              <a:ext cx="540001" cy="540000"/>
+              <a:chOff x="-2898598" y="4433209"/>
+              <a:chExt cx="540001" cy="540000"/>
+            </a:xfrm>
+          </p:grpSpPr>
+          <p:pic>
+            <p:nvPicPr>
+              <p:cNvPr id="95" name="Grafik 94">
+                <a:extLst>
+                  <a:ext uri="{FF2B5EF4-FFF2-40B4-BE49-F238E27FC236}">
+                    <a16:creationId xmlns:a16="http://schemas.microsoft.com/office/drawing/2014/main" id="{6A505EFB-3E55-49C8-B688-91AE8065DAF9}"/>
+                  </a:ext>
+                </a:extLst>
+              </p:cNvPr>
+              <p:cNvPicPr>
+                <a:picLocks noChangeAspect="1"/>
+              </p:cNvPicPr>
+              <p:nvPr/>
+            </p:nvPicPr>
+            <p:blipFill rotWithShape="1">
+              <a:blip r:embed="rId20">
+                <a:extLst>
+                  <a:ext uri="{28A0092B-C50C-407E-A947-70E740481C1C}">
+                    <a14:useLocalDpi xmlns:a14="http://schemas.microsoft.com/office/drawing/2010/main" val="0"/>
+                  </a:ext>
+                </a:extLst>
+              </a:blip>
+              <a:srcRect l="27577" t="38780" r="61127" b="46158"/>
+              <a:stretch/>
+            </p:blipFill>
+            <p:spPr>
+              <a:xfrm>
+                <a:off x="-2898597" y="4433209"/>
+                <a:ext cx="540000" cy="540000"/>
+              </a:xfrm>
+              <a:prstGeom prst="rect">
+                <a:avLst/>
+              </a:prstGeom>
+            </p:spPr>
+          </p:pic>
+          <p:sp>
+            <p:nvSpPr>
+              <p:cNvPr id="96" name="Rechteck 95">
+                <a:extLst>
+                  <a:ext uri="{FF2B5EF4-FFF2-40B4-BE49-F238E27FC236}">
+                    <a16:creationId xmlns:a16="http://schemas.microsoft.com/office/drawing/2014/main" id="{1309CC21-0692-41B7-927F-E9E7F8FB22DE}"/>
+                  </a:ext>
+                </a:extLst>
+              </p:cNvPr>
+              <p:cNvSpPr/>
+              <p:nvPr/>
+            </p:nvSpPr>
+            <p:spPr>
+              <a:xfrm>
+                <a:off x="-2898598" y="4433209"/>
+                <a:ext cx="540000" cy="540000"/>
+              </a:xfrm>
+              <a:prstGeom prst="rect">
+                <a:avLst/>
+              </a:prstGeom>
+              <a:noFill/>
+              <a:ln w="25400">
+                <a:solidFill>
+                  <a:srgbClr val="FF7F2B"/>
+                </a:solidFill>
+              </a:ln>
+            </p:spPr>
+            <p:style>
+              <a:lnRef idx="2">
+                <a:schemeClr val="accent1">
+                  <a:shade val="50000"/>
+                </a:schemeClr>
+              </a:lnRef>
+              <a:fillRef idx="1">
+                <a:schemeClr val="accent1"/>
+              </a:fillRef>
+              <a:effectRef idx="0">
+                <a:schemeClr val="accent1"/>
+              </a:effectRef>
+              <a:fontRef idx="minor">
+                <a:schemeClr val="lt1"/>
+              </a:fontRef>
+            </p:style>
+            <p:txBody>
+              <a:bodyPr rtlCol="0" anchor="ctr"/>
+              <a:lstStyle/>
+              <a:p>
+                <a:pPr algn="ctr"/>
+                <a:endParaRPr lang="en-GB"/>
+              </a:p>
+            </p:txBody>
+          </p:sp>
+        </p:grpSp>
+        <p:pic>
+          <p:nvPicPr>
+            <p:cNvPr id="102" name="Grafik 101">
+              <a:extLst>
+                <a:ext uri="{FF2B5EF4-FFF2-40B4-BE49-F238E27FC236}">
+                  <a16:creationId xmlns:a16="http://schemas.microsoft.com/office/drawing/2014/main" id="{B965ADA7-69FD-44EB-89EE-338E1D800459}"/>
+                </a:ext>
+              </a:extLst>
+            </p:cNvPr>
+            <p:cNvPicPr>
+              <a:picLocks noChangeAspect="1"/>
+            </p:cNvPicPr>
+            <p:nvPr>
+              <p:custDataLst>
+                <p:tags r:id="rId2"/>
+              </p:custDataLst>
+            </p:nvPr>
+          </p:nvPicPr>
+          <p:blipFill>
+            <a:blip r:embed="rId26">
+              <a:extLst>
+                <a:ext uri="{28A0092B-C50C-407E-A947-70E740481C1C}">
+                  <a14:useLocalDpi xmlns:a14="http://schemas.microsoft.com/office/drawing/2010/main" val="0"/>
+                </a:ext>
+              </a:extLst>
+            </a:blip>
+            <a:stretch>
+              <a:fillRect/>
+            </a:stretch>
+          </p:blipFill>
+          <p:spPr>
+            <a:xfrm>
+              <a:off x="-2956634" y="4218452"/>
+              <a:ext cx="849853" cy="139196"/>
+            </a:xfrm>
+            <a:prstGeom prst="rect">
+              <a:avLst/>
+            </a:prstGeom>
+          </p:spPr>
+        </p:pic>
+        <p:cxnSp>
+          <p:nvCxnSpPr>
+            <p:cNvPr id="104" name="Gerader Verbinder 103">
+              <a:extLst>
+                <a:ext uri="{FF2B5EF4-FFF2-40B4-BE49-F238E27FC236}">
+                  <a16:creationId xmlns:a16="http://schemas.microsoft.com/office/drawing/2014/main" id="{F56F4F4D-540D-4CE0-88AA-D1BC64B9CC11}"/>
+                </a:ext>
+              </a:extLst>
+            </p:cNvPr>
+            <p:cNvCxnSpPr>
+              <a:cxnSpLocks/>
+            </p:cNvCxnSpPr>
+            <p:nvPr/>
+          </p:nvCxnSpPr>
+          <p:spPr>
+            <a:xfrm>
+              <a:off x="2422906" y="4675164"/>
+              <a:ext cx="4780353" cy="0"/>
+            </a:xfrm>
+            <a:prstGeom prst="line">
+              <a:avLst/>
+            </a:prstGeom>
+            <a:ln w="25400">
+              <a:solidFill>
+                <a:srgbClr val="FF7F2B"/>
+              </a:solidFill>
+            </a:ln>
+          </p:spPr>
+          <p:style>
+            <a:lnRef idx="1">
+              <a:schemeClr val="accent1"/>
+            </a:lnRef>
+            <a:fillRef idx="0">
+              <a:schemeClr val="accent1"/>
+            </a:fillRef>
+            <a:effectRef idx="0">
+              <a:schemeClr val="accent1"/>
+            </a:effectRef>
+            <a:fontRef idx="minor">
+              <a:schemeClr val="tx1"/>
+            </a:fontRef>
+          </p:style>
+        </p:cxnSp>
+        <p:pic>
+          <p:nvPicPr>
+            <p:cNvPr id="105" name="Grafik 104">
+              <a:extLst>
+                <a:ext uri="{FF2B5EF4-FFF2-40B4-BE49-F238E27FC236}">
+                  <a16:creationId xmlns:a16="http://schemas.microsoft.com/office/drawing/2014/main" id="{5AE1BE20-4033-45A3-8118-B1FF9F9CA61F}"/>
+                </a:ext>
+              </a:extLst>
+            </p:cNvPr>
+            <p:cNvPicPr>
+              <a:picLocks noChangeAspect="1"/>
+            </p:cNvPicPr>
+            <p:nvPr>
+              <p:custDataLst>
+                <p:tags r:id="rId3"/>
+              </p:custDataLst>
+            </p:nvPr>
+          </p:nvPicPr>
+          <p:blipFill>
+            <a:blip r:embed="rId25">
+              <a:extLst>
+                <a:ext uri="{28A0092B-C50C-407E-A947-70E740481C1C}">
+                  <a14:useLocalDpi xmlns:a14="http://schemas.microsoft.com/office/drawing/2010/main" val="0"/>
+                </a:ext>
+              </a:extLst>
+            </a:blip>
+            <a:stretch>
+              <a:fillRect/>
+            </a:stretch>
+          </p:blipFill>
+          <p:spPr>
+            <a:xfrm>
+              <a:off x="5888217" y="4462444"/>
+              <a:ext cx="1181113" cy="177331"/>
+            </a:xfrm>
+            <a:prstGeom prst="rect">
+              <a:avLst/>
+            </a:prstGeom>
+          </p:spPr>
+        </p:pic>
+        <p:grpSp>
+          <p:nvGrpSpPr>
+            <p:cNvPr id="97" name="Gruppieren 96">
+              <a:extLst>
+                <a:ext uri="{FF2B5EF4-FFF2-40B4-BE49-F238E27FC236}">
+                  <a16:creationId xmlns:a16="http://schemas.microsoft.com/office/drawing/2014/main" id="{D4460F46-B497-430D-9681-CFE46285D2A6}"/>
+                </a:ext>
+              </a:extLst>
+            </p:cNvPr>
+            <p:cNvGrpSpPr/>
+            <p:nvPr/>
+          </p:nvGrpSpPr>
+          <p:grpSpPr>
+            <a:xfrm>
+              <a:off x="3101258" y="4405164"/>
+              <a:ext cx="540001" cy="540000"/>
+              <a:chOff x="-2898598" y="4433209"/>
+              <a:chExt cx="540001" cy="540000"/>
+            </a:xfrm>
+          </p:grpSpPr>
+          <p:pic>
+            <p:nvPicPr>
+              <p:cNvPr id="98" name="Grafik 97">
+                <a:extLst>
+                  <a:ext uri="{FF2B5EF4-FFF2-40B4-BE49-F238E27FC236}">
+                    <a16:creationId xmlns:a16="http://schemas.microsoft.com/office/drawing/2014/main" id="{303CE120-97AF-4E78-BB33-AA4311532B2A}"/>
+                  </a:ext>
+                </a:extLst>
+              </p:cNvPr>
+              <p:cNvPicPr>
+                <a:picLocks noChangeAspect="1"/>
+              </p:cNvPicPr>
+              <p:nvPr/>
+            </p:nvPicPr>
+            <p:blipFill rotWithShape="1">
+              <a:blip r:embed="rId20">
+                <a:extLst>
+                  <a:ext uri="{28A0092B-C50C-407E-A947-70E740481C1C}">
+                    <a14:useLocalDpi xmlns:a14="http://schemas.microsoft.com/office/drawing/2010/main" val="0"/>
+                  </a:ext>
+                </a:extLst>
+              </a:blip>
+              <a:srcRect l="27577" t="38780" r="61127" b="46158"/>
+              <a:stretch/>
+            </p:blipFill>
+            <p:spPr>
+              <a:xfrm>
+                <a:off x="-2898597" y="4433209"/>
+                <a:ext cx="540000" cy="540000"/>
+              </a:xfrm>
+              <a:prstGeom prst="rect">
+                <a:avLst/>
+              </a:prstGeom>
+            </p:spPr>
+          </p:pic>
+          <p:sp>
+            <p:nvSpPr>
+              <p:cNvPr id="99" name="Rechteck 98">
+                <a:extLst>
+                  <a:ext uri="{FF2B5EF4-FFF2-40B4-BE49-F238E27FC236}">
+                    <a16:creationId xmlns:a16="http://schemas.microsoft.com/office/drawing/2014/main" id="{1175C553-F708-4646-B46C-46A93498967A}"/>
+                  </a:ext>
+                </a:extLst>
+              </p:cNvPr>
+              <p:cNvSpPr/>
+              <p:nvPr/>
+            </p:nvSpPr>
+            <p:spPr>
+              <a:xfrm>
+                <a:off x="-2898598" y="4433209"/>
+                <a:ext cx="540000" cy="540000"/>
+              </a:xfrm>
+              <a:prstGeom prst="rect">
+                <a:avLst/>
+              </a:prstGeom>
+              <a:noFill/>
+              <a:ln w="25400">
+                <a:solidFill>
+                  <a:srgbClr val="FF7F2B"/>
+                </a:solidFill>
+              </a:ln>
+            </p:spPr>
+            <p:style>
+              <a:lnRef idx="2">
+                <a:schemeClr val="accent1">
+                  <a:shade val="50000"/>
+                </a:schemeClr>
+              </a:lnRef>
+              <a:fillRef idx="1">
+                <a:schemeClr val="accent1"/>
+              </a:fillRef>
+              <a:effectRef idx="0">
+                <a:schemeClr val="accent1"/>
+              </a:effectRef>
+              <a:fontRef idx="minor">
+                <a:schemeClr val="lt1"/>
+              </a:fontRef>
+            </p:style>
+            <p:txBody>
+              <a:bodyPr rtlCol="0" anchor="ctr"/>
+              <a:lstStyle/>
+              <a:p>
+                <a:pPr algn="ctr"/>
+                <a:endParaRPr lang="en-GB"/>
+              </a:p>
+            </p:txBody>
+          </p:sp>
+        </p:grpSp>
+        <p:grpSp>
+          <p:nvGrpSpPr>
+            <p:cNvPr id="107" name="Gruppieren 106">
+              <a:extLst>
+                <a:ext uri="{FF2B5EF4-FFF2-40B4-BE49-F238E27FC236}">
+                  <a16:creationId xmlns:a16="http://schemas.microsoft.com/office/drawing/2014/main" id="{3E89E452-0515-4D75-9E3D-9AE446878F99}"/>
+                </a:ext>
+              </a:extLst>
+            </p:cNvPr>
+            <p:cNvGrpSpPr/>
+            <p:nvPr/>
+          </p:nvGrpSpPr>
+          <p:grpSpPr>
+            <a:xfrm>
+              <a:off x="1663346" y="3306914"/>
+              <a:ext cx="540001" cy="540000"/>
+              <a:chOff x="-2898598" y="4433209"/>
+              <a:chExt cx="540001" cy="540000"/>
+            </a:xfrm>
+          </p:grpSpPr>
+          <p:pic>
+            <p:nvPicPr>
+              <p:cNvPr id="108" name="Grafik 107">
+                <a:extLst>
+                  <a:ext uri="{FF2B5EF4-FFF2-40B4-BE49-F238E27FC236}">
+                    <a16:creationId xmlns:a16="http://schemas.microsoft.com/office/drawing/2014/main" id="{CF638114-3326-4355-B8D7-6FAECD49DACC}"/>
+                  </a:ext>
+                </a:extLst>
+              </p:cNvPr>
+              <p:cNvPicPr>
+                <a:picLocks noChangeAspect="1"/>
+              </p:cNvPicPr>
+              <p:nvPr/>
+            </p:nvPicPr>
+            <p:blipFill rotWithShape="1">
+              <a:blip r:embed="rId20">
+                <a:extLst>
+                  <a:ext uri="{28A0092B-C50C-407E-A947-70E740481C1C}">
+                    <a14:useLocalDpi xmlns:a14="http://schemas.microsoft.com/office/drawing/2010/main" val="0"/>
+                  </a:ext>
+                </a:extLst>
+              </a:blip>
+              <a:srcRect l="27577" t="38780" r="61127" b="46158"/>
+              <a:stretch/>
+            </p:blipFill>
+            <p:spPr>
+              <a:xfrm>
+                <a:off x="-2898597" y="4433209"/>
+                <a:ext cx="540000" cy="540000"/>
+              </a:xfrm>
+              <a:prstGeom prst="rect">
+                <a:avLst/>
+              </a:prstGeom>
+            </p:spPr>
+          </p:pic>
+          <p:sp>
+            <p:nvSpPr>
+              <p:cNvPr id="109" name="Rechteck 108">
+                <a:extLst>
+                  <a:ext uri="{FF2B5EF4-FFF2-40B4-BE49-F238E27FC236}">
+                    <a16:creationId xmlns:a16="http://schemas.microsoft.com/office/drawing/2014/main" id="{1903E4D2-7B39-4C47-A74B-13F1A7BAAF20}"/>
+                  </a:ext>
+                </a:extLst>
+              </p:cNvPr>
+              <p:cNvSpPr/>
+              <p:nvPr/>
+            </p:nvSpPr>
+            <p:spPr>
+              <a:xfrm>
+                <a:off x="-2898598" y="4433209"/>
+                <a:ext cx="540000" cy="540000"/>
+              </a:xfrm>
+              <a:prstGeom prst="rect">
+                <a:avLst/>
+              </a:prstGeom>
+              <a:noFill/>
+              <a:ln w="25400">
+                <a:solidFill>
+                  <a:srgbClr val="FF7F2B"/>
+                </a:solidFill>
+              </a:ln>
+            </p:spPr>
+            <p:style>
+              <a:lnRef idx="2">
+                <a:schemeClr val="accent1">
+                  <a:shade val="50000"/>
+                </a:schemeClr>
+              </a:lnRef>
+              <a:fillRef idx="1">
+                <a:schemeClr val="accent1"/>
+              </a:fillRef>
+              <a:effectRef idx="0">
+                <a:schemeClr val="accent1"/>
+              </a:effectRef>
+              <a:fontRef idx="minor">
+                <a:schemeClr val="lt1"/>
+              </a:fontRef>
+            </p:style>
+            <p:txBody>
+              <a:bodyPr rtlCol="0" anchor="ctr"/>
+              <a:lstStyle/>
+              <a:p>
+                <a:pPr algn="ctr"/>
+                <a:endParaRPr lang="en-GB"/>
+              </a:p>
+            </p:txBody>
+          </p:sp>
+        </p:grpSp>
+        <p:cxnSp>
+          <p:nvCxnSpPr>
+            <p:cNvPr id="106" name="Gerade Verbindung mit Pfeil 105">
+              <a:extLst>
+                <a:ext uri="{FF2B5EF4-FFF2-40B4-BE49-F238E27FC236}">
+                  <a16:creationId xmlns:a16="http://schemas.microsoft.com/office/drawing/2014/main" id="{28354249-CC67-404E-862E-FBA642AB085D}"/>
+                </a:ext>
+              </a:extLst>
+            </p:cNvPr>
+            <p:cNvCxnSpPr>
+              <a:cxnSpLocks/>
+            </p:cNvCxnSpPr>
+            <p:nvPr/>
+          </p:nvCxnSpPr>
+          <p:spPr>
+            <a:xfrm>
+              <a:off x="3377110" y="4196759"/>
+              <a:ext cx="654523" cy="0"/>
+            </a:xfrm>
+            <a:prstGeom prst="straightConnector1">
+              <a:avLst/>
+            </a:prstGeom>
+            <a:ln w="25400">
+              <a:solidFill>
+                <a:srgbClr val="FF7F2B"/>
+              </a:solidFill>
+              <a:headEnd type="triangle"/>
+              <a:tailEnd type="triangle"/>
+            </a:ln>
+          </p:spPr>
+          <p:style>
+            <a:lnRef idx="1">
+              <a:schemeClr val="accent1"/>
+            </a:lnRef>
+            <a:fillRef idx="0">
+              <a:schemeClr val="accent1"/>
+            </a:fillRef>
+            <a:effectRef idx="0">
+              <a:schemeClr val="accent1"/>
+            </a:effectRef>
+            <a:fontRef idx="minor">
+              <a:schemeClr val="tx1"/>
+            </a:fontRef>
+          </p:style>
+        </p:cxnSp>
+        <p:cxnSp>
+          <p:nvCxnSpPr>
+            <p:cNvPr id="111" name="Gerade Verbindung mit Pfeil 110">
+              <a:extLst>
+                <a:ext uri="{FF2B5EF4-FFF2-40B4-BE49-F238E27FC236}">
+                  <a16:creationId xmlns:a16="http://schemas.microsoft.com/office/drawing/2014/main" id="{669891E4-DE31-4D69-98D8-4DB72BECC54A}"/>
+                </a:ext>
+              </a:extLst>
+            </p:cNvPr>
+            <p:cNvCxnSpPr>
+              <a:cxnSpLocks/>
+              <a:endCxn id="109" idx="1"/>
+            </p:cNvCxnSpPr>
+            <p:nvPr/>
+          </p:nvCxnSpPr>
+          <p:spPr>
+            <a:xfrm flipV="1">
+              <a:off x="-1456464" y="3576914"/>
+              <a:ext cx="3119810" cy="837181"/>
+            </a:xfrm>
+            <a:prstGeom prst="straightConnector1">
+              <a:avLst/>
+            </a:prstGeom>
+            <a:ln w="25400">
+              <a:solidFill>
+                <a:srgbClr val="FF7F2B"/>
+              </a:solidFill>
+              <a:tailEnd type="triangle"/>
+            </a:ln>
+          </p:spPr>
+          <p:style>
+            <a:lnRef idx="1">
+              <a:schemeClr val="accent1"/>
+            </a:lnRef>
+            <a:fillRef idx="0">
+              <a:schemeClr val="accent1"/>
+            </a:fillRef>
+            <a:effectRef idx="0">
+              <a:schemeClr val="accent1"/>
+            </a:effectRef>
+            <a:fontRef idx="minor">
+              <a:schemeClr val="tx1"/>
+            </a:fontRef>
+          </p:style>
+        </p:cxnSp>
+        <p:cxnSp>
+          <p:nvCxnSpPr>
+            <p:cNvPr id="114" name="Gerade Verbindung mit Pfeil 113">
+              <a:extLst>
+                <a:ext uri="{FF2B5EF4-FFF2-40B4-BE49-F238E27FC236}">
+                  <a16:creationId xmlns:a16="http://schemas.microsoft.com/office/drawing/2014/main" id="{21ECA220-DE60-43FE-BC6C-55E563206842}"/>
+                </a:ext>
+              </a:extLst>
+            </p:cNvPr>
+            <p:cNvCxnSpPr>
+              <a:cxnSpLocks/>
+              <a:stCxn id="109" idx="3"/>
+            </p:cNvCxnSpPr>
+            <p:nvPr/>
+          </p:nvCxnSpPr>
+          <p:spPr>
+            <a:xfrm>
+              <a:off x="2203346" y="3576914"/>
+              <a:ext cx="897912" cy="828250"/>
+            </a:xfrm>
+            <a:prstGeom prst="straightConnector1">
+              <a:avLst/>
+            </a:prstGeom>
+            <a:ln w="25400">
+              <a:solidFill>
+                <a:srgbClr val="FF7F2B"/>
+              </a:solidFill>
+              <a:tailEnd type="triangle"/>
+            </a:ln>
+          </p:spPr>
+          <p:style>
+            <a:lnRef idx="1">
+              <a:schemeClr val="accent1"/>
+            </a:lnRef>
+            <a:fillRef idx="0">
+              <a:schemeClr val="accent1"/>
+            </a:fillRef>
+            <a:effectRef idx="0">
+              <a:schemeClr val="accent1"/>
+            </a:effectRef>
+            <a:fontRef idx="minor">
+              <a:schemeClr val="tx1"/>
+            </a:fontRef>
+          </p:style>
+        </p:cxnSp>
+        <p:cxnSp>
+          <p:nvCxnSpPr>
+            <p:cNvPr id="130" name="Gerader Verbinder 129">
+              <a:extLst>
+                <a:ext uri="{FF2B5EF4-FFF2-40B4-BE49-F238E27FC236}">
+                  <a16:creationId xmlns:a16="http://schemas.microsoft.com/office/drawing/2014/main" id="{4755E636-8F63-4778-A84C-DDE121B806FB}"/>
+                </a:ext>
+              </a:extLst>
+            </p:cNvPr>
+            <p:cNvCxnSpPr>
+              <a:cxnSpLocks/>
+            </p:cNvCxnSpPr>
+            <p:nvPr/>
+          </p:nvCxnSpPr>
+          <p:spPr>
+            <a:xfrm>
+              <a:off x="-1710255" y="3032961"/>
+              <a:ext cx="0" cy="3567098"/>
+            </a:xfrm>
+            <a:prstGeom prst="line">
+              <a:avLst/>
+            </a:prstGeom>
+            <a:ln w="25400">
+              <a:solidFill>
+                <a:srgbClr val="FF7F2B"/>
+              </a:solidFill>
+              <a:prstDash val="dash"/>
+            </a:ln>
+          </p:spPr>
+          <p:style>
+            <a:lnRef idx="1">
+              <a:schemeClr val="accent1"/>
+            </a:lnRef>
+            <a:fillRef idx="0">
+              <a:schemeClr val="accent1"/>
+            </a:fillRef>
+            <a:effectRef idx="0">
+              <a:schemeClr val="accent1"/>
+            </a:effectRef>
+            <a:fontRef idx="minor">
+              <a:schemeClr val="tx1"/>
+            </a:fontRef>
+          </p:style>
+        </p:cxnSp>
+        <p:cxnSp>
+          <p:nvCxnSpPr>
+            <p:cNvPr id="133" name="Gerader Verbinder 132">
+              <a:extLst>
+                <a:ext uri="{FF2B5EF4-FFF2-40B4-BE49-F238E27FC236}">
+                  <a16:creationId xmlns:a16="http://schemas.microsoft.com/office/drawing/2014/main" id="{CA1DCDB8-AC6A-479F-9B25-45B9E55B8322}"/>
+                </a:ext>
+              </a:extLst>
+            </p:cNvPr>
+            <p:cNvCxnSpPr>
+              <a:cxnSpLocks/>
+            </p:cNvCxnSpPr>
+            <p:nvPr/>
+          </p:nvCxnSpPr>
+          <p:spPr>
+            <a:xfrm flipH="1">
+              <a:off x="-19584" y="5167035"/>
+              <a:ext cx="2084" cy="680083"/>
+            </a:xfrm>
+            <a:prstGeom prst="line">
+              <a:avLst/>
+            </a:prstGeom>
+            <a:ln w="25400">
+              <a:solidFill>
+                <a:srgbClr val="FF7F2B"/>
+              </a:solidFill>
+              <a:prstDash val="dash"/>
+            </a:ln>
+          </p:spPr>
+          <p:style>
+            <a:lnRef idx="1">
+              <a:schemeClr val="accent1"/>
+            </a:lnRef>
+            <a:fillRef idx="0">
+              <a:schemeClr val="accent1"/>
+            </a:fillRef>
+            <a:effectRef idx="0">
+              <a:schemeClr val="accent1"/>
+            </a:effectRef>
+            <a:fontRef idx="minor">
+              <a:schemeClr val="tx1"/>
+            </a:fontRef>
+          </p:style>
+        </p:cxnSp>
+        <p:cxnSp>
+          <p:nvCxnSpPr>
+            <p:cNvPr id="136" name="Gerader Verbinder 135">
+              <a:extLst>
+                <a:ext uri="{FF2B5EF4-FFF2-40B4-BE49-F238E27FC236}">
+                  <a16:creationId xmlns:a16="http://schemas.microsoft.com/office/drawing/2014/main" id="{28F3C22B-EF2B-495D-B0F7-1F6150CC76AE}"/>
+                </a:ext>
+              </a:extLst>
+            </p:cNvPr>
+            <p:cNvCxnSpPr>
+              <a:cxnSpLocks/>
+            </p:cNvCxnSpPr>
+            <p:nvPr/>
+          </p:nvCxnSpPr>
+          <p:spPr>
+            <a:xfrm>
+              <a:off x="4031633" y="3014794"/>
+              <a:ext cx="0" cy="3567098"/>
+            </a:xfrm>
+            <a:prstGeom prst="line">
+              <a:avLst/>
+            </a:prstGeom>
+            <a:ln w="25400">
+              <a:solidFill>
+                <a:srgbClr val="FF7F2B"/>
+              </a:solidFill>
+              <a:prstDash val="dash"/>
+            </a:ln>
+          </p:spPr>
+          <p:style>
+            <a:lnRef idx="1">
+              <a:schemeClr val="accent1"/>
+            </a:lnRef>
+            <a:fillRef idx="0">
+              <a:schemeClr val="accent1"/>
+            </a:fillRef>
+            <a:effectRef idx="0">
+              <a:schemeClr val="accent1"/>
+            </a:effectRef>
+            <a:fontRef idx="minor">
+              <a:schemeClr val="tx1"/>
+            </a:fontRef>
+          </p:style>
+        </p:cxnSp>
+        <p:pic>
+          <p:nvPicPr>
+            <p:cNvPr id="152" name="Grafik 151">
+              <a:extLst>
+                <a:ext uri="{FF2B5EF4-FFF2-40B4-BE49-F238E27FC236}">
+                  <a16:creationId xmlns:a16="http://schemas.microsoft.com/office/drawing/2014/main" id="{E805C468-2CC1-4417-ACC9-2207A0A28D5D}"/>
+                </a:ext>
+              </a:extLst>
+            </p:cNvPr>
+            <p:cNvPicPr>
+              <a:picLocks noChangeAspect="1"/>
+            </p:cNvPicPr>
+            <p:nvPr>
+              <p:custDataLst>
+                <p:tags r:id="rId4"/>
+              </p:custDataLst>
+            </p:nvPr>
+          </p:nvPicPr>
+          <p:blipFill>
+            <a:blip r:embed="rId27">
+              <a:extLst>
+                <a:ext uri="{28A0092B-C50C-407E-A947-70E740481C1C}">
+                  <a14:useLocalDpi xmlns:a14="http://schemas.microsoft.com/office/drawing/2010/main" val="0"/>
+                </a:ext>
+              </a:extLst>
+            </a:blip>
+            <a:stretch>
+              <a:fillRect/>
+            </a:stretch>
+          </p:blipFill>
+          <p:spPr>
+            <a:xfrm>
+              <a:off x="3117750" y="3729207"/>
+              <a:ext cx="691338" cy="142004"/>
+            </a:xfrm>
+            <a:prstGeom prst="rect">
+              <a:avLst/>
+            </a:prstGeom>
+          </p:spPr>
+        </p:pic>
+        <p:pic>
+          <p:nvPicPr>
+            <p:cNvPr id="155" name="Grafik 154">
+              <a:extLst>
+                <a:ext uri="{FF2B5EF4-FFF2-40B4-BE49-F238E27FC236}">
+                  <a16:creationId xmlns:a16="http://schemas.microsoft.com/office/drawing/2014/main" id="{AF69AF47-0DA4-4C08-8868-81AAFA30C91C}"/>
+                </a:ext>
+              </a:extLst>
+            </p:cNvPr>
+            <p:cNvPicPr>
+              <a:picLocks noChangeAspect="1"/>
+            </p:cNvPicPr>
+            <p:nvPr>
+              <p:custDataLst>
+                <p:tags r:id="rId5"/>
+              </p:custDataLst>
+            </p:nvPr>
+          </p:nvPicPr>
+          <p:blipFill>
+            <a:blip r:embed="rId28">
+              <a:extLst>
+                <a:ext uri="{28A0092B-C50C-407E-A947-70E740481C1C}">
+                  <a14:useLocalDpi xmlns:a14="http://schemas.microsoft.com/office/drawing/2010/main" val="0"/>
+                </a:ext>
+              </a:extLst>
+            </a:blip>
+            <a:stretch>
+              <a:fillRect/>
+            </a:stretch>
+          </p:blipFill>
+          <p:spPr>
+            <a:xfrm>
+              <a:off x="3004985" y="3932894"/>
+              <a:ext cx="916868" cy="177483"/>
+            </a:xfrm>
+            <a:prstGeom prst="rect">
+              <a:avLst/>
+            </a:prstGeom>
+          </p:spPr>
+        </p:pic>
+        <p:pic>
+          <p:nvPicPr>
+            <p:cNvPr id="159" name="Grafik 158">
+              <a:extLst>
+                <a:ext uri="{FF2B5EF4-FFF2-40B4-BE49-F238E27FC236}">
+                  <a16:creationId xmlns:a16="http://schemas.microsoft.com/office/drawing/2014/main" id="{98F38FE3-AA5B-4C45-B8DC-6F23DB11A04D}"/>
+                </a:ext>
+              </a:extLst>
+            </p:cNvPr>
+            <p:cNvPicPr>
+              <a:picLocks noChangeAspect="1"/>
+            </p:cNvPicPr>
+            <p:nvPr>
+              <p:custDataLst>
+                <p:tags r:id="rId6"/>
+              </p:custDataLst>
+            </p:nvPr>
+          </p:nvPicPr>
+          <p:blipFill>
+            <a:blip r:embed="rId29">
+              <a:extLst>
+                <a:ext uri="{28A0092B-C50C-407E-A947-70E740481C1C}">
+                  <a14:useLocalDpi xmlns:a14="http://schemas.microsoft.com/office/drawing/2010/main" val="0"/>
+                </a:ext>
+              </a:extLst>
+            </a:blip>
+            <a:stretch>
+              <a:fillRect/>
+            </a:stretch>
+          </p:blipFill>
+          <p:spPr>
+            <a:xfrm>
+              <a:off x="-3286493" y="2507305"/>
+              <a:ext cx="4723821" cy="397150"/>
+            </a:xfrm>
+            <a:prstGeom prst="rect">
+              <a:avLst/>
+            </a:prstGeom>
+          </p:spPr>
+        </p:pic>
+        <p:pic>
+          <p:nvPicPr>
+            <p:cNvPr id="162" name="Grafik 161">
+              <a:extLst>
+                <a:ext uri="{FF2B5EF4-FFF2-40B4-BE49-F238E27FC236}">
+                  <a16:creationId xmlns:a16="http://schemas.microsoft.com/office/drawing/2014/main" id="{302F1BBC-D1D8-4750-89B1-AB3BBA32B92C}"/>
+                </a:ext>
+              </a:extLst>
+            </p:cNvPr>
+            <p:cNvPicPr>
+              <a:picLocks noChangeAspect="1"/>
+            </p:cNvPicPr>
+            <p:nvPr>
+              <p:custDataLst>
+                <p:tags r:id="rId7"/>
+              </p:custDataLst>
+            </p:nvPr>
+          </p:nvPicPr>
+          <p:blipFill>
+            <a:blip r:embed="rId30">
+              <a:extLst>
+                <a:ext uri="{28A0092B-C50C-407E-A947-70E740481C1C}">
+                  <a14:useLocalDpi xmlns:a14="http://schemas.microsoft.com/office/drawing/2010/main" val="0"/>
+                </a:ext>
+              </a:extLst>
+            </a:blip>
+            <a:stretch>
+              <a:fillRect/>
+            </a:stretch>
+          </p:blipFill>
+          <p:spPr>
+            <a:xfrm>
+              <a:off x="2306884" y="2509137"/>
+              <a:ext cx="5012395" cy="396215"/>
+            </a:xfrm>
+            <a:prstGeom prst="rect">
+              <a:avLst/>
+            </a:prstGeom>
+          </p:spPr>
+        </p:pic>
+        <p:pic>
+          <p:nvPicPr>
+            <p:cNvPr id="164" name="Grafik 163" descr="Ein Bild, das Foto, Boden, sitzend enthält.&#10;&#10;Automatisch generierte Beschreibung">
+              <a:extLst>
+                <a:ext uri="{FF2B5EF4-FFF2-40B4-BE49-F238E27FC236}">
+                  <a16:creationId xmlns:a16="http://schemas.microsoft.com/office/drawing/2014/main" id="{06697D5B-8455-4F10-94BC-C5D29B0B2EF8}"/>
+                </a:ext>
+              </a:extLst>
+            </p:cNvPr>
+            <p:cNvPicPr>
+              <a:picLocks noChangeAspect="1"/>
+            </p:cNvPicPr>
+            <p:nvPr/>
+          </p:nvPicPr>
+          <p:blipFill>
+            <a:blip r:embed="rId13">
+              <a:extLst>
+                <a:ext uri="{28A0092B-C50C-407E-A947-70E740481C1C}">
+                  <a14:useLocalDpi xmlns:a14="http://schemas.microsoft.com/office/drawing/2010/main" val="0"/>
+                </a:ext>
+              </a:extLst>
+            </a:blip>
+            <a:stretch>
+              <a:fillRect/>
+            </a:stretch>
+          </p:blipFill>
+          <p:spPr>
+            <a:xfrm>
+              <a:off x="7962819" y="3014794"/>
+              <a:ext cx="4780354" cy="3585266"/>
+            </a:xfrm>
+            <a:prstGeom prst="rect">
+              <a:avLst/>
+            </a:prstGeom>
+          </p:spPr>
+        </p:pic>
+        <p:pic>
+          <p:nvPicPr>
+            <p:cNvPr id="167" name="Grafik 166">
+              <a:extLst>
+                <a:ext uri="{FF2B5EF4-FFF2-40B4-BE49-F238E27FC236}">
+                  <a16:creationId xmlns:a16="http://schemas.microsoft.com/office/drawing/2014/main" id="{8E9CE3DA-3B52-4482-A5B7-DFA038B6DC0C}"/>
+                </a:ext>
+              </a:extLst>
+            </p:cNvPr>
+            <p:cNvPicPr>
+              <a:picLocks noChangeAspect="1"/>
+            </p:cNvPicPr>
+            <p:nvPr>
+              <p:custDataLst>
+                <p:tags r:id="rId8"/>
+              </p:custDataLst>
+            </p:nvPr>
+          </p:nvPicPr>
+          <p:blipFill>
+            <a:blip r:embed="rId31">
+              <a:extLst>
+                <a:ext uri="{28A0092B-C50C-407E-A947-70E740481C1C}">
+                  <a14:useLocalDpi xmlns:a14="http://schemas.microsoft.com/office/drawing/2010/main" val="0"/>
+                </a:ext>
+              </a:extLst>
+            </a:blip>
+            <a:stretch>
+              <a:fillRect/>
+            </a:stretch>
+          </p:blipFill>
+          <p:spPr>
+            <a:xfrm>
+              <a:off x="8543725" y="2502938"/>
+              <a:ext cx="3618542" cy="401517"/>
+            </a:xfrm>
+            <a:prstGeom prst="rect">
+              <a:avLst/>
+            </a:prstGeom>
+          </p:spPr>
+        </p:pic>
+        <p:cxnSp>
+          <p:nvCxnSpPr>
+            <p:cNvPr id="168" name="Gerade Verbindung mit Pfeil 167">
+              <a:extLst>
+                <a:ext uri="{FF2B5EF4-FFF2-40B4-BE49-F238E27FC236}">
+                  <a16:creationId xmlns:a16="http://schemas.microsoft.com/office/drawing/2014/main" id="{6E80F009-EA0F-408D-AB44-625200202E96}"/>
+                </a:ext>
+              </a:extLst>
+            </p:cNvPr>
+            <p:cNvCxnSpPr>
+              <a:cxnSpLocks/>
+            </p:cNvCxnSpPr>
+            <p:nvPr/>
+          </p:nvCxnSpPr>
+          <p:spPr>
+            <a:xfrm>
+              <a:off x="7327704" y="4798343"/>
+              <a:ext cx="518155" cy="0"/>
+            </a:xfrm>
+            <a:prstGeom prst="straightConnector1">
+              <a:avLst/>
+            </a:prstGeom>
+            <a:ln w="25400">
+              <a:solidFill>
+                <a:schemeClr val="tx1"/>
+              </a:solidFill>
+              <a:tailEnd type="triangle"/>
+            </a:ln>
+          </p:spPr>
+          <p:style>
+            <a:lnRef idx="1">
+              <a:schemeClr val="accent1"/>
+            </a:lnRef>
+            <a:fillRef idx="0">
+              <a:schemeClr val="accent1"/>
+            </a:fillRef>
+            <a:effectRef idx="0">
+              <a:schemeClr val="accent1"/>
+            </a:effectRef>
+            <a:fontRef idx="minor">
+              <a:schemeClr val="tx1"/>
+            </a:fontRef>
+          </p:style>
+        </p:cxnSp>
+      </p:grpSp>
+    </p:spTree>
+    <p:extLst>
+      <p:ext uri="{BB962C8B-B14F-4D97-AF65-F5344CB8AC3E}">
+        <p14:creationId xmlns:p14="http://schemas.microsoft.com/office/powerpoint/2010/main" val="2517532268"/>
       </p:ext>
     </p:extLst>
   </p:cSld>
@@ -17195,25 +19089,6 @@
 <file path=ppt/tags/tag46.xml><?xml version="1.0" encoding="utf-8"?>
 <p:tagLst xmlns:a="http://schemas.openxmlformats.org/drawingml/2006/main" xmlns:r="http://schemas.openxmlformats.org/officeDocument/2006/relationships" xmlns:p="http://schemas.openxmlformats.org/presentationml/2006/main">
   <p:tag name="OUTPUTDPI" val="1200"/>
-  <p:tag name="ORIGINALHEIGHT" val="112,4859"/>
-  <p:tag name="ORIGINALWIDTH" val="909,6363"/>
-  <p:tag name="LATEXADDIN" val="\documentclass{article}&#10;\usepackage{amsmath}&#10;\usepackage{color}&#10;\pagestyle{empty}&#10;\begin{document}&#10;%\color{white}&#10;Support Polygon&#10;\end{document}"/>
-  <p:tag name="IGUANATEXSIZE" val="20"/>
-  <p:tag name="IGUANATEXCURSOR" val="129"/>
-  <p:tag name="TRANSPARENCY" val="Wahr"/>
-  <p:tag name="FILENAME" val=""/>
-  <p:tag name="LATEXENGINEID" val="0"/>
-  <p:tag name="TEMPFOLDER" val="c:\temp\"/>
-  <p:tag name="LATEXFORMHEIGHT" val="312"/>
-  <p:tag name="LATEXFORMWIDTH" val="384"/>
-  <p:tag name="LATEXFORMWRAP" val="Wahr"/>
-  <p:tag name="BITMAPVECTOR" val="0"/>
-</p:tagLst>
-</file>
-
-<file path=ppt/tags/tag47.xml><?xml version="1.0" encoding="utf-8"?>
-<p:tagLst xmlns:a="http://schemas.openxmlformats.org/drawingml/2006/main" xmlns:r="http://schemas.openxmlformats.org/officeDocument/2006/relationships" xmlns:p="http://schemas.openxmlformats.org/presentationml/2006/main">
-  <p:tag name="OUTPUTDPI" val="1200"/>
   <p:tag name="ORIGINALHEIGHT" val="111,7361"/>
   <p:tag name="ORIGINALWIDTH" val="665,1669"/>
   <p:tag name="LATEXADDIN" val="\documentclass{article}&#10;\usepackage{amsmath}&#10;\usepackage{color}&#10;\pagestyle{empty}&#10;\begin{document}&#10;%\color{white}&#10;Foot Length&#10;\end{document}"/>
@@ -17230,7 +19105,7 @@
 </p:tagLst>
 </file>
 
-<file path=ppt/tags/tag48.xml><?xml version="1.0" encoding="utf-8"?>
+<file path=ppt/tags/tag47.xml><?xml version="1.0" encoding="utf-8"?>
 <p:tagLst xmlns:a="http://schemas.openxmlformats.org/drawingml/2006/main" xmlns:r="http://schemas.openxmlformats.org/officeDocument/2006/relationships" xmlns:p="http://schemas.openxmlformats.org/presentationml/2006/main">
   <p:tag name="OUTPUTDPI" val="1200"/>
   <p:tag name="ORIGINALHEIGHT" val="89,23882"/>
@@ -17249,7 +19124,7 @@
 </p:tagLst>
 </file>
 
-<file path=ppt/tags/tag49.xml><?xml version="1.0" encoding="utf-8"?>
+<file path=ppt/tags/tag48.xml><?xml version="1.0" encoding="utf-8"?>
 <p:tagLst xmlns:a="http://schemas.openxmlformats.org/drawingml/2006/main" xmlns:r="http://schemas.openxmlformats.org/officeDocument/2006/relationships" xmlns:p="http://schemas.openxmlformats.org/presentationml/2006/main">
   <p:tag name="OUTPUTDPI" val="1200"/>
   <p:tag name="ORIGINALHEIGHT" val="112,4859"/>
@@ -17257,6 +19132,25 @@
   <p:tag name="LATEXADDIN" val="\documentclass{article}&#10;\usepackage{amsmath}&#10;\usepackage{color}&#10;\pagestyle{empty}&#10;\begin{document}&#10;%\color{white}&#10;Security Margin&#10;\end{document}"/>
   <p:tag name="IGUANATEXSIZE" val="20"/>
   <p:tag name="IGUANATEXCURSOR" val="129"/>
+  <p:tag name="TRANSPARENCY" val="Wahr"/>
+  <p:tag name="FILENAME" val=""/>
+  <p:tag name="LATEXENGINEID" val="0"/>
+  <p:tag name="TEMPFOLDER" val="c:\temp\"/>
+  <p:tag name="LATEXFORMHEIGHT" val="312"/>
+  <p:tag name="LATEXFORMWIDTH" val="384"/>
+  <p:tag name="LATEXFORMWRAP" val="Wahr"/>
+  <p:tag name="BITMAPVECTOR" val="0"/>
+</p:tagLst>
+</file>
+
+<file path=ppt/tags/tag49.xml><?xml version="1.0" encoding="utf-8"?>
+<p:tagLst xmlns:a="http://schemas.openxmlformats.org/drawingml/2006/main" xmlns:r="http://schemas.openxmlformats.org/officeDocument/2006/relationships" xmlns:p="http://schemas.openxmlformats.org/presentationml/2006/main">
+  <p:tag name="OUTPUTDPI" val="1200"/>
+  <p:tag name="ORIGINALHEIGHT" val="56,99291"/>
+  <p:tag name="ORIGINALWIDTH" val="59,2426"/>
+  <p:tag name="LATEXADDIN" val="\documentclass{article}&#10;\usepackage{amsmath}&#10;\usepackage{bm}&#10;\usepackage{color}&#10;\pagestyle{empty}&#10;\begin{document}&#10;%\color{white}&#10;\begin{equation}&#10;\bm{r}&#10;\nonumber&#10;\end{equation}&#10;\end{document}"/>
+  <p:tag name="IGUANATEXSIZE" val="20"/>
+  <p:tag name="IGUANATEXCURSOR" val="150"/>
   <p:tag name="TRANSPARENCY" val="Wahr"/>
   <p:tag name="FILENAME" val=""/>
   <p:tag name="LATEXENGINEID" val="0"/>
@@ -17290,25 +19184,6 @@
 <file path=ppt/tags/tag50.xml><?xml version="1.0" encoding="utf-8"?>
 <p:tagLst xmlns:a="http://schemas.openxmlformats.org/drawingml/2006/main" xmlns:r="http://schemas.openxmlformats.org/officeDocument/2006/relationships" xmlns:p="http://schemas.openxmlformats.org/presentationml/2006/main">
   <p:tag name="OUTPUTDPI" val="1200"/>
-  <p:tag name="ORIGINALHEIGHT" val="56,99291"/>
-  <p:tag name="ORIGINALWIDTH" val="59,2426"/>
-  <p:tag name="LATEXADDIN" val="\documentclass{article}&#10;\usepackage{amsmath}&#10;\usepackage{bm}&#10;\usepackage{color}&#10;\pagestyle{empty}&#10;\begin{document}&#10;%\color{white}&#10;\begin{equation}&#10;\bm{r}&#10;\nonumber&#10;\end{equation}&#10;\end{document}"/>
-  <p:tag name="IGUANATEXSIZE" val="20"/>
-  <p:tag name="IGUANATEXCURSOR" val="150"/>
-  <p:tag name="TRANSPARENCY" val="Wahr"/>
-  <p:tag name="FILENAME" val=""/>
-  <p:tag name="LATEXENGINEID" val="0"/>
-  <p:tag name="TEMPFOLDER" val="c:\temp\"/>
-  <p:tag name="LATEXFORMHEIGHT" val="312"/>
-  <p:tag name="LATEXFORMWIDTH" val="384"/>
-  <p:tag name="LATEXFORMWRAP" val="Wahr"/>
-  <p:tag name="BITMAPVECTOR" val="0"/>
-</p:tagLst>
-</file>
-
-<file path=ppt/tags/tag51.xml><?xml version="1.0" encoding="utf-8"?>
-<p:tagLst xmlns:a="http://schemas.openxmlformats.org/drawingml/2006/main" xmlns:r="http://schemas.openxmlformats.org/officeDocument/2006/relationships" xmlns:p="http://schemas.openxmlformats.org/presentationml/2006/main">
-  <p:tag name="OUTPUTDPI" val="1200"/>
   <p:tag name="ORIGINALHEIGHT" val="104,237"/>
   <p:tag name="ORIGINALWIDTH" val="125,2343"/>
   <p:tag name="LATEXADDIN" val="\documentclass{article}&#10;\usepackage{amsmath}&#10;\usepackage{bm}&#10;\usepackage{color}&#10;\pagestyle{empty}&#10;\begin{document}&#10;%\color{white}&#10;\begin{equation}&#10;\bm{F}_r&#10;\nonumber&#10;\end{equation}&#10;\end{document}"/>
@@ -17325,7 +19200,7 @@
 </p:tagLst>
 </file>
 
-<file path=ppt/tags/tag52.xml><?xml version="1.0" encoding="utf-8"?>
+<file path=ppt/tags/tag51.xml><?xml version="1.0" encoding="utf-8"?>
 <p:tagLst xmlns:a="http://schemas.openxmlformats.org/drawingml/2006/main" xmlns:r="http://schemas.openxmlformats.org/officeDocument/2006/relationships" xmlns:p="http://schemas.openxmlformats.org/presentationml/2006/main">
   <p:tag name="OUTPUTDPI" val="1200"/>
   <p:tag name="ORIGINALHEIGHT" val="104,9868"/>
@@ -17344,7 +19219,7 @@
 </p:tagLst>
 </file>
 
-<file path=ppt/tags/tag53.xml><?xml version="1.0" encoding="utf-8"?>
+<file path=ppt/tags/tag52.xml><?xml version="1.0" encoding="utf-8"?>
 <p:tagLst xmlns:a="http://schemas.openxmlformats.org/drawingml/2006/main" xmlns:r="http://schemas.openxmlformats.org/officeDocument/2006/relationships" xmlns:p="http://schemas.openxmlformats.org/presentationml/2006/main">
   <p:tag name="OUTPUTDPI" val="1200"/>
   <p:tag name="ORIGINALHEIGHT" val="104,9868"/>
@@ -17363,7 +19238,7 @@
 </p:tagLst>
 </file>
 
-<file path=ppt/tags/tag54.xml><?xml version="1.0" encoding="utf-8"?>
+<file path=ppt/tags/tag53.xml><?xml version="1.0" encoding="utf-8"?>
 <p:tagLst xmlns:a="http://schemas.openxmlformats.org/drawingml/2006/main" xmlns:r="http://schemas.openxmlformats.org/officeDocument/2006/relationships" xmlns:p="http://schemas.openxmlformats.org/presentationml/2006/main">
   <p:tag name="OUTPUTDPI" val="1200"/>
   <p:tag name="ORIGINALHEIGHT" val="122,2347"/>
@@ -17382,26 +19257,7 @@
 </p:tagLst>
 </file>
 
-<file path=ppt/tags/tag55.xml><?xml version="1.0" encoding="utf-8"?>
-<p:tagLst xmlns:a="http://schemas.openxmlformats.org/drawingml/2006/main" xmlns:r="http://schemas.openxmlformats.org/officeDocument/2006/relationships" xmlns:p="http://schemas.openxmlformats.org/presentationml/2006/main">
-  <p:tag name="OUTPUTDPI" val="1200"/>
-  <p:tag name="ORIGINALHEIGHT" val="86,23921"/>
-  <p:tag name="ORIGINALWIDTH" val="236,9704"/>
-  <p:tag name="LATEXADDIN" val="\documentclass{article}&#10;\usepackage{amsmath}&#10;\usepackage{color}&#10;\pagestyle{empty}&#10;\begin{document}&#10;%\color{white}&#10;Foot&#10;\end{document}"/>
-  <p:tag name="IGUANATEXSIZE" val="20"/>
-  <p:tag name="IGUANATEXCURSOR" val="118"/>
-  <p:tag name="TRANSPARENCY" val="Wahr"/>
-  <p:tag name="FILENAME" val=""/>
-  <p:tag name="LATEXENGINEID" val="0"/>
-  <p:tag name="TEMPFOLDER" val="c:\temp\"/>
-  <p:tag name="LATEXFORMHEIGHT" val="312"/>
-  <p:tag name="LATEXFORMWIDTH" val="384"/>
-  <p:tag name="LATEXFORMWRAP" val="Wahr"/>
-  <p:tag name="BITMAPVECTOR" val="0"/>
-</p:tagLst>
-</file>
-
-<file path=ppt/tags/tag56.xml><?xml version="1.0" encoding="utf-8"?>
+<file path=ppt/tags/tag54.xml><?xml version="1.0" encoding="utf-8"?>
 <p:tagLst xmlns:a="http://schemas.openxmlformats.org/drawingml/2006/main" xmlns:r="http://schemas.openxmlformats.org/officeDocument/2006/relationships" xmlns:p="http://schemas.openxmlformats.org/presentationml/2006/main">
   <p:tag name="OUTPUTDPI" val="1200"/>
   <p:tag name="ORIGINALHEIGHT" val="104,237"/>
@@ -17420,7 +19276,7 @@
 </p:tagLst>
 </file>
 
-<file path=ppt/tags/tag57.xml><?xml version="1.0" encoding="utf-8"?>
+<file path=ppt/tags/tag55.xml><?xml version="1.0" encoding="utf-8"?>
 <p:tagLst xmlns:a="http://schemas.openxmlformats.org/drawingml/2006/main" xmlns:r="http://schemas.openxmlformats.org/officeDocument/2006/relationships" xmlns:p="http://schemas.openxmlformats.org/presentationml/2006/main">
   <p:tag name="OUTPUTDPI" val="1200"/>
   <p:tag name="ORIGINALHEIGHT" val="121,4848"/>
@@ -17439,7 +19295,7 @@
 </p:tagLst>
 </file>
 
-<file path=ppt/tags/tag58.xml><?xml version="1.0" encoding="utf-8"?>
+<file path=ppt/tags/tag56.xml><?xml version="1.0" encoding="utf-8"?>
 <p:tagLst xmlns:a="http://schemas.openxmlformats.org/drawingml/2006/main" xmlns:r="http://schemas.openxmlformats.org/officeDocument/2006/relationships" xmlns:p="http://schemas.openxmlformats.org/presentationml/2006/main">
   <p:tag name="OUTPUTDPI" val="1200"/>
   <p:tag name="ORIGINALHEIGHT" val="107,2366"/>
@@ -17458,7 +19314,7 @@
 </p:tagLst>
 </file>
 
-<file path=ppt/tags/tag59.xml><?xml version="1.0" encoding="utf-8"?>
+<file path=ppt/tags/tag57.xml><?xml version="1.0" encoding="utf-8"?>
 <p:tagLst xmlns:a="http://schemas.openxmlformats.org/drawingml/2006/main" xmlns:r="http://schemas.openxmlformats.org/officeDocument/2006/relationships" xmlns:p="http://schemas.openxmlformats.org/presentationml/2006/main">
   <p:tag name="OUTPUTDPI" val="1200"/>
   <p:tag name="ORIGINALHEIGHT" val="124,4844"/>
@@ -17466,6 +19322,44 @@
   <p:tag name="LATEXADDIN" val="\documentclass{article}&#10;\usepackage{amsmath}&#10;\usepackage{bm}&#10;\usepackage{color}&#10;\pagestyle{empty}&#10;\begin{document}&#10;%\color{white}&#10;\begin{equation}&#10;\bm{S}_y&#10;\nonumber&#10;\end{equation}&#10;\end{document}"/>
   <p:tag name="IGUANATEXSIZE" val="20"/>
   <p:tag name="IGUANATEXCURSOR" val="60"/>
+  <p:tag name="TRANSPARENCY" val="Wahr"/>
+  <p:tag name="FILENAME" val=""/>
+  <p:tag name="LATEXENGINEID" val="0"/>
+  <p:tag name="TEMPFOLDER" val="c:\temp\"/>
+  <p:tag name="LATEXFORMHEIGHT" val="312"/>
+  <p:tag name="LATEXFORMWIDTH" val="384"/>
+  <p:tag name="LATEXFORMWRAP" val="Wahr"/>
+  <p:tag name="BITMAPVECTOR" val="0"/>
+</p:tagLst>
+</file>
+
+<file path=ppt/tags/tag58.xml><?xml version="1.0" encoding="utf-8"?>
+<p:tagLst xmlns:a="http://schemas.openxmlformats.org/drawingml/2006/main" xmlns:r="http://schemas.openxmlformats.org/officeDocument/2006/relationships" xmlns:p="http://schemas.openxmlformats.org/presentationml/2006/main">
+  <p:tag name="OUTPUTDPI" val="1200"/>
+  <p:tag name="ORIGINALHEIGHT" val="107,2366"/>
+  <p:tag name="ORIGINALWIDTH" val="124,4844"/>
+  <p:tag name="LATEXADDIN" val="\documentclass{article}&#10;\usepackage{amsmath}&#10;\usepackage{bm}&#10;\usepackage{color}&#10;\pagestyle{empty}&#10;\begin{document}&#10;%\color{white}&#10;\begin{equation}&#10;\bm{S}_z&#10;\nonumber&#10;\end{equation}&#10;\end{document}"/>
+  <p:tag name="IGUANATEXSIZE" val="20"/>
+  <p:tag name="IGUANATEXCURSOR" val="150"/>
+  <p:tag name="TRANSPARENCY" val="Wahr"/>
+  <p:tag name="FILENAME" val=""/>
+  <p:tag name="LATEXENGINEID" val="0"/>
+  <p:tag name="TEMPFOLDER" val="c:\temp\"/>
+  <p:tag name="LATEXFORMHEIGHT" val="312"/>
+  <p:tag name="LATEXFORMWIDTH" val="384"/>
+  <p:tag name="LATEXFORMWRAP" val="Wahr"/>
+  <p:tag name="BITMAPVECTOR" val="0"/>
+</p:tagLst>
+</file>
+
+<file path=ppt/tags/tag59.xml><?xml version="1.0" encoding="utf-8"?>
+<p:tagLst xmlns:a="http://schemas.openxmlformats.org/drawingml/2006/main" xmlns:r="http://schemas.openxmlformats.org/officeDocument/2006/relationships" xmlns:p="http://schemas.openxmlformats.org/presentationml/2006/main">
+  <p:tag name="OUTPUTDPI" val="1200"/>
+  <p:tag name="ORIGINALHEIGHT" val="56,99291"/>
+  <p:tag name="ORIGINALWIDTH" val="58,49268"/>
+  <p:tag name="LATEXADDIN" val="\documentclass{article}&#10;\usepackage{amsmath}&#10;\usepackage{bm}&#10;\usepackage{color}&#10;\pagestyle{empty}&#10;\begin{document}&#10;%\color{white}&#10;\begin{equation}&#10;\bm{c}&#10;\nonumber&#10;\end{equation}&#10;\end{document}"/>
+  <p:tag name="IGUANATEXSIZE" val="20"/>
+  <p:tag name="IGUANATEXCURSOR" val="150"/>
   <p:tag name="TRANSPARENCY" val="Wahr"/>
   <p:tag name="FILENAME" val=""/>
   <p:tag name="LATEXENGINEID" val="0"/>
@@ -17500,44 +19394,6 @@
 <p:tagLst xmlns:a="http://schemas.openxmlformats.org/drawingml/2006/main" xmlns:r="http://schemas.openxmlformats.org/officeDocument/2006/relationships" xmlns:p="http://schemas.openxmlformats.org/presentationml/2006/main">
   <p:tag name="OUTPUTDPI" val="1200"/>
   <p:tag name="ORIGINALHEIGHT" val="107,2366"/>
-  <p:tag name="ORIGINALWIDTH" val="124,4844"/>
-  <p:tag name="LATEXADDIN" val="\documentclass{article}&#10;\usepackage{amsmath}&#10;\usepackage{bm}&#10;\usepackage{color}&#10;\pagestyle{empty}&#10;\begin{document}&#10;%\color{white}&#10;\begin{equation}&#10;\bm{S}_z&#10;\nonumber&#10;\end{equation}&#10;\end{document}"/>
-  <p:tag name="IGUANATEXSIZE" val="20"/>
-  <p:tag name="IGUANATEXCURSOR" val="150"/>
-  <p:tag name="TRANSPARENCY" val="Wahr"/>
-  <p:tag name="FILENAME" val=""/>
-  <p:tag name="LATEXENGINEID" val="0"/>
-  <p:tag name="TEMPFOLDER" val="c:\temp\"/>
-  <p:tag name="LATEXFORMHEIGHT" val="312"/>
-  <p:tag name="LATEXFORMWIDTH" val="384"/>
-  <p:tag name="LATEXFORMWRAP" val="Wahr"/>
-  <p:tag name="BITMAPVECTOR" val="0"/>
-</p:tagLst>
-</file>
-
-<file path=ppt/tags/tag61.xml><?xml version="1.0" encoding="utf-8"?>
-<p:tagLst xmlns:a="http://schemas.openxmlformats.org/drawingml/2006/main" xmlns:r="http://schemas.openxmlformats.org/officeDocument/2006/relationships" xmlns:p="http://schemas.openxmlformats.org/presentationml/2006/main">
-  <p:tag name="OUTPUTDPI" val="1200"/>
-  <p:tag name="ORIGINALHEIGHT" val="56,99291"/>
-  <p:tag name="ORIGINALWIDTH" val="58,49268"/>
-  <p:tag name="LATEXADDIN" val="\documentclass{article}&#10;\usepackage{amsmath}&#10;\usepackage{bm}&#10;\usepackage{color}&#10;\pagestyle{empty}&#10;\begin{document}&#10;%\color{white}&#10;\begin{equation}&#10;\bm{c}&#10;\nonumber&#10;\end{equation}&#10;\end{document}"/>
-  <p:tag name="IGUANATEXSIZE" val="20"/>
-  <p:tag name="IGUANATEXCURSOR" val="150"/>
-  <p:tag name="TRANSPARENCY" val="Wahr"/>
-  <p:tag name="FILENAME" val=""/>
-  <p:tag name="LATEXENGINEID" val="0"/>
-  <p:tag name="TEMPFOLDER" val="c:\temp\"/>
-  <p:tag name="LATEXFORMHEIGHT" val="312"/>
-  <p:tag name="LATEXFORMWIDTH" val="384"/>
-  <p:tag name="LATEXFORMWRAP" val="Wahr"/>
-  <p:tag name="BITMAPVECTOR" val="0"/>
-</p:tagLst>
-</file>
-
-<file path=ppt/tags/tag62.xml><?xml version="1.0" encoding="utf-8"?>
-<p:tagLst xmlns:a="http://schemas.openxmlformats.org/drawingml/2006/main" xmlns:r="http://schemas.openxmlformats.org/officeDocument/2006/relationships" xmlns:p="http://schemas.openxmlformats.org/presentationml/2006/main">
-  <p:tag name="OUTPUTDPI" val="1200"/>
-  <p:tag name="ORIGINALHEIGHT" val="107,2366"/>
   <p:tag name="ORIGINALWIDTH" val="224,222"/>
   <p:tag name="LATEXADDIN" val="\documentclass{article}&#10;\usepackage{amsmath}&#10;\usepackage{bm}&#10;\usepackage{color}&#10;\pagestyle{empty}&#10;\begin{document}&#10;%\color{white}&#10;\begin{equation}&#10;-\bm{S}_x&#10;\nonumber&#10;\end{equation}&#10;\end{document}"/>
   <p:tag name="IGUANATEXSIZE" val="20"/>
@@ -17553,7 +19409,7 @@
 </p:tagLst>
 </file>
 
-<file path=ppt/tags/tag63.xml><?xml version="1.0" encoding="utf-8"?>
+<file path=ppt/tags/tag61.xml><?xml version="1.0" encoding="utf-8"?>
 <p:tagLst xmlns:a="http://schemas.openxmlformats.org/drawingml/2006/main" xmlns:r="http://schemas.openxmlformats.org/officeDocument/2006/relationships" xmlns:p="http://schemas.openxmlformats.org/presentationml/2006/main">
   <p:tag name="OUTPUTDPI" val="1200"/>
   <p:tag name="ORIGINALHEIGHT" val="124,4844"/>
@@ -17572,7 +19428,7 @@
 </p:tagLst>
 </file>
 
-<file path=ppt/tags/tag64.xml><?xml version="1.0" encoding="utf-8"?>
+<file path=ppt/tags/tag62.xml><?xml version="1.0" encoding="utf-8"?>
 <p:tagLst xmlns:a="http://schemas.openxmlformats.org/drawingml/2006/main" xmlns:r="http://schemas.openxmlformats.org/officeDocument/2006/relationships" xmlns:p="http://schemas.openxmlformats.org/presentationml/2006/main">
   <p:tag name="OUTPUTDPI" val="1200"/>
   <p:tag name="ORIGINALHEIGHT" val="107,2366"/>
@@ -17591,7 +19447,7 @@
 </p:tagLst>
 </file>
 
-<file path=ppt/tags/tag65.xml><?xml version="1.0" encoding="utf-8"?>
+<file path=ppt/tags/tag63.xml><?xml version="1.0" encoding="utf-8"?>
 <p:tagLst xmlns:a="http://schemas.openxmlformats.org/drawingml/2006/main" xmlns:r="http://schemas.openxmlformats.org/officeDocument/2006/relationships" xmlns:p="http://schemas.openxmlformats.org/presentationml/2006/main">
   <p:tag name="OUTPUTDPI" val="1200"/>
   <p:tag name="ORIGINALHEIGHT" val="56,99291"/>
@@ -17610,7 +19466,7 @@
 </p:tagLst>
 </file>
 
-<file path=ppt/tags/tag66.xml><?xml version="1.0" encoding="utf-8"?>
+<file path=ppt/tags/tag64.xml><?xml version="1.0" encoding="utf-8"?>
 <p:tagLst xmlns:a="http://schemas.openxmlformats.org/drawingml/2006/main" xmlns:r="http://schemas.openxmlformats.org/officeDocument/2006/relationships" xmlns:p="http://schemas.openxmlformats.org/presentationml/2006/main">
   <p:tag name="OUTPUTDPI" val="1200"/>
   <p:tag name="ORIGINALHEIGHT" val="104,237"/>
@@ -17629,7 +19485,7 @@
 </p:tagLst>
 </file>
 
-<file path=ppt/tags/tag67.xml><?xml version="1.0" encoding="utf-8"?>
+<file path=ppt/tags/tag65.xml><?xml version="1.0" encoding="utf-8"?>
 <p:tagLst xmlns:a="http://schemas.openxmlformats.org/drawingml/2006/main" xmlns:r="http://schemas.openxmlformats.org/officeDocument/2006/relationships" xmlns:p="http://schemas.openxmlformats.org/presentationml/2006/main">
   <p:tag name="OUTPUTDPI" val="1200"/>
   <p:tag name="ORIGINALHEIGHT" val="112,4859"/>
@@ -17648,7 +19504,7 @@
 </p:tagLst>
 </file>
 
-<file path=ppt/tags/tag68.xml><?xml version="1.0" encoding="utf-8"?>
+<file path=ppt/tags/tag66.xml><?xml version="1.0" encoding="utf-8"?>
 <p:tagLst xmlns:a="http://schemas.openxmlformats.org/drawingml/2006/main" xmlns:r="http://schemas.openxmlformats.org/officeDocument/2006/relationships" xmlns:p="http://schemas.openxmlformats.org/presentationml/2006/main">
   <p:tag name="OUTPUTDPI" val="1200"/>
   <p:tag name="ORIGINALHEIGHT" val="87,73905"/>
@@ -17656,6 +19512,63 @@
   <p:tag name="LATEXADDIN" val="\documentclass{article}&#10;\usepackage{amsmath}&#10;\usepackage{color}&#10;\pagestyle{empty}&#10;\begin{document}&#10;%\color{white}&#10;Inverted Pendulum&#10;\end{document}"/>
   <p:tag name="IGUANATEXSIZE" val="20"/>
   <p:tag name="IGUANATEXCURSOR" val="131"/>
+  <p:tag name="TRANSPARENCY" val="Wahr"/>
+  <p:tag name="FILENAME" val=""/>
+  <p:tag name="LATEXENGINEID" val="0"/>
+  <p:tag name="TEMPFOLDER" val="c:\temp\"/>
+  <p:tag name="LATEXFORMHEIGHT" val="312"/>
+  <p:tag name="LATEXFORMWIDTH" val="384"/>
+  <p:tag name="LATEXFORMWRAP" val="Wahr"/>
+  <p:tag name="BITMAPVECTOR" val="0"/>
+</p:tagLst>
+</file>
+
+<file path=ppt/tags/tag67.xml><?xml version="1.0" encoding="utf-8"?>
+<p:tagLst xmlns:a="http://schemas.openxmlformats.org/drawingml/2006/main" xmlns:r="http://schemas.openxmlformats.org/officeDocument/2006/relationships" xmlns:p="http://schemas.openxmlformats.org/presentationml/2006/main">
+  <p:tag name="OUTPUTDPI" val="1200"/>
+  <p:tag name="ORIGINALHEIGHT" val="110,2362"/>
+  <p:tag name="ORIGINALWIDTH" val="740,1575"/>
+  <p:tag name="LATEXADDIN" val="\documentclass{article}&#10;\usepackage{amsmath}&#10;\usepackage{color}&#10;\pagestyle{empty}&#10;\begin{document}&#10;\color{white}&#10;Epipolar Line&#10;\end{document}"/>
+  <p:tag name="IGUANATEXSIZE" val="20"/>
+  <p:tag name="IGUANATEXCURSOR" val="126"/>
+  <p:tag name="TRANSPARENCY" val="Wahr"/>
+  <p:tag name="FILENAME" val=""/>
+  <p:tag name="LATEXENGINEID" val="0"/>
+  <p:tag name="TEMPFOLDER" val="c:\temp\"/>
+  <p:tag name="LATEXFORMHEIGHT" val="312"/>
+  <p:tag name="LATEXFORMWIDTH" val="384"/>
+  <p:tag name="LATEXFORMWRAP" val="Wahr"/>
+  <p:tag name="BITMAPVECTOR" val="0"/>
+</p:tagLst>
+</file>
+
+<file path=ppt/tags/tag68.xml><?xml version="1.0" encoding="utf-8"?>
+<p:tagLst xmlns:a="http://schemas.openxmlformats.org/drawingml/2006/main" xmlns:r="http://schemas.openxmlformats.org/officeDocument/2006/relationships" xmlns:p="http://schemas.openxmlformats.org/presentationml/2006/main">
+  <p:tag name="OUTPUTDPI" val="1200"/>
+  <p:tag name="ORIGINALHEIGHT" val="89,98874"/>
+  <p:tag name="ORIGINALWIDTH" val="554,9306"/>
+  <p:tag name="LATEXADDIN" val="\documentclass{article}&#10;\usepackage{amsmath}&#10;\usepackage{color}&#10;\pagestyle{empty}&#10;\begin{document}&#10;\color{white}&#10;Block Size&#10;\end{document}"/>
+  <p:tag name="IGUANATEXSIZE" val="20"/>
+  <p:tag name="IGUANATEXCURSOR" val="123"/>
+  <p:tag name="TRANSPARENCY" val="Wahr"/>
+  <p:tag name="FILENAME" val=""/>
+  <p:tag name="LATEXENGINEID" val="0"/>
+  <p:tag name="TEMPFOLDER" val="c:\temp\"/>
+  <p:tag name="LATEXFORMHEIGHT" val="312"/>
+  <p:tag name="LATEXFORMWIDTH" val="384"/>
+  <p:tag name="LATEXFORMWRAP" val="Wahr"/>
+  <p:tag name="BITMAPVECTOR" val="0"/>
+</p:tagLst>
+</file>
+
+<file path=ppt/tags/tag69.xml><?xml version="1.0" encoding="utf-8"?>
+<p:tagLst xmlns:a="http://schemas.openxmlformats.org/drawingml/2006/main" xmlns:r="http://schemas.openxmlformats.org/officeDocument/2006/relationships" xmlns:p="http://schemas.openxmlformats.org/presentationml/2006/main">
+  <p:tag name="OUTPUTDPI" val="1200"/>
+  <p:tag name="ORIGINALHEIGHT" val="110,2362"/>
+  <p:tag name="ORIGINALWIDTH" val="740,1575"/>
+  <p:tag name="LATEXADDIN" val="\documentclass{article}&#10;\usepackage{amsmath}&#10;\usepackage{color}&#10;\pagestyle{empty}&#10;\begin{document}&#10;\color{white}&#10;Epipolar Line&#10;\end{document}"/>
+  <p:tag name="IGUANATEXSIZE" val="20"/>
+  <p:tag name="IGUANATEXCURSOR" val="126"/>
   <p:tag name="TRANSPARENCY" val="Wahr"/>
   <p:tag name="FILENAME" val=""/>
   <p:tag name="LATEXENGINEID" val="0"/>
@@ -17675,6 +19588,158 @@
   <p:tag name="LATEXADDIN" val="\documentclass{article}&#10;\usepackage{amsmath}&#10;\usepackage{color}&#10;\pagestyle{empty}&#10;\begin{document}&#10;\color{white}&#10;Left and Right Foot&#10;\end{document}"/>
   <p:tag name="IGUANATEXSIZE" val="20"/>
   <p:tag name="IGUANATEXCURSOR" val="132"/>
+  <p:tag name="TRANSPARENCY" val="Wahr"/>
+  <p:tag name="FILENAME" val=""/>
+  <p:tag name="LATEXENGINEID" val="0"/>
+  <p:tag name="TEMPFOLDER" val="c:\temp\"/>
+  <p:tag name="LATEXFORMHEIGHT" val="312"/>
+  <p:tag name="LATEXFORMWIDTH" val="384"/>
+  <p:tag name="LATEXFORMWRAP" val="Wahr"/>
+  <p:tag name="BITMAPVECTOR" val="0"/>
+</p:tagLst>
+</file>
+
+<file path=ppt/tags/tag70.xml><?xml version="1.0" encoding="utf-8"?>
+<p:tagLst xmlns:a="http://schemas.openxmlformats.org/drawingml/2006/main" xmlns:r="http://schemas.openxmlformats.org/officeDocument/2006/relationships" xmlns:p="http://schemas.openxmlformats.org/presentationml/2006/main">
+  <p:tag name="OUTPUTDPI" val="1200"/>
+  <p:tag name="ORIGINALHEIGHT" val="87,73905"/>
+  <p:tag name="ORIGINALWIDTH" val="432,6959"/>
+  <p:tag name="LATEXADDIN" val="\documentclass{article}&#10;\usepackage{amsmath}&#10;\usepackage{color}&#10;\pagestyle{empty}&#10;\begin{document}&#10;\color{white}&#10;Number&#10;\end{document}"/>
+  <p:tag name="IGUANATEXSIZE" val="20"/>
+  <p:tag name="IGUANATEXCURSOR" val="119"/>
+  <p:tag name="TRANSPARENCY" val="Wahr"/>
+  <p:tag name="FILENAME" val=""/>
+  <p:tag name="LATEXENGINEID" val="0"/>
+  <p:tag name="TEMPFOLDER" val="c:\temp\"/>
+  <p:tag name="LATEXFORMHEIGHT" val="312"/>
+  <p:tag name="LATEXFORMWIDTH" val="384"/>
+  <p:tag name="LATEXFORMWRAP" val="Wahr"/>
+  <p:tag name="BITMAPVECTOR" val="0"/>
+</p:tagLst>
+</file>
+
+<file path=ppt/tags/tag71.xml><?xml version="1.0" encoding="utf-8"?>
+<p:tagLst xmlns:a="http://schemas.openxmlformats.org/drawingml/2006/main" xmlns:r="http://schemas.openxmlformats.org/officeDocument/2006/relationships" xmlns:p="http://schemas.openxmlformats.org/presentationml/2006/main">
+  <p:tag name="OUTPUTDPI" val="1200"/>
+  <p:tag name="ORIGINALHEIGHT" val="108,7364"/>
+  <p:tag name="ORIGINALWIDTH" val="572,9283"/>
+  <p:tag name="LATEXADDIN" val="\documentclass{article}&#10;\usepackage{amsmath}&#10;\usepackage{color}&#10;\pagestyle{empty}&#10;\begin{document}&#10;\color{white}&#10;Disparities&#10;\end{document}"/>
+  <p:tag name="IGUANATEXSIZE" val="20"/>
+  <p:tag name="IGUANATEXCURSOR" val="124"/>
+  <p:tag name="TRANSPARENCY" val="Wahr"/>
+  <p:tag name="FILENAME" val=""/>
+  <p:tag name="LATEXENGINEID" val="0"/>
+  <p:tag name="TEMPFOLDER" val="c:\temp\"/>
+  <p:tag name="LATEXFORMHEIGHT" val="312"/>
+  <p:tag name="LATEXFORMWIDTH" val="384"/>
+  <p:tag name="LATEXFORMWRAP" val="Wahr"/>
+  <p:tag name="BITMAPVECTOR" val="0"/>
+</p:tagLst>
+</file>
+
+<file path=ppt/tags/tag72.xml><?xml version="1.0" encoding="utf-8"?>
+<p:tagLst xmlns:a="http://schemas.openxmlformats.org/drawingml/2006/main" xmlns:r="http://schemas.openxmlformats.org/officeDocument/2006/relationships" xmlns:p="http://schemas.openxmlformats.org/presentationml/2006/main">
+  <p:tag name="OUTPUTDPI" val="1200"/>
+  <p:tag name="ORIGINALHEIGHT" val="112,4859"/>
+  <p:tag name="ORIGINALWIDTH" val="1364,079"/>
+  <p:tag name="LATEXADDIN" val="\documentclass{article}&#10;\usepackage{amsmath}&#10;\usepackage{color}&#10;\pagestyle{empty}&#10;\begin{document}&#10;Left Edge Filtered Image&#10;\end{document}"/>
+  <p:tag name="IGUANATEXSIZE" val="20"/>
+  <p:tag name="IGUANATEXCURSOR" val="98"/>
+  <p:tag name="TRANSPARENCY" val="Wahr"/>
+  <p:tag name="FILENAME" val=""/>
+  <p:tag name="LATEXENGINEID" val="0"/>
+  <p:tag name="TEMPFOLDER" val="c:\temp\"/>
+  <p:tag name="LATEXFORMHEIGHT" val="312"/>
+  <p:tag name="LATEXFORMWIDTH" val="384"/>
+  <p:tag name="LATEXFORMWRAP" val="Wahr"/>
+  <p:tag name="BITMAPVECTOR" val="0"/>
+</p:tagLst>
+</file>
+
+<file path=ppt/tags/tag73.xml><?xml version="1.0" encoding="utf-8"?>
+<p:tagLst xmlns:a="http://schemas.openxmlformats.org/drawingml/2006/main" xmlns:r="http://schemas.openxmlformats.org/officeDocument/2006/relationships" xmlns:p="http://schemas.openxmlformats.org/presentationml/2006/main">
+  <p:tag name="OUTPUTDPI" val="1200"/>
+  <p:tag name="ORIGINALHEIGHT" val="111,7361"/>
+  <p:tag name="ORIGINALWIDTH" val="1447,319"/>
+  <p:tag name="LATEXADDIN" val="\documentclass{article}&#10;\usepackage{amsmath}&#10;\usepackage{color}&#10;\pagestyle{empty}&#10;\begin{document}&#10;Right Edge Filtered Image&#10;\end{document}"/>
+  <p:tag name="IGUANATEXSIZE" val="20"/>
+  <p:tag name="IGUANATEXCURSOR" val="104"/>
+  <p:tag name="TRANSPARENCY" val="Wahr"/>
+  <p:tag name="FILENAME" val=""/>
+  <p:tag name="LATEXENGINEID" val="0"/>
+  <p:tag name="TEMPFOLDER" val="c:\temp\"/>
+  <p:tag name="LATEXFORMHEIGHT" val="312"/>
+  <p:tag name="LATEXFORMWIDTH" val="384"/>
+  <p:tag name="LATEXFORMWRAP" val="Wahr"/>
+  <p:tag name="BITMAPVECTOR" val="0"/>
+</p:tagLst>
+</file>
+
+<file path=ppt/tags/tag74.xml><?xml version="1.0" encoding="utf-8"?>
+<p:tagLst xmlns:a="http://schemas.openxmlformats.org/drawingml/2006/main" xmlns:r="http://schemas.openxmlformats.org/officeDocument/2006/relationships" xmlns:p="http://schemas.openxmlformats.org/presentationml/2006/main">
+  <p:tag name="OUTPUTDPI" val="1200"/>
+  <p:tag name="ORIGINALHEIGHT" val="112,4859"/>
+  <p:tag name="ORIGINALWIDTH" val="1044,62"/>
+  <p:tag name="LATEXADDIN" val="\documentclass{article}&#10;\usepackage{amsmath}&#10;\usepackage{color}&#10;\pagestyle{empty}&#10;\begin{document}&#10;Left Disparity Map&#10;\end{document}"/>
+  <p:tag name="IGUANATEXSIZE" val="20"/>
+  <p:tag name="IGUANATEXCURSOR" val="117"/>
+  <p:tag name="TRANSPARENCY" val="Wahr"/>
+  <p:tag name="FILENAME" val=""/>
+  <p:tag name="LATEXENGINEID" val="0"/>
+  <p:tag name="TEMPFOLDER" val="c:\temp\"/>
+  <p:tag name="LATEXFORMHEIGHT" val="312"/>
+  <p:tag name="LATEXFORMWIDTH" val="384"/>
+  <p:tag name="LATEXFORMWRAP" val="Wahr"/>
+  <p:tag name="BITMAPVECTOR" val="0"/>
+</p:tagLst>
+</file>
+
+<file path=ppt/tags/tag75.xml><?xml version="1.0" encoding="utf-8"?>
+<p:tagLst xmlns:a="http://schemas.openxmlformats.org/drawingml/2006/main" xmlns:r="http://schemas.openxmlformats.org/officeDocument/2006/relationships" xmlns:p="http://schemas.openxmlformats.org/presentationml/2006/main">
+  <p:tag name="OUTPUTDPI" val="1200"/>
+  <p:tag name="ORIGINALHEIGHT" val="123,7346"/>
+  <p:tag name="ORIGINALWIDTH" val="888,6389"/>
+  <p:tag name="LATEXADDIN" val="\documentclass{article}&#10;\usepackage{amsmath}&#10;\usepackage{color}&#10;\pagestyle{empty}&#10;\begin{document}&#10;%\color{white}&#10;Left/Right RGB&#10;\end{document}"/>
+  <p:tag name="IGUANATEXSIZE" val="20"/>
+  <p:tag name="IGUANATEXCURSOR" val="128"/>
+  <p:tag name="TRANSPARENCY" val="Wahr"/>
+  <p:tag name="FILENAME" val=""/>
+  <p:tag name="LATEXENGINEID" val="0"/>
+  <p:tag name="TEMPFOLDER" val="c:\temp\"/>
+  <p:tag name="LATEXFORMHEIGHT" val="312"/>
+  <p:tag name="LATEXFORMWIDTH" val="384"/>
+  <p:tag name="LATEXFORMWRAP" val="Wahr"/>
+  <p:tag name="BITMAPVECTOR" val="0"/>
+</p:tagLst>
+</file>
+
+<file path=ppt/tags/tag76.xml><?xml version="1.0" encoding="utf-8"?>
+<p:tagLst xmlns:a="http://schemas.openxmlformats.org/drawingml/2006/main" xmlns:r="http://schemas.openxmlformats.org/officeDocument/2006/relationships" xmlns:p="http://schemas.openxmlformats.org/presentationml/2006/main">
+  <p:tag name="OUTPUTDPI" val="1200"/>
+  <p:tag name="ORIGINALHEIGHT" val="123,7346"/>
+  <p:tag name="ORIGINALWIDTH" val="1145,857"/>
+  <p:tag name="LATEXADDIN" val="\documentclass{article}&#10;\usepackage{amsmath}&#10;\usepackage{color}&#10;\pagestyle{empty}&#10;\begin{document}&#10;%\color{white}&#10;Left/Right Grayscale&#10;\end{document}"/>
+  <p:tag name="IGUANATEXSIZE" val="20"/>
+  <p:tag name="IGUANATEXCURSOR" val="134"/>
+  <p:tag name="TRANSPARENCY" val="Wahr"/>
+  <p:tag name="FILENAME" val=""/>
+  <p:tag name="LATEXENGINEID" val="0"/>
+  <p:tag name="TEMPFOLDER" val="c:\temp\"/>
+  <p:tag name="LATEXFORMHEIGHT" val="312"/>
+  <p:tag name="LATEXFORMWIDTH" val="384"/>
+  <p:tag name="LATEXFORMWRAP" val="Wahr"/>
+  <p:tag name="BITMAPVECTOR" val="0"/>
+</p:tagLst>
+</file>
+
+<file path=ppt/tags/tag77.xml><?xml version="1.0" encoding="utf-8"?>
+<p:tagLst xmlns:a="http://schemas.openxmlformats.org/drawingml/2006/main" xmlns:r="http://schemas.openxmlformats.org/officeDocument/2006/relationships" xmlns:p="http://schemas.openxmlformats.org/presentationml/2006/main">
+  <p:tag name="OUTPUTDPI" val="1200"/>
+  <p:tag name="ORIGINALHEIGHT" val="123,7346"/>
+  <p:tag name="ORIGINALWIDTH" val="1359,58"/>
+  <p:tag name="LATEXADDIN" val="\documentclass{article}&#10;\usepackage{amsmath}&#10;\usepackage{color}&#10;\pagestyle{empty}&#10;\begin{document}&#10;%\color{white}&#10;Left/Right Edge Filtered&#10;\end{document}"/>
+  <p:tag name="IGUANATEXSIZE" val="20"/>
+  <p:tag name="IGUANATEXCURSOR" val="138"/>
   <p:tag name="TRANSPARENCY" val="Wahr"/>
   <p:tag name="FILENAME" val=""/>
   <p:tag name="LATEXENGINEID" val="0"/>

</xml_diff>

<commit_message>
windows: added disparity process imgs
</commit_message>
<xml_diff>
--- a/windows/masters_thesis_imgs.pptx
+++ b/windows/masters_thesis_imgs.pptx
@@ -13,6 +13,7 @@
     <p:sldId id="260" r:id="rId7"/>
     <p:sldId id="262" r:id="rId8"/>
     <p:sldId id="263" r:id="rId9"/>
+    <p:sldId id="264" r:id="rId10"/>
   </p:sldIdLst>
   <p:sldSz cx="12192000" cy="6858000"/>
   <p:notesSz cx="6858000" cy="9144000"/>
@@ -114,12 +115,12 @@
   <p:extLst>
     <p:ext uri="{EFAFB233-063F-42B5-8137-9DF3F51BA10A}">
       <p15:sldGuideLst xmlns:p15="http://schemas.microsoft.com/office/powerpoint/2012/main">
-        <p15:guide id="1" orient="horz" pos="2886" userDrawn="1">
+        <p15:guide id="1" orient="horz" pos="1888" userDrawn="1">
           <p15:clr>
             <a:srgbClr val="A4A3A4"/>
           </p15:clr>
         </p15:guide>
-        <p15:guide id="2" pos="4702" userDrawn="1">
+        <p15:guide id="2" pos="4679" userDrawn="1">
           <p15:clr>
             <a:srgbClr val="A4A3A4"/>
           </p15:clr>
@@ -279,7 +280,7 @@
           <a:p>
             <a:fld id="{E9193408-0E9E-4716-B232-5E8342DA9E48}" type="datetimeFigureOut">
               <a:rPr lang="en-GB" smtClean="0"/>
-              <a:t>11/06/2019</a:t>
+              <a:t>12/06/2019</a:t>
             </a:fld>
             <a:endParaRPr lang="en-GB"/>
           </a:p>
@@ -479,7 +480,7 @@
           <a:p>
             <a:fld id="{E9193408-0E9E-4716-B232-5E8342DA9E48}" type="datetimeFigureOut">
               <a:rPr lang="en-GB" smtClean="0"/>
-              <a:t>11/06/2019</a:t>
+              <a:t>12/06/2019</a:t>
             </a:fld>
             <a:endParaRPr lang="en-GB"/>
           </a:p>
@@ -689,7 +690,7 @@
           <a:p>
             <a:fld id="{E9193408-0E9E-4716-B232-5E8342DA9E48}" type="datetimeFigureOut">
               <a:rPr lang="en-GB" smtClean="0"/>
-              <a:t>11/06/2019</a:t>
+              <a:t>12/06/2019</a:t>
             </a:fld>
             <a:endParaRPr lang="en-GB"/>
           </a:p>
@@ -889,7 +890,7 @@
           <a:p>
             <a:fld id="{E9193408-0E9E-4716-B232-5E8342DA9E48}" type="datetimeFigureOut">
               <a:rPr lang="en-GB" smtClean="0"/>
-              <a:t>11/06/2019</a:t>
+              <a:t>12/06/2019</a:t>
             </a:fld>
             <a:endParaRPr lang="en-GB"/>
           </a:p>
@@ -1165,7 +1166,7 @@
           <a:p>
             <a:fld id="{E9193408-0E9E-4716-B232-5E8342DA9E48}" type="datetimeFigureOut">
               <a:rPr lang="en-GB" smtClean="0"/>
-              <a:t>11/06/2019</a:t>
+              <a:t>12/06/2019</a:t>
             </a:fld>
             <a:endParaRPr lang="en-GB"/>
           </a:p>
@@ -1433,7 +1434,7 @@
           <a:p>
             <a:fld id="{E9193408-0E9E-4716-B232-5E8342DA9E48}" type="datetimeFigureOut">
               <a:rPr lang="en-GB" smtClean="0"/>
-              <a:t>11/06/2019</a:t>
+              <a:t>12/06/2019</a:t>
             </a:fld>
             <a:endParaRPr lang="en-GB"/>
           </a:p>
@@ -1848,7 +1849,7 @@
           <a:p>
             <a:fld id="{E9193408-0E9E-4716-B232-5E8342DA9E48}" type="datetimeFigureOut">
               <a:rPr lang="en-GB" smtClean="0"/>
-              <a:t>11/06/2019</a:t>
+              <a:t>12/06/2019</a:t>
             </a:fld>
             <a:endParaRPr lang="en-GB"/>
           </a:p>
@@ -1990,7 +1991,7 @@
           <a:p>
             <a:fld id="{E9193408-0E9E-4716-B232-5E8342DA9E48}" type="datetimeFigureOut">
               <a:rPr lang="en-GB" smtClean="0"/>
-              <a:t>11/06/2019</a:t>
+              <a:t>12/06/2019</a:t>
             </a:fld>
             <a:endParaRPr lang="en-GB"/>
           </a:p>
@@ -2103,7 +2104,7 @@
           <a:p>
             <a:fld id="{E9193408-0E9E-4716-B232-5E8342DA9E48}" type="datetimeFigureOut">
               <a:rPr lang="en-GB" smtClean="0"/>
-              <a:t>11/06/2019</a:t>
+              <a:t>12/06/2019</a:t>
             </a:fld>
             <a:endParaRPr lang="en-GB"/>
           </a:p>
@@ -2416,7 +2417,7 @@
           <a:p>
             <a:fld id="{E9193408-0E9E-4716-B232-5E8342DA9E48}" type="datetimeFigureOut">
               <a:rPr lang="en-GB" smtClean="0"/>
-              <a:t>11/06/2019</a:t>
+              <a:t>12/06/2019</a:t>
             </a:fld>
             <a:endParaRPr lang="en-GB"/>
           </a:p>
@@ -2705,7 +2706,7 @@
           <a:p>
             <a:fld id="{E9193408-0E9E-4716-B232-5E8342DA9E48}" type="datetimeFigureOut">
               <a:rPr lang="en-GB" smtClean="0"/>
-              <a:t>11/06/2019</a:t>
+              <a:t>12/06/2019</a:t>
             </a:fld>
             <a:endParaRPr lang="en-GB"/>
           </a:p>
@@ -2948,7 +2949,7 @@
           <a:p>
             <a:fld id="{E9193408-0E9E-4716-B232-5E8342DA9E48}" type="datetimeFigureOut">
               <a:rPr lang="en-GB" smtClean="0"/>
-              <a:t>11/06/2019</a:t>
+              <a:t>12/06/2019</a:t>
             </a:fld>
             <a:endParaRPr lang="en-GB"/>
           </a:p>
@@ -16437,120 +16438,12 @@
           <a:chExt cx="0" cy="0"/>
         </a:xfrm>
       </p:grpSpPr>
-      <p:pic>
-        <p:nvPicPr>
-          <p:cNvPr id="28" name="Grafik 27" descr="Ein Bild, das Foto, Boden, sitzend enthält.&#10;&#10;Automatisch generierte Beschreibung">
+      <p:grpSp>
+        <p:nvGrpSpPr>
+          <p:cNvPr id="11" name="Gruppieren 10">
             <a:extLst>
               <a:ext uri="{FF2B5EF4-FFF2-40B4-BE49-F238E27FC236}">
-                <a16:creationId xmlns:a16="http://schemas.microsoft.com/office/drawing/2014/main" id="{4BFEB59D-944B-4E5F-9F21-9004F2EE9077}"/>
-              </a:ext>
-            </a:extLst>
-          </p:cNvPr>
-          <p:cNvPicPr>
-            <a:picLocks noChangeAspect="1"/>
-          </p:cNvPicPr>
-          <p:nvPr/>
-        </p:nvPicPr>
-        <p:blipFill>
-          <a:blip r:embed="rId13">
-            <a:extLst>
-              <a:ext uri="{28A0092B-C50C-407E-A947-70E740481C1C}">
-                <a14:useLocalDpi xmlns:a14="http://schemas.microsoft.com/office/drawing/2010/main" val="0"/>
-              </a:ext>
-            </a:extLst>
-          </a:blip>
-          <a:stretch>
-            <a:fillRect/>
-          </a:stretch>
-        </p:blipFill>
-        <p:spPr>
-          <a:xfrm>
-            <a:off x="-5125355" y="8458200"/>
-            <a:ext cx="6096000" cy="4572000"/>
-          </a:xfrm>
-          <a:prstGeom prst="rect">
-            <a:avLst/>
-          </a:prstGeom>
-        </p:spPr>
-      </p:pic>
-      <p:pic>
-        <p:nvPicPr>
-          <p:cNvPr id="35" name="Grafik 34" descr="Ein Bild, das sitzend, Foto enthält.&#10;&#10;Automatisch generierte Beschreibung">
-            <a:extLst>
-              <a:ext uri="{FF2B5EF4-FFF2-40B4-BE49-F238E27FC236}">
-                <a16:creationId xmlns:a16="http://schemas.microsoft.com/office/drawing/2014/main" id="{EBA20801-66C5-4B6E-A2E0-8C1AC252E6C5}"/>
-              </a:ext>
-            </a:extLst>
-          </p:cNvPr>
-          <p:cNvPicPr>
-            <a:picLocks noChangeAspect="1"/>
-          </p:cNvPicPr>
-          <p:nvPr/>
-        </p:nvPicPr>
-        <p:blipFill>
-          <a:blip r:embed="rId14">
-            <a:extLst>
-              <a:ext uri="{28A0092B-C50C-407E-A947-70E740481C1C}">
-                <a14:useLocalDpi xmlns:a14="http://schemas.microsoft.com/office/drawing/2010/main" val="0"/>
-              </a:ext>
-            </a:extLst>
-          </a:blip>
-          <a:stretch>
-            <a:fillRect/>
-          </a:stretch>
-        </p:blipFill>
-        <p:spPr>
-          <a:xfrm>
-            <a:off x="1361019" y="8458200"/>
-            <a:ext cx="6096000" cy="4572000"/>
-          </a:xfrm>
-          <a:prstGeom prst="rect">
-            <a:avLst/>
-          </a:prstGeom>
-        </p:spPr>
-      </p:pic>
-      <p:pic>
-        <p:nvPicPr>
-          <p:cNvPr id="37" name="Grafik 36">
-            <a:extLst>
-              <a:ext uri="{FF2B5EF4-FFF2-40B4-BE49-F238E27FC236}">
-                <a16:creationId xmlns:a16="http://schemas.microsoft.com/office/drawing/2014/main" id="{24A1620A-6317-43B3-9215-8F173F26EF8C}"/>
-              </a:ext>
-            </a:extLst>
-          </p:cNvPr>
-          <p:cNvPicPr>
-            <a:picLocks noChangeAspect="1"/>
-          </p:cNvPicPr>
-          <p:nvPr/>
-        </p:nvPicPr>
-        <p:blipFill>
-          <a:blip r:embed="rId15">
-            <a:extLst>
-              <a:ext uri="{28A0092B-C50C-407E-A947-70E740481C1C}">
-                <a14:useLocalDpi xmlns:a14="http://schemas.microsoft.com/office/drawing/2010/main" val="0"/>
-              </a:ext>
-            </a:extLst>
-          </a:blip>
-          <a:stretch>
-            <a:fillRect/>
-          </a:stretch>
-        </p:blipFill>
-        <p:spPr>
-          <a:xfrm>
-            <a:off x="7847393" y="8458200"/>
-            <a:ext cx="6096000" cy="4572000"/>
-          </a:xfrm>
-          <a:prstGeom prst="rect">
-            <a:avLst/>
-          </a:prstGeom>
-        </p:spPr>
-      </p:pic>
-      <p:grpSp>
-        <p:nvGrpSpPr>
-          <p:cNvPr id="53" name="Gruppieren 52">
-            <a:extLst>
-              <a:ext uri="{FF2B5EF4-FFF2-40B4-BE49-F238E27FC236}">
-                <a16:creationId xmlns:a16="http://schemas.microsoft.com/office/drawing/2014/main" id="{CFDC3D16-5F0D-4154-BDDB-5EE207B9B3D3}"/>
+                <a16:creationId xmlns:a16="http://schemas.microsoft.com/office/drawing/2014/main" id="{7D1385D3-581F-493F-A1B2-9657E0A7A2A5}"/>
               </a:ext>
             </a:extLst>
           </p:cNvPr>
@@ -16559,9 +16452,9 @@
         </p:nvGrpSpPr>
         <p:grpSpPr>
           <a:xfrm>
-            <a:off x="-5125355" y="-2742260"/>
+            <a:off x="3364413" y="-723468"/>
             <a:ext cx="19116418" cy="5019467"/>
-            <a:chOff x="-9978709" y="-1194814"/>
+            <a:chOff x="3364413" y="-723468"/>
             <a:chExt cx="19116418" cy="5019467"/>
           </a:xfrm>
         </p:grpSpPr>
@@ -16579,7 +16472,7 @@
           </p:nvGrpSpPr>
           <p:grpSpPr>
             <a:xfrm>
-              <a:off x="-9978709" y="-531695"/>
+              <a:off x="3364413" y="-60349"/>
               <a:ext cx="5808466" cy="4356348"/>
               <a:chOff x="-3247471" y="942999"/>
               <a:chExt cx="5808466" cy="4356348"/>
@@ -16600,7 +16493,7 @@
               <p:nvPr/>
             </p:nvPicPr>
             <p:blipFill>
-              <a:blip r:embed="rId16">
+              <a:blip r:embed="rId13">
                 <a:extLst>
                   <a:ext uri="{28A0092B-C50C-407E-A947-70E740481C1C}">
                     <a14:useLocalDpi xmlns:a14="http://schemas.microsoft.com/office/drawing/2010/main" val="0"/>
@@ -16636,7 +16529,7 @@
               <p:nvPr/>
             </p:nvPicPr>
             <p:blipFill>
-              <a:blip r:embed="rId17">
+              <a:blip r:embed="rId14">
                 <a:extLst>
                   <a:ext uri="{28A0092B-C50C-407E-A947-70E740481C1C}">
                     <a14:useLocalDpi xmlns:a14="http://schemas.microsoft.com/office/drawing/2010/main" val="0"/>
@@ -16672,7 +16565,7 @@
           </p:nvGrpSpPr>
           <p:grpSpPr>
             <a:xfrm>
-              <a:off x="-3332582" y="-531696"/>
+              <a:off x="10010540" y="-60350"/>
               <a:ext cx="5808466" cy="4356349"/>
               <a:chOff x="3000929" y="930168"/>
               <a:chExt cx="5808466" cy="4356349"/>
@@ -16693,7 +16586,7 @@
               <p:nvPr/>
             </p:nvPicPr>
             <p:blipFill>
-              <a:blip r:embed="rId18">
+              <a:blip r:embed="rId15">
                 <a:extLst>
                   <a:ext uri="{28A0092B-C50C-407E-A947-70E740481C1C}">
                     <a14:useLocalDpi xmlns:a14="http://schemas.microsoft.com/office/drawing/2010/main" val="0"/>
@@ -16729,7 +16622,7 @@
               <p:nvPr/>
             </p:nvPicPr>
             <p:blipFill>
-              <a:blip r:embed="rId19">
+              <a:blip r:embed="rId16">
                 <a:extLst>
                   <a:ext uri="{28A0092B-C50C-407E-A947-70E740481C1C}">
                     <a14:useLocalDpi xmlns:a14="http://schemas.microsoft.com/office/drawing/2010/main" val="0"/>
@@ -16765,7 +16658,7 @@
           </p:nvGrpSpPr>
           <p:grpSpPr>
             <a:xfrm>
-              <a:off x="3329243" y="-510304"/>
+              <a:off x="16672365" y="-38958"/>
               <a:ext cx="5808466" cy="4334957"/>
               <a:chOff x="9205635" y="951559"/>
               <a:chExt cx="5808466" cy="4334957"/>
@@ -16786,7 +16679,7 @@
               <p:nvPr/>
             </p:nvPicPr>
             <p:blipFill>
-              <a:blip r:embed="rId20">
+              <a:blip r:embed="rId17">
                 <a:extLst>
                   <a:ext uri="{28A0092B-C50C-407E-A947-70E740481C1C}">
                     <a14:useLocalDpi xmlns:a14="http://schemas.microsoft.com/office/drawing/2010/main" val="0"/>
@@ -16822,7 +16715,7 @@
               <p:nvPr/>
             </p:nvPicPr>
             <p:blipFill>
-              <a:blip r:embed="rId21">
+              <a:blip r:embed="rId18">
                 <a:extLst>
                   <a:ext uri="{28A0092B-C50C-407E-A947-70E740481C1C}">
                     <a14:useLocalDpi xmlns:a14="http://schemas.microsoft.com/office/drawing/2010/main" val="0"/>
@@ -16860,7 +16753,7 @@
           </p:nvCxnSpPr>
           <p:spPr>
             <a:xfrm>
-              <a:off x="-4010490" y="1646479"/>
+              <a:off x="9332632" y="2117825"/>
               <a:ext cx="518155" cy="0"/>
             </a:xfrm>
             <a:prstGeom prst="straightConnector1">
@@ -16904,7 +16797,7 @@
           </p:nvCxnSpPr>
           <p:spPr>
             <a:xfrm>
-              <a:off x="2643486" y="1646479"/>
+              <a:off x="15986608" y="2117825"/>
               <a:ext cx="518155" cy="0"/>
             </a:xfrm>
             <a:prstGeom prst="straightConnector1">
@@ -16951,7 +16844,7 @@
             </p:nvPr>
           </p:nvPicPr>
           <p:blipFill>
-            <a:blip r:embed="rId22">
+            <a:blip r:embed="rId19">
               <a:extLst>
                 <a:ext uri="{28A0092B-C50C-407E-A947-70E740481C1C}">
                   <a14:useLocalDpi xmlns:a14="http://schemas.microsoft.com/office/drawing/2010/main" val="0"/>
@@ -16964,7 +16857,7 @@
           </p:blipFill>
           <p:spPr>
             <a:xfrm>
-              <a:off x="-8574013" y="-1187116"/>
+              <a:off x="4769109" y="-715770"/>
               <a:ext cx="3031045" cy="427127"/>
             </a:xfrm>
             <a:prstGeom prst="rect">
@@ -16991,7 +16884,7 @@
             </p:nvPr>
           </p:nvPicPr>
           <p:blipFill>
-            <a:blip r:embed="rId23">
+            <a:blip r:embed="rId20">
               <a:extLst>
                 <a:ext uri="{28A0092B-C50C-407E-A947-70E740481C1C}">
                   <a14:useLocalDpi xmlns:a14="http://schemas.microsoft.com/office/drawing/2010/main" val="0"/>
@@ -17004,7 +16897,7 @@
           </p:blipFill>
           <p:spPr>
             <a:xfrm>
-              <a:off x="-2094745" y="-1189667"/>
+              <a:off x="11248377" y="-718321"/>
               <a:ext cx="3911198" cy="429678"/>
             </a:xfrm>
             <a:prstGeom prst="rect">
@@ -17031,7 +16924,7 @@
             </p:nvPr>
           </p:nvPicPr>
           <p:blipFill>
-            <a:blip r:embed="rId24">
+            <a:blip r:embed="rId21">
               <a:extLst>
                 <a:ext uri="{28A0092B-C50C-407E-A947-70E740481C1C}">
                   <a14:useLocalDpi xmlns:a14="http://schemas.microsoft.com/office/drawing/2010/main" val="0"/>
@@ -17044,7 +16937,7 @@
           </p:blipFill>
           <p:spPr>
             <a:xfrm>
-              <a:off x="3773548" y="-1194814"/>
+              <a:off x="17116670" y="-723468"/>
               <a:ext cx="4644904" cy="434825"/>
             </a:xfrm>
             <a:prstGeom prst="rect">
@@ -17055,10 +16948,10 @@
       </p:grpSp>
       <p:grpSp>
         <p:nvGrpSpPr>
-          <p:cNvPr id="171" name="Gruppieren 170">
+          <p:cNvPr id="13" name="Gruppieren 12">
             <a:extLst>
               <a:ext uri="{FF2B5EF4-FFF2-40B4-BE49-F238E27FC236}">
-                <a16:creationId xmlns:a16="http://schemas.microsoft.com/office/drawing/2014/main" id="{1839B7DB-9657-4AB9-98FA-7ADD0540A219}"/>
+                <a16:creationId xmlns:a16="http://schemas.microsoft.com/office/drawing/2014/main" id="{0BE2B1F8-50AD-4911-A6BF-48FD1682541A}"/>
               </a:ext>
             </a:extLst>
           </p:cNvPr>
@@ -17067,9 +16960,9 @@
         </p:nvGrpSpPr>
         <p:grpSpPr>
           <a:xfrm>
-            <a:off x="-3314758" y="2760878"/>
+            <a:off x="4486745" y="5726723"/>
             <a:ext cx="16057931" cy="4097122"/>
-            <a:chOff x="-3314758" y="2502938"/>
+            <a:chOff x="4486745" y="5726723"/>
             <a:chExt cx="16057931" cy="4097122"/>
           </a:xfrm>
         </p:grpSpPr>
@@ -17088,7 +16981,7 @@
             <p:nvPr/>
           </p:nvPicPr>
           <p:blipFill>
-            <a:blip r:embed="rId21">
+            <a:blip r:embed="rId18">
               <a:extLst>
                 <a:ext uri="{28A0092B-C50C-407E-A947-70E740481C1C}">
                   <a14:useLocalDpi xmlns:a14="http://schemas.microsoft.com/office/drawing/2010/main" val="0"/>
@@ -17101,7 +16994,7 @@
           </p:blipFill>
           <p:spPr>
             <a:xfrm>
-              <a:off x="2422906" y="3014794"/>
+              <a:off x="10224409" y="6238579"/>
               <a:ext cx="4780353" cy="3585265"/>
             </a:xfrm>
             <a:prstGeom prst="rect">
@@ -17124,7 +17017,7 @@
             <p:nvPr/>
           </p:nvPicPr>
           <p:blipFill>
-            <a:blip r:embed="rId20">
+            <a:blip r:embed="rId17">
               <a:extLst>
                 <a:ext uri="{28A0092B-C50C-407E-A947-70E740481C1C}">
                   <a14:useLocalDpi xmlns:a14="http://schemas.microsoft.com/office/drawing/2010/main" val="0"/>
@@ -17137,7 +17030,7 @@
           </p:blipFill>
           <p:spPr>
             <a:xfrm>
-              <a:off x="-3314758" y="3014794"/>
+              <a:off x="4486745" y="6238579"/>
               <a:ext cx="4780353" cy="3585265"/>
             </a:xfrm>
             <a:prstGeom prst="rect">
@@ -17161,7 +17054,7 @@
           </p:nvCxnSpPr>
           <p:spPr>
             <a:xfrm>
-              <a:off x="-3314758" y="4679629"/>
+              <a:off x="4486745" y="7903414"/>
               <a:ext cx="4780353" cy="0"/>
             </a:xfrm>
             <a:prstGeom prst="line">
@@ -17204,7 +17097,7 @@
           </p:nvCxnSpPr>
           <p:spPr>
             <a:xfrm>
-              <a:off x="-1996464" y="4288050"/>
+              <a:off x="5805039" y="7511835"/>
               <a:ext cx="540000" cy="0"/>
             </a:xfrm>
             <a:prstGeom prst="straightConnector1">
@@ -17252,7 +17145,7 @@
             </p:nvPr>
           </p:nvPicPr>
           <p:blipFill>
-            <a:blip r:embed="rId25">
+            <a:blip r:embed="rId22">
               <a:extLst>
                 <a:ext uri="{28A0092B-C50C-407E-A947-70E740481C1C}">
                   <a14:useLocalDpi xmlns:a14="http://schemas.microsoft.com/office/drawing/2010/main" val="0"/>
@@ -17265,7 +17158,7 @@
           </p:blipFill>
           <p:spPr>
             <a:xfrm>
-              <a:off x="150553" y="4466909"/>
+              <a:off x="7952056" y="7690694"/>
               <a:ext cx="1181113" cy="177331"/>
             </a:xfrm>
             <a:prstGeom prst="rect">
@@ -17289,7 +17182,7 @@
           </p:nvCxnSpPr>
           <p:spPr>
             <a:xfrm>
-              <a:off x="-2112264" y="4422617"/>
+              <a:off x="5689239" y="7646402"/>
               <a:ext cx="0" cy="540000"/>
             </a:xfrm>
             <a:prstGeom prst="straightConnector1">
@@ -17332,7 +17225,7 @@
           </p:nvGrpSpPr>
           <p:grpSpPr>
             <a:xfrm>
-              <a:off x="-1996464" y="4405164"/>
+              <a:off x="5805039" y="7628949"/>
               <a:ext cx="540001" cy="540000"/>
               <a:chOff x="-2898598" y="4433209"/>
               <a:chExt cx="540001" cy="540000"/>
@@ -17353,7 +17246,7 @@
               <p:nvPr/>
             </p:nvPicPr>
             <p:blipFill rotWithShape="1">
-              <a:blip r:embed="rId20">
+              <a:blip r:embed="rId17">
                 <a:extLst>
                   <a:ext uri="{28A0092B-C50C-407E-A947-70E740481C1C}">
                     <a14:useLocalDpi xmlns:a14="http://schemas.microsoft.com/office/drawing/2010/main" val="0"/>
@@ -17445,7 +17338,7 @@
             </p:nvPr>
           </p:nvPicPr>
           <p:blipFill>
-            <a:blip r:embed="rId26">
+            <a:blip r:embed="rId23">
               <a:extLst>
                 <a:ext uri="{28A0092B-C50C-407E-A947-70E740481C1C}">
                   <a14:useLocalDpi xmlns:a14="http://schemas.microsoft.com/office/drawing/2010/main" val="0"/>
@@ -17458,7 +17351,7 @@
           </p:blipFill>
           <p:spPr>
             <a:xfrm>
-              <a:off x="-2956634" y="4218452"/>
+              <a:off x="4844869" y="7442237"/>
               <a:ext cx="849853" cy="139196"/>
             </a:xfrm>
             <a:prstGeom prst="rect">
@@ -17482,7 +17375,7 @@
           </p:nvCxnSpPr>
           <p:spPr>
             <a:xfrm>
-              <a:off x="2422906" y="4675164"/>
+              <a:off x="10224409" y="7898949"/>
               <a:ext cx="4780353" cy="0"/>
             </a:xfrm>
             <a:prstGeom prst="line">
@@ -17528,7 +17421,7 @@
             </p:nvPr>
           </p:nvPicPr>
           <p:blipFill>
-            <a:blip r:embed="rId25">
+            <a:blip r:embed="rId22">
               <a:extLst>
                 <a:ext uri="{28A0092B-C50C-407E-A947-70E740481C1C}">
                   <a14:useLocalDpi xmlns:a14="http://schemas.microsoft.com/office/drawing/2010/main" val="0"/>
@@ -17541,7 +17434,7 @@
           </p:blipFill>
           <p:spPr>
             <a:xfrm>
-              <a:off x="5888217" y="4462444"/>
+              <a:off x="13689720" y="7686229"/>
               <a:ext cx="1181113" cy="177331"/>
             </a:xfrm>
             <a:prstGeom prst="rect">
@@ -17563,7 +17456,7 @@
           </p:nvGrpSpPr>
           <p:grpSpPr>
             <a:xfrm>
-              <a:off x="3101258" y="4405164"/>
+              <a:off x="10902761" y="7628949"/>
               <a:ext cx="540001" cy="540000"/>
               <a:chOff x="-2898598" y="4433209"/>
               <a:chExt cx="540001" cy="540000"/>
@@ -17584,7 +17477,7 @@
               <p:nvPr/>
             </p:nvPicPr>
             <p:blipFill rotWithShape="1">
-              <a:blip r:embed="rId20">
+              <a:blip r:embed="rId17">
                 <a:extLst>
                   <a:ext uri="{28A0092B-C50C-407E-A947-70E740481C1C}">
                     <a14:useLocalDpi xmlns:a14="http://schemas.microsoft.com/office/drawing/2010/main" val="0"/>
@@ -17671,7 +17564,7 @@
           </p:nvGrpSpPr>
           <p:grpSpPr>
             <a:xfrm>
-              <a:off x="1663346" y="3306914"/>
+              <a:off x="9464849" y="6530699"/>
               <a:ext cx="540001" cy="540000"/>
               <a:chOff x="-2898598" y="4433209"/>
               <a:chExt cx="540001" cy="540000"/>
@@ -17692,7 +17585,7 @@
               <p:nvPr/>
             </p:nvPicPr>
             <p:blipFill rotWithShape="1">
-              <a:blip r:embed="rId20">
+              <a:blip r:embed="rId17">
                 <a:extLst>
                   <a:ext uri="{28A0092B-C50C-407E-A947-70E740481C1C}">
                     <a14:useLocalDpi xmlns:a14="http://schemas.microsoft.com/office/drawing/2010/main" val="0"/>
@@ -17781,7 +17674,7 @@
           </p:nvCxnSpPr>
           <p:spPr>
             <a:xfrm>
-              <a:off x="3377110" y="4196759"/>
+              <a:off x="11178613" y="7420544"/>
               <a:ext cx="654523" cy="0"/>
             </a:xfrm>
             <a:prstGeom prst="straightConnector1">
@@ -17827,7 +17720,7 @@
           </p:nvCxnSpPr>
           <p:spPr>
             <a:xfrm flipV="1">
-              <a:off x="-1456464" y="3576914"/>
+              <a:off x="6345039" y="6800699"/>
               <a:ext cx="3119810" cy="837181"/>
             </a:xfrm>
             <a:prstGeom prst="straightConnector1">
@@ -17872,7 +17765,7 @@
           </p:nvCxnSpPr>
           <p:spPr>
             <a:xfrm>
-              <a:off x="2203346" y="3576914"/>
+              <a:off x="10004849" y="6800699"/>
               <a:ext cx="897912" cy="828250"/>
             </a:xfrm>
             <a:prstGeom prst="straightConnector1">
@@ -17916,7 +17809,7 @@
           </p:nvCxnSpPr>
           <p:spPr>
             <a:xfrm>
-              <a:off x="-1710255" y="3032961"/>
+              <a:off x="6091248" y="6256746"/>
               <a:ext cx="0" cy="3567098"/>
             </a:xfrm>
             <a:prstGeom prst="line">
@@ -17960,7 +17853,7 @@
           </p:nvCxnSpPr>
           <p:spPr>
             <a:xfrm flipH="1">
-              <a:off x="-19584" y="5167035"/>
+              <a:off x="7781919" y="8390820"/>
               <a:ext cx="2084" cy="680083"/>
             </a:xfrm>
             <a:prstGeom prst="line">
@@ -18004,7 +17897,7 @@
           </p:nvCxnSpPr>
           <p:spPr>
             <a:xfrm>
-              <a:off x="4031633" y="3014794"/>
+              <a:off x="11833136" y="6238579"/>
               <a:ext cx="0" cy="3567098"/>
             </a:xfrm>
             <a:prstGeom prst="line">
@@ -18051,7 +17944,7 @@
             </p:nvPr>
           </p:nvPicPr>
           <p:blipFill>
-            <a:blip r:embed="rId27">
+            <a:blip r:embed="rId24">
               <a:extLst>
                 <a:ext uri="{28A0092B-C50C-407E-A947-70E740481C1C}">
                   <a14:useLocalDpi xmlns:a14="http://schemas.microsoft.com/office/drawing/2010/main" val="0"/>
@@ -18064,7 +17957,7 @@
           </p:blipFill>
           <p:spPr>
             <a:xfrm>
-              <a:off x="3117750" y="3729207"/>
+              <a:off x="10919253" y="6952992"/>
               <a:ext cx="691338" cy="142004"/>
             </a:xfrm>
             <a:prstGeom prst="rect">
@@ -18091,7 +17984,7 @@
             </p:nvPr>
           </p:nvPicPr>
           <p:blipFill>
-            <a:blip r:embed="rId28">
+            <a:blip r:embed="rId25">
               <a:extLst>
                 <a:ext uri="{28A0092B-C50C-407E-A947-70E740481C1C}">
                   <a14:useLocalDpi xmlns:a14="http://schemas.microsoft.com/office/drawing/2010/main" val="0"/>
@@ -18104,7 +17997,7 @@
           </p:blipFill>
           <p:spPr>
             <a:xfrm>
-              <a:off x="3004985" y="3932894"/>
+              <a:off x="10806488" y="7156679"/>
               <a:ext cx="916868" cy="177483"/>
             </a:xfrm>
             <a:prstGeom prst="rect">
@@ -18131,7 +18024,7 @@
             </p:nvPr>
           </p:nvPicPr>
           <p:blipFill>
-            <a:blip r:embed="rId29">
+            <a:blip r:embed="rId26">
               <a:extLst>
                 <a:ext uri="{28A0092B-C50C-407E-A947-70E740481C1C}">
                   <a14:useLocalDpi xmlns:a14="http://schemas.microsoft.com/office/drawing/2010/main" val="0"/>
@@ -18144,7 +18037,7 @@
           </p:blipFill>
           <p:spPr>
             <a:xfrm>
-              <a:off x="-3286493" y="2507305"/>
+              <a:off x="4515010" y="5731090"/>
               <a:ext cx="4723821" cy="397150"/>
             </a:xfrm>
             <a:prstGeom prst="rect">
@@ -18171,7 +18064,7 @@
             </p:nvPr>
           </p:nvPicPr>
           <p:blipFill>
-            <a:blip r:embed="rId30">
+            <a:blip r:embed="rId27">
               <a:extLst>
                 <a:ext uri="{28A0092B-C50C-407E-A947-70E740481C1C}">
                   <a14:useLocalDpi xmlns:a14="http://schemas.microsoft.com/office/drawing/2010/main" val="0"/>
@@ -18184,7 +18077,7 @@
           </p:blipFill>
           <p:spPr>
             <a:xfrm>
-              <a:off x="2306884" y="2509137"/>
+              <a:off x="10108387" y="5732922"/>
               <a:ext cx="5012395" cy="396215"/>
             </a:xfrm>
             <a:prstGeom prst="rect">
@@ -18207,7 +18100,7 @@
             <p:nvPr/>
           </p:nvPicPr>
           <p:blipFill>
-            <a:blip r:embed="rId13">
+            <a:blip r:embed="rId28">
               <a:extLst>
                 <a:ext uri="{28A0092B-C50C-407E-A947-70E740481C1C}">
                   <a14:useLocalDpi xmlns:a14="http://schemas.microsoft.com/office/drawing/2010/main" val="0"/>
@@ -18220,7 +18113,7 @@
           </p:blipFill>
           <p:spPr>
             <a:xfrm>
-              <a:off x="7962819" y="3014794"/>
+              <a:off x="15764322" y="6238579"/>
               <a:ext cx="4780354" cy="3585266"/>
             </a:xfrm>
             <a:prstGeom prst="rect">
@@ -18247,7 +18140,7 @@
             </p:nvPr>
           </p:nvPicPr>
           <p:blipFill>
-            <a:blip r:embed="rId31">
+            <a:blip r:embed="rId29">
               <a:extLst>
                 <a:ext uri="{28A0092B-C50C-407E-A947-70E740481C1C}">
                   <a14:useLocalDpi xmlns:a14="http://schemas.microsoft.com/office/drawing/2010/main" val="0"/>
@@ -18260,7 +18153,7 @@
           </p:blipFill>
           <p:spPr>
             <a:xfrm>
-              <a:off x="8543725" y="2502938"/>
+              <a:off x="16345228" y="5726723"/>
               <a:ext cx="3618542" cy="401517"/>
             </a:xfrm>
             <a:prstGeom prst="rect">
@@ -18284,7 +18177,7 @@
           </p:nvCxnSpPr>
           <p:spPr>
             <a:xfrm>
-              <a:off x="7327704" y="4798343"/>
+              <a:off x="15129207" y="8022128"/>
               <a:ext cx="518155" cy="0"/>
             </a:xfrm>
             <a:prstGeom prst="straightConnector1">
@@ -18313,10 +18206,1106 @@
           </p:style>
         </p:cxnSp>
       </p:grpSp>
+      <p:sp>
+        <p:nvSpPr>
+          <p:cNvPr id="54" name="Textfeld 53">
+            <a:extLst>
+              <a:ext uri="{FF2B5EF4-FFF2-40B4-BE49-F238E27FC236}">
+                <a16:creationId xmlns:a16="http://schemas.microsoft.com/office/drawing/2014/main" id="{0704B84E-5C08-48B2-8B00-AFA36AC95799}"/>
+              </a:ext>
+            </a:extLst>
+          </p:cNvPr>
+          <p:cNvSpPr txBox="1"/>
+          <p:nvPr/>
+        </p:nvSpPr>
+        <p:spPr>
+          <a:xfrm>
+            <a:off x="76199" y="66675"/>
+            <a:ext cx="2088017" cy="369332"/>
+          </a:xfrm>
+          <a:prstGeom prst="rect">
+            <a:avLst/>
+          </a:prstGeom>
+          <a:noFill/>
+        </p:spPr>
+        <p:txBody>
+          <a:bodyPr wrap="square" rtlCol="0">
+            <a:spAutoFit/>
+          </a:bodyPr>
+          <a:lstStyle/>
+          <a:p>
+            <a:r>
+              <a:rPr lang="de-DE" dirty="0"/>
+              <a:t>Image Processing</a:t>
+            </a:r>
+            <a:endParaRPr lang="en-GB" dirty="0"/>
+          </a:p>
+        </p:txBody>
+      </p:sp>
     </p:spTree>
     <p:extLst>
       <p:ext uri="{BB962C8B-B14F-4D97-AF65-F5344CB8AC3E}">
         <p14:creationId xmlns:p14="http://schemas.microsoft.com/office/powerpoint/2010/main" val="2517532268"/>
+      </p:ext>
+    </p:extLst>
+  </p:cSld>
+  <p:clrMapOvr>
+    <a:masterClrMapping/>
+  </p:clrMapOvr>
+</p:sld>
+</file>
+
+<file path=ppt/slides/slide9.xml><?xml version="1.0" encoding="utf-8"?>
+<p:sld xmlns:a="http://schemas.openxmlformats.org/drawingml/2006/main" xmlns:r="http://schemas.openxmlformats.org/officeDocument/2006/relationships" xmlns:p="http://schemas.openxmlformats.org/presentationml/2006/main">
+  <p:cSld>
+    <p:spTree>
+      <p:nvGrpSpPr>
+        <p:cNvPr id="1" name=""/>
+        <p:cNvGrpSpPr/>
+        <p:nvPr/>
+      </p:nvGrpSpPr>
+      <p:grpSpPr>
+        <a:xfrm>
+          <a:off x="0" y="0"/>
+          <a:ext cx="0" cy="0"/>
+          <a:chOff x="0" y="0"/>
+          <a:chExt cx="0" cy="0"/>
+        </a:xfrm>
+      </p:grpSpPr>
+      <p:grpSp>
+        <p:nvGrpSpPr>
+          <p:cNvPr id="120" name="Gruppieren 119">
+            <a:extLst>
+              <a:ext uri="{FF2B5EF4-FFF2-40B4-BE49-F238E27FC236}">
+                <a16:creationId xmlns:a16="http://schemas.microsoft.com/office/drawing/2014/main" id="{411EAEC3-179B-4316-B156-9509BA60517D}"/>
+              </a:ext>
+            </a:extLst>
+          </p:cNvPr>
+          <p:cNvGrpSpPr/>
+          <p:nvPr/>
+        </p:nvGrpSpPr>
+        <p:grpSpPr>
+          <a:xfrm>
+            <a:off x="3517204" y="-5955900"/>
+            <a:ext cx="16366553" cy="8489223"/>
+            <a:chOff x="2436159" y="-6093679"/>
+            <a:chExt cx="16366553" cy="8489223"/>
+          </a:xfrm>
+        </p:grpSpPr>
+        <p:pic>
+          <p:nvPicPr>
+            <p:cNvPr id="121" name="Grafik 120" descr="Ein Bild, das Foto, sitzend enthält.&#10;&#10;Automatisch generierte Beschreibung">
+              <a:extLst>
+                <a:ext uri="{FF2B5EF4-FFF2-40B4-BE49-F238E27FC236}">
+                  <a16:creationId xmlns:a16="http://schemas.microsoft.com/office/drawing/2014/main" id="{BFAA6469-132D-422B-94B0-78EB0694F2DA}"/>
+                </a:ext>
+              </a:extLst>
+            </p:cNvPr>
+            <p:cNvPicPr>
+              <a:picLocks noChangeAspect="1"/>
+            </p:cNvPicPr>
+            <p:nvPr/>
+          </p:nvPicPr>
+          <p:blipFill>
+            <a:blip r:embed="rId12">
+              <a:extLst>
+                <a:ext uri="{28A0092B-C50C-407E-A947-70E740481C1C}">
+                  <a14:useLocalDpi xmlns:a14="http://schemas.microsoft.com/office/drawing/2010/main" val="0"/>
+                </a:ext>
+              </a:extLst>
+            </a:blip>
+            <a:stretch>
+              <a:fillRect/>
+            </a:stretch>
+          </p:blipFill>
+          <p:spPr>
+            <a:xfrm>
+              <a:off x="2583063" y="-5550367"/>
+              <a:ext cx="4694382" cy="3520787"/>
+            </a:xfrm>
+            <a:prstGeom prst="rect">
+              <a:avLst/>
+            </a:prstGeom>
+          </p:spPr>
+        </p:pic>
+        <p:pic>
+          <p:nvPicPr>
+            <p:cNvPr id="122" name="Grafik 121">
+              <a:extLst>
+                <a:ext uri="{FF2B5EF4-FFF2-40B4-BE49-F238E27FC236}">
+                  <a16:creationId xmlns:a16="http://schemas.microsoft.com/office/drawing/2014/main" id="{F68B2712-1D5F-42AC-87D9-82D83AA8D05E}"/>
+                </a:ext>
+              </a:extLst>
+            </p:cNvPr>
+            <p:cNvPicPr>
+              <a:picLocks noChangeAspect="1"/>
+            </p:cNvPicPr>
+            <p:nvPr>
+              <p:custDataLst>
+                <p:tags r:id="rId7"/>
+              </p:custDataLst>
+            </p:nvPr>
+          </p:nvPicPr>
+          <p:blipFill>
+            <a:blip r:embed="rId13">
+              <a:extLst>
+                <a:ext uri="{28A0092B-C50C-407E-A947-70E740481C1C}">
+                  <a14:useLocalDpi xmlns:a14="http://schemas.microsoft.com/office/drawing/2010/main" val="0"/>
+                </a:ext>
+              </a:extLst>
+            </a:blip>
+            <a:stretch>
+              <a:fillRect/>
+            </a:stretch>
+          </p:blipFill>
+          <p:spPr>
+            <a:xfrm>
+              <a:off x="3258780" y="-6093679"/>
+              <a:ext cx="3342948" cy="395824"/>
+            </a:xfrm>
+            <a:prstGeom prst="rect">
+              <a:avLst/>
+            </a:prstGeom>
+          </p:spPr>
+        </p:pic>
+        <p:pic>
+          <p:nvPicPr>
+            <p:cNvPr id="123" name="Grafik 122">
+              <a:extLst>
+                <a:ext uri="{FF2B5EF4-FFF2-40B4-BE49-F238E27FC236}">
+                  <a16:creationId xmlns:a16="http://schemas.microsoft.com/office/drawing/2014/main" id="{C8A764E2-3118-4B6D-BAF9-8B4D13F2E30A}"/>
+                </a:ext>
+              </a:extLst>
+            </p:cNvPr>
+            <p:cNvPicPr>
+              <a:picLocks noChangeAspect="1"/>
+            </p:cNvPicPr>
+            <p:nvPr/>
+          </p:nvPicPr>
+          <p:blipFill>
+            <a:blip r:embed="rId14">
+              <a:extLst>
+                <a:ext uri="{28A0092B-C50C-407E-A947-70E740481C1C}">
+                  <a14:useLocalDpi xmlns:a14="http://schemas.microsoft.com/office/drawing/2010/main" val="0"/>
+                </a:ext>
+              </a:extLst>
+            </a:blip>
+            <a:stretch>
+              <a:fillRect/>
+            </a:stretch>
+          </p:blipFill>
+          <p:spPr>
+            <a:xfrm>
+              <a:off x="2583063" y="-1125243"/>
+              <a:ext cx="4694382" cy="3520787"/>
+            </a:xfrm>
+            <a:prstGeom prst="rect">
+              <a:avLst/>
+            </a:prstGeom>
+          </p:spPr>
+        </p:pic>
+        <p:pic>
+          <p:nvPicPr>
+            <p:cNvPr id="124" name="Grafik 123">
+              <a:extLst>
+                <a:ext uri="{FF2B5EF4-FFF2-40B4-BE49-F238E27FC236}">
+                  <a16:creationId xmlns:a16="http://schemas.microsoft.com/office/drawing/2014/main" id="{B2E89C81-847F-44C1-A6CC-E373029D447C}"/>
+                </a:ext>
+              </a:extLst>
+            </p:cNvPr>
+            <p:cNvPicPr>
+              <a:picLocks noChangeAspect="1"/>
+            </p:cNvPicPr>
+            <p:nvPr>
+              <p:custDataLst>
+                <p:tags r:id="rId8"/>
+              </p:custDataLst>
+            </p:nvPr>
+          </p:nvPicPr>
+          <p:blipFill>
+            <a:blip r:embed="rId15">
+              <a:extLst>
+                <a:ext uri="{28A0092B-C50C-407E-A947-70E740481C1C}">
+                  <a14:useLocalDpi xmlns:a14="http://schemas.microsoft.com/office/drawing/2010/main" val="0"/>
+                </a:ext>
+              </a:extLst>
+            </a:blip>
+            <a:stretch>
+              <a:fillRect/>
+            </a:stretch>
+          </p:blipFill>
+          <p:spPr>
+            <a:xfrm>
+              <a:off x="2436159" y="-1672008"/>
+              <a:ext cx="4988189" cy="399277"/>
+            </a:xfrm>
+            <a:prstGeom prst="rect">
+              <a:avLst/>
+            </a:prstGeom>
+          </p:spPr>
+        </p:pic>
+        <p:pic>
+          <p:nvPicPr>
+            <p:cNvPr id="125" name="Grafik 124" descr="Ein Bild, das drinnen enthält.&#10;&#10;Automatisch generierte Beschreibung">
+              <a:extLst>
+                <a:ext uri="{FF2B5EF4-FFF2-40B4-BE49-F238E27FC236}">
+                  <a16:creationId xmlns:a16="http://schemas.microsoft.com/office/drawing/2014/main" id="{51236EB7-9D30-403E-B191-5CF0895E7F79}"/>
+                </a:ext>
+              </a:extLst>
+            </p:cNvPr>
+            <p:cNvPicPr>
+              <a:picLocks noChangeAspect="1"/>
+            </p:cNvPicPr>
+            <p:nvPr/>
+          </p:nvPicPr>
+          <p:blipFill>
+            <a:blip r:embed="rId16">
+              <a:extLst>
+                <a:ext uri="{28A0092B-C50C-407E-A947-70E740481C1C}">
+                  <a14:useLocalDpi xmlns:a14="http://schemas.microsoft.com/office/drawing/2010/main" val="0"/>
+                </a:ext>
+              </a:extLst>
+            </a:blip>
+            <a:stretch>
+              <a:fillRect/>
+            </a:stretch>
+          </p:blipFill>
+          <p:spPr>
+            <a:xfrm>
+              <a:off x="8346658" y="-3160912"/>
+              <a:ext cx="4694382" cy="3520787"/>
+            </a:xfrm>
+            <a:prstGeom prst="rect">
+              <a:avLst/>
+            </a:prstGeom>
+          </p:spPr>
+        </p:pic>
+        <p:pic>
+          <p:nvPicPr>
+            <p:cNvPr id="126" name="Grafik 125">
+              <a:extLst>
+                <a:ext uri="{FF2B5EF4-FFF2-40B4-BE49-F238E27FC236}">
+                  <a16:creationId xmlns:a16="http://schemas.microsoft.com/office/drawing/2014/main" id="{A0859278-9E8B-425D-9A71-C1FA804E178A}"/>
+                </a:ext>
+              </a:extLst>
+            </p:cNvPr>
+            <p:cNvPicPr>
+              <a:picLocks noChangeAspect="1"/>
+            </p:cNvPicPr>
+            <p:nvPr>
+              <p:custDataLst>
+                <p:tags r:id="rId9"/>
+              </p:custDataLst>
+            </p:nvPr>
+          </p:nvPicPr>
+          <p:blipFill>
+            <a:blip r:embed="rId17">
+              <a:extLst>
+                <a:ext uri="{28A0092B-C50C-407E-A947-70E740481C1C}">
+                  <a14:useLocalDpi xmlns:a14="http://schemas.microsoft.com/office/drawing/2010/main" val="0"/>
+                </a:ext>
+              </a:extLst>
+            </a:blip>
+            <a:stretch>
+              <a:fillRect/>
+            </a:stretch>
+          </p:blipFill>
+          <p:spPr>
+            <a:xfrm>
+              <a:off x="8966373" y="-3703892"/>
+              <a:ext cx="3453029" cy="395492"/>
+            </a:xfrm>
+            <a:prstGeom prst="rect">
+              <a:avLst/>
+            </a:prstGeom>
+          </p:spPr>
+        </p:pic>
+        <p:pic>
+          <p:nvPicPr>
+            <p:cNvPr id="127" name="Grafik 126" descr="Ein Bild, das Kleiderbügel, Himmel enthält.&#10;&#10;Automatisch generierte Beschreibung">
+              <a:extLst>
+                <a:ext uri="{FF2B5EF4-FFF2-40B4-BE49-F238E27FC236}">
+                  <a16:creationId xmlns:a16="http://schemas.microsoft.com/office/drawing/2014/main" id="{10376E0D-BB0B-4C29-B9E5-3C72166DE2D9}"/>
+                </a:ext>
+              </a:extLst>
+            </p:cNvPr>
+            <p:cNvPicPr>
+              <a:picLocks noChangeAspect="1"/>
+            </p:cNvPicPr>
+            <p:nvPr/>
+          </p:nvPicPr>
+          <p:blipFill>
+            <a:blip r:embed="rId18">
+              <a:extLst>
+                <a:ext uri="{28A0092B-C50C-407E-A947-70E740481C1C}">
+                  <a14:useLocalDpi xmlns:a14="http://schemas.microsoft.com/office/drawing/2010/main" val="0"/>
+                </a:ext>
+              </a:extLst>
+            </a:blip>
+            <a:stretch>
+              <a:fillRect/>
+            </a:stretch>
+          </p:blipFill>
+          <p:spPr>
+            <a:xfrm>
+              <a:off x="14108330" y="-3160912"/>
+              <a:ext cx="4694382" cy="3520787"/>
+            </a:xfrm>
+            <a:prstGeom prst="rect">
+              <a:avLst/>
+            </a:prstGeom>
+          </p:spPr>
+        </p:pic>
+        <p:pic>
+          <p:nvPicPr>
+            <p:cNvPr id="128" name="Grafik 127">
+              <a:extLst>
+                <a:ext uri="{FF2B5EF4-FFF2-40B4-BE49-F238E27FC236}">
+                  <a16:creationId xmlns:a16="http://schemas.microsoft.com/office/drawing/2014/main" id="{A871006F-A884-4DAB-A357-88F07FE70958}"/>
+                </a:ext>
+              </a:extLst>
+            </p:cNvPr>
+            <p:cNvPicPr>
+              <a:picLocks noChangeAspect="1"/>
+            </p:cNvPicPr>
+            <p:nvPr>
+              <p:custDataLst>
+                <p:tags r:id="rId10"/>
+              </p:custDataLst>
+            </p:nvPr>
+          </p:nvPicPr>
+          <p:blipFill>
+            <a:blip r:embed="rId19">
+              <a:extLst>
+                <a:ext uri="{28A0092B-C50C-407E-A947-70E740481C1C}">
+                  <a14:useLocalDpi xmlns:a14="http://schemas.microsoft.com/office/drawing/2010/main" val="0"/>
+                </a:ext>
+              </a:extLst>
+            </a:blip>
+            <a:stretch>
+              <a:fillRect/>
+            </a:stretch>
+          </p:blipFill>
+          <p:spPr>
+            <a:xfrm>
+              <a:off x="14515332" y="-3715220"/>
+              <a:ext cx="3880378" cy="406820"/>
+            </a:xfrm>
+            <a:prstGeom prst="rect">
+              <a:avLst/>
+            </a:prstGeom>
+          </p:spPr>
+        </p:pic>
+        <p:cxnSp>
+          <p:nvCxnSpPr>
+            <p:cNvPr id="129" name="Gerade Verbindung mit Pfeil 128">
+              <a:extLst>
+                <a:ext uri="{FF2B5EF4-FFF2-40B4-BE49-F238E27FC236}">
+                  <a16:creationId xmlns:a16="http://schemas.microsoft.com/office/drawing/2014/main" id="{96FDF556-1AD5-4D02-9865-B8B78699655D}"/>
+                </a:ext>
+              </a:extLst>
+            </p:cNvPr>
+            <p:cNvCxnSpPr>
+              <a:cxnSpLocks/>
+            </p:cNvCxnSpPr>
+            <p:nvPr/>
+          </p:nvCxnSpPr>
+          <p:spPr>
+            <a:xfrm>
+              <a:off x="7424348" y="-3715220"/>
+              <a:ext cx="774772" cy="2160740"/>
+            </a:xfrm>
+            <a:prstGeom prst="straightConnector1">
+              <a:avLst/>
+            </a:prstGeom>
+            <a:ln w="25400">
+              <a:solidFill>
+                <a:schemeClr val="tx1"/>
+              </a:solidFill>
+              <a:tailEnd type="triangle"/>
+            </a:ln>
+          </p:spPr>
+          <p:style>
+            <a:lnRef idx="1">
+              <a:schemeClr val="accent1"/>
+            </a:lnRef>
+            <a:fillRef idx="0">
+              <a:schemeClr val="accent1"/>
+            </a:fillRef>
+            <a:effectRef idx="0">
+              <a:schemeClr val="accent1"/>
+            </a:effectRef>
+            <a:fontRef idx="minor">
+              <a:schemeClr val="tx1"/>
+            </a:fontRef>
+          </p:style>
+        </p:cxnSp>
+        <p:cxnSp>
+          <p:nvCxnSpPr>
+            <p:cNvPr id="130" name="Gerade Verbindung mit Pfeil 129">
+              <a:extLst>
+                <a:ext uri="{FF2B5EF4-FFF2-40B4-BE49-F238E27FC236}">
+                  <a16:creationId xmlns:a16="http://schemas.microsoft.com/office/drawing/2014/main" id="{F6D6D548-9E90-425D-8BFF-79FC94192DC1}"/>
+                </a:ext>
+              </a:extLst>
+            </p:cNvPr>
+            <p:cNvCxnSpPr>
+              <a:cxnSpLocks/>
+            </p:cNvCxnSpPr>
+            <p:nvPr/>
+          </p:nvCxnSpPr>
+          <p:spPr>
+            <a:xfrm flipV="1">
+              <a:off x="7424348" y="-1272731"/>
+              <a:ext cx="774772" cy="1882331"/>
+            </a:xfrm>
+            <a:prstGeom prst="straightConnector1">
+              <a:avLst/>
+            </a:prstGeom>
+            <a:ln w="25400">
+              <a:solidFill>
+                <a:schemeClr val="tx1"/>
+              </a:solidFill>
+              <a:tailEnd type="triangle"/>
+            </a:ln>
+          </p:spPr>
+          <p:style>
+            <a:lnRef idx="1">
+              <a:schemeClr val="accent1"/>
+            </a:lnRef>
+            <a:fillRef idx="0">
+              <a:schemeClr val="accent1"/>
+            </a:fillRef>
+            <a:effectRef idx="0">
+              <a:schemeClr val="accent1"/>
+            </a:effectRef>
+            <a:fontRef idx="minor">
+              <a:schemeClr val="tx1"/>
+            </a:fontRef>
+          </p:style>
+        </p:cxnSp>
+        <p:cxnSp>
+          <p:nvCxnSpPr>
+            <p:cNvPr id="131" name="Gerade Verbindung mit Pfeil 130">
+              <a:extLst>
+                <a:ext uri="{FF2B5EF4-FFF2-40B4-BE49-F238E27FC236}">
+                  <a16:creationId xmlns:a16="http://schemas.microsoft.com/office/drawing/2014/main" id="{E21A81D7-881D-4D1E-8FE4-4EB249D30E6B}"/>
+                </a:ext>
+              </a:extLst>
+            </p:cNvPr>
+            <p:cNvCxnSpPr>
+              <a:cxnSpLocks/>
+            </p:cNvCxnSpPr>
+            <p:nvPr/>
+          </p:nvCxnSpPr>
+          <p:spPr>
+            <a:xfrm>
+              <a:off x="13289280" y="-1385278"/>
+              <a:ext cx="563880" cy="0"/>
+            </a:xfrm>
+            <a:prstGeom prst="straightConnector1">
+              <a:avLst/>
+            </a:prstGeom>
+            <a:ln w="25400">
+              <a:solidFill>
+                <a:schemeClr val="tx1"/>
+              </a:solidFill>
+              <a:tailEnd type="triangle"/>
+            </a:ln>
+          </p:spPr>
+          <p:style>
+            <a:lnRef idx="1">
+              <a:schemeClr val="accent1"/>
+            </a:lnRef>
+            <a:fillRef idx="0">
+              <a:schemeClr val="accent1"/>
+            </a:fillRef>
+            <a:effectRef idx="0">
+              <a:schemeClr val="accent1"/>
+            </a:effectRef>
+            <a:fontRef idx="minor">
+              <a:schemeClr val="tx1"/>
+            </a:fontRef>
+          </p:style>
+        </p:cxnSp>
+      </p:grpSp>
+      <p:grpSp>
+        <p:nvGrpSpPr>
+          <p:cNvPr id="142" name="Gruppieren 141">
+            <a:extLst>
+              <a:ext uri="{FF2B5EF4-FFF2-40B4-BE49-F238E27FC236}">
+                <a16:creationId xmlns:a16="http://schemas.microsoft.com/office/drawing/2014/main" id="{A980C6E5-A4D3-4289-B2B0-2AA8DEB60296}"/>
+              </a:ext>
+            </a:extLst>
+          </p:cNvPr>
+          <p:cNvGrpSpPr/>
+          <p:nvPr/>
+        </p:nvGrpSpPr>
+        <p:grpSpPr>
+          <a:xfrm>
+            <a:off x="3664108" y="3429000"/>
+            <a:ext cx="16220284" cy="8486490"/>
+            <a:chOff x="-30852" y="-8489223"/>
+            <a:chExt cx="16220284" cy="8486490"/>
+          </a:xfrm>
+        </p:grpSpPr>
+        <p:pic>
+          <p:nvPicPr>
+            <p:cNvPr id="21" name="Grafik 20">
+              <a:extLst>
+                <a:ext uri="{FF2B5EF4-FFF2-40B4-BE49-F238E27FC236}">
+                  <a16:creationId xmlns:a16="http://schemas.microsoft.com/office/drawing/2014/main" id="{8EB3E150-0B6A-48A6-A69B-34764010975E}"/>
+                </a:ext>
+              </a:extLst>
+            </p:cNvPr>
+            <p:cNvPicPr>
+              <a:picLocks noChangeAspect="1"/>
+            </p:cNvPicPr>
+            <p:nvPr/>
+          </p:nvPicPr>
+          <p:blipFill>
+            <a:blip r:embed="rId20">
+              <a:extLst>
+                <a:ext uri="{28A0092B-C50C-407E-A947-70E740481C1C}">
+                  <a14:useLocalDpi xmlns:a14="http://schemas.microsoft.com/office/drawing/2010/main" val="0"/>
+                </a:ext>
+              </a:extLst>
+            </a:blip>
+            <a:stretch>
+              <a:fillRect/>
+            </a:stretch>
+          </p:blipFill>
+          <p:spPr>
+            <a:xfrm>
+              <a:off x="-30852" y="-3523520"/>
+              <a:ext cx="4694382" cy="3520787"/>
+            </a:xfrm>
+            <a:prstGeom prst="rect">
+              <a:avLst/>
+            </a:prstGeom>
+          </p:spPr>
+        </p:pic>
+        <p:pic>
+          <p:nvPicPr>
+            <p:cNvPr id="42" name="Grafik 41">
+              <a:extLst>
+                <a:ext uri="{FF2B5EF4-FFF2-40B4-BE49-F238E27FC236}">
+                  <a16:creationId xmlns:a16="http://schemas.microsoft.com/office/drawing/2014/main" id="{F850B679-DDE0-4E9F-8BC2-7AC042F563A3}"/>
+                </a:ext>
+              </a:extLst>
+            </p:cNvPr>
+            <p:cNvPicPr>
+              <a:picLocks noChangeAspect="1"/>
+            </p:cNvPicPr>
+            <p:nvPr>
+              <p:custDataLst>
+                <p:tags r:id="rId1"/>
+              </p:custDataLst>
+            </p:nvPr>
+          </p:nvPicPr>
+          <p:blipFill>
+            <a:blip r:embed="rId21">
+              <a:extLst>
+                <a:ext uri="{28A0092B-C50C-407E-A947-70E740481C1C}">
+                  <a14:useLocalDpi xmlns:a14="http://schemas.microsoft.com/office/drawing/2010/main" val="0"/>
+                </a:ext>
+              </a:extLst>
+            </a:blip>
+            <a:stretch>
+              <a:fillRect/>
+            </a:stretch>
+          </p:blipFill>
+          <p:spPr>
+            <a:xfrm>
+              <a:off x="187775" y="-4066239"/>
+              <a:ext cx="4258397" cy="396650"/>
+            </a:xfrm>
+            <a:prstGeom prst="rect">
+              <a:avLst/>
+            </a:prstGeom>
+          </p:spPr>
+        </p:pic>
+        <p:pic>
+          <p:nvPicPr>
+            <p:cNvPr id="23" name="Grafik 22" descr="Ein Bild, das Foto, Boden, sitzend enthält.&#10;&#10;Automatisch generierte Beschreibung">
+              <a:extLst>
+                <a:ext uri="{FF2B5EF4-FFF2-40B4-BE49-F238E27FC236}">
+                  <a16:creationId xmlns:a16="http://schemas.microsoft.com/office/drawing/2014/main" id="{37468B04-27AE-400B-BF18-D78C5358A8F3}"/>
+                </a:ext>
+              </a:extLst>
+            </p:cNvPr>
+            <p:cNvPicPr>
+              <a:picLocks noChangeAspect="1"/>
+            </p:cNvPicPr>
+            <p:nvPr/>
+          </p:nvPicPr>
+          <p:blipFill>
+            <a:blip r:embed="rId22">
+              <a:extLst>
+                <a:ext uri="{28A0092B-C50C-407E-A947-70E740481C1C}">
+                  <a14:useLocalDpi xmlns:a14="http://schemas.microsoft.com/office/drawing/2010/main" val="0"/>
+                </a:ext>
+              </a:extLst>
+            </a:blip>
+            <a:stretch>
+              <a:fillRect/>
+            </a:stretch>
+          </p:blipFill>
+          <p:spPr>
+            <a:xfrm>
+              <a:off x="-30217" y="-7945911"/>
+              <a:ext cx="4694382" cy="3520787"/>
+            </a:xfrm>
+            <a:prstGeom prst="rect">
+              <a:avLst/>
+            </a:prstGeom>
+          </p:spPr>
+        </p:pic>
+        <p:pic>
+          <p:nvPicPr>
+            <p:cNvPr id="53" name="Grafik 52">
+              <a:extLst>
+                <a:ext uri="{FF2B5EF4-FFF2-40B4-BE49-F238E27FC236}">
+                  <a16:creationId xmlns:a16="http://schemas.microsoft.com/office/drawing/2014/main" id="{8DE3655C-6658-4BDC-89DF-D693C80B4E9B}"/>
+                </a:ext>
+              </a:extLst>
+            </p:cNvPr>
+            <p:cNvPicPr>
+              <a:picLocks noChangeAspect="1"/>
+            </p:cNvPicPr>
+            <p:nvPr>
+              <p:custDataLst>
+                <p:tags r:id="rId2"/>
+              </p:custDataLst>
+            </p:nvPr>
+          </p:nvPicPr>
+          <p:blipFill>
+            <a:blip r:embed="rId23">
+              <a:extLst>
+                <a:ext uri="{28A0092B-C50C-407E-A947-70E740481C1C}">
+                  <a14:useLocalDpi xmlns:a14="http://schemas.microsoft.com/office/drawing/2010/main" val="0"/>
+                </a:ext>
+              </a:extLst>
+            </a:blip>
+            <a:stretch>
+              <a:fillRect/>
+            </a:stretch>
+          </p:blipFill>
+          <p:spPr>
+            <a:xfrm>
+              <a:off x="978127" y="-8489223"/>
+              <a:ext cx="2677692" cy="388627"/>
+            </a:xfrm>
+            <a:prstGeom prst="rect">
+              <a:avLst/>
+            </a:prstGeom>
+          </p:spPr>
+        </p:pic>
+        <p:pic>
+          <p:nvPicPr>
+            <p:cNvPr id="18" name="Grafik 17" descr="Ein Bild, das Wand, Himmel, Foto enthält.&#10;&#10;Automatisch generierte Beschreibung">
+              <a:extLst>
+                <a:ext uri="{FF2B5EF4-FFF2-40B4-BE49-F238E27FC236}">
+                  <a16:creationId xmlns:a16="http://schemas.microsoft.com/office/drawing/2014/main" id="{3A1B9297-97C7-4DE6-9A86-7FBBC6765794}"/>
+                </a:ext>
+              </a:extLst>
+            </p:cNvPr>
+            <p:cNvPicPr>
+              <a:picLocks noChangeAspect="1"/>
+            </p:cNvPicPr>
+            <p:nvPr/>
+          </p:nvPicPr>
+          <p:blipFill>
+            <a:blip r:embed="rId24">
+              <a:extLst>
+                <a:ext uri="{28A0092B-C50C-407E-A947-70E740481C1C}">
+                  <a14:useLocalDpi xmlns:a14="http://schemas.microsoft.com/office/drawing/2010/main" val="0"/>
+                </a:ext>
+              </a:extLst>
+            </a:blip>
+            <a:stretch>
+              <a:fillRect/>
+            </a:stretch>
+          </p:blipFill>
+          <p:spPr>
+            <a:xfrm>
+              <a:off x="11495050" y="-5556458"/>
+              <a:ext cx="4694382" cy="3520787"/>
+            </a:xfrm>
+            <a:prstGeom prst="rect">
+              <a:avLst/>
+            </a:prstGeom>
+          </p:spPr>
+        </p:pic>
+        <p:pic>
+          <p:nvPicPr>
+            <p:cNvPr id="139" name="Grafik 138">
+              <a:extLst>
+                <a:ext uri="{FF2B5EF4-FFF2-40B4-BE49-F238E27FC236}">
+                  <a16:creationId xmlns:a16="http://schemas.microsoft.com/office/drawing/2014/main" id="{132D4FAD-D812-4308-A3FE-D28F5B3FE275}"/>
+                </a:ext>
+              </a:extLst>
+            </p:cNvPr>
+            <p:cNvPicPr>
+              <a:picLocks noChangeAspect="1"/>
+            </p:cNvPicPr>
+            <p:nvPr>
+              <p:custDataLst>
+                <p:tags r:id="rId3"/>
+              </p:custDataLst>
+            </p:nvPr>
+          </p:nvPicPr>
+          <p:blipFill>
+            <a:blip r:embed="rId25">
+              <a:extLst>
+                <a:ext uri="{28A0092B-C50C-407E-A947-70E740481C1C}">
+                  <a14:useLocalDpi xmlns:a14="http://schemas.microsoft.com/office/drawing/2010/main" val="0"/>
+                </a:ext>
+              </a:extLst>
+            </a:blip>
+            <a:stretch>
+              <a:fillRect/>
+            </a:stretch>
+          </p:blipFill>
+          <p:spPr>
+            <a:xfrm>
+              <a:off x="11901779" y="-6641421"/>
+              <a:ext cx="3880923" cy="400035"/>
+            </a:xfrm>
+            <a:prstGeom prst="rect">
+              <a:avLst/>
+            </a:prstGeom>
+          </p:spPr>
+        </p:pic>
+        <p:pic>
+          <p:nvPicPr>
+            <p:cNvPr id="16" name="Grafik 15" descr="Ein Bild, das drinnen, Boden, sitzend, Gebäude enthält.&#10;&#10;Automatisch generierte Beschreibung">
+              <a:extLst>
+                <a:ext uri="{FF2B5EF4-FFF2-40B4-BE49-F238E27FC236}">
+                  <a16:creationId xmlns:a16="http://schemas.microsoft.com/office/drawing/2014/main" id="{ED0951AA-E348-4FA2-A8BF-CC0F58553E43}"/>
+                </a:ext>
+              </a:extLst>
+            </p:cNvPr>
+            <p:cNvPicPr>
+              <a:picLocks noChangeAspect="1"/>
+            </p:cNvPicPr>
+            <p:nvPr/>
+          </p:nvPicPr>
+          <p:blipFill>
+            <a:blip r:embed="rId26">
+              <a:extLst>
+                <a:ext uri="{28A0092B-C50C-407E-A947-70E740481C1C}">
+                  <a14:useLocalDpi xmlns:a14="http://schemas.microsoft.com/office/drawing/2010/main" val="0"/>
+                </a:ext>
+              </a:extLst>
+            </a:blip>
+            <a:stretch>
+              <a:fillRect/>
+            </a:stretch>
+          </p:blipFill>
+          <p:spPr>
+            <a:xfrm>
+              <a:off x="5732416" y="-5556457"/>
+              <a:ext cx="4694382" cy="3520787"/>
+            </a:xfrm>
+            <a:prstGeom prst="rect">
+              <a:avLst/>
+            </a:prstGeom>
+          </p:spPr>
+        </p:pic>
+        <p:pic>
+          <p:nvPicPr>
+            <p:cNvPr id="134" name="Grafik 133">
+              <a:extLst>
+                <a:ext uri="{FF2B5EF4-FFF2-40B4-BE49-F238E27FC236}">
+                  <a16:creationId xmlns:a16="http://schemas.microsoft.com/office/drawing/2014/main" id="{9BFD7F91-4129-430E-989A-594EB44A7033}"/>
+                </a:ext>
+              </a:extLst>
+            </p:cNvPr>
+            <p:cNvPicPr>
+              <a:picLocks noChangeAspect="1"/>
+            </p:cNvPicPr>
+            <p:nvPr>
+              <p:custDataLst>
+                <p:tags r:id="rId4"/>
+              </p:custDataLst>
+            </p:nvPr>
+          </p:nvPicPr>
+          <p:blipFill>
+            <a:blip r:embed="rId27">
+              <a:extLst>
+                <a:ext uri="{28A0092B-C50C-407E-A947-70E740481C1C}">
+                  <a14:useLocalDpi xmlns:a14="http://schemas.microsoft.com/office/drawing/2010/main" val="0"/>
+                </a:ext>
+              </a:extLst>
+            </a:blip>
+            <a:stretch>
+              <a:fillRect/>
+            </a:stretch>
+          </p:blipFill>
+          <p:spPr>
+            <a:xfrm>
+              <a:off x="6047520" y="-6655208"/>
+              <a:ext cx="4064171" cy="400870"/>
+            </a:xfrm>
+            <a:prstGeom prst="rect">
+              <a:avLst/>
+            </a:prstGeom>
+          </p:spPr>
+        </p:pic>
+        <p:cxnSp>
+          <p:nvCxnSpPr>
+            <p:cNvPr id="117" name="Gerade Verbindung mit Pfeil 116">
+              <a:extLst>
+                <a:ext uri="{FF2B5EF4-FFF2-40B4-BE49-F238E27FC236}">
+                  <a16:creationId xmlns:a16="http://schemas.microsoft.com/office/drawing/2014/main" id="{B02885EB-5831-4CF1-AE34-458D0ACEA027}"/>
+                </a:ext>
+              </a:extLst>
+            </p:cNvPr>
+            <p:cNvCxnSpPr>
+              <a:cxnSpLocks/>
+            </p:cNvCxnSpPr>
+            <p:nvPr/>
+          </p:nvCxnSpPr>
+          <p:spPr>
+            <a:xfrm>
+              <a:off x="4811068" y="-6110764"/>
+              <a:ext cx="774772" cy="2160740"/>
+            </a:xfrm>
+            <a:prstGeom prst="straightConnector1">
+              <a:avLst/>
+            </a:prstGeom>
+            <a:ln w="25400">
+              <a:solidFill>
+                <a:schemeClr val="tx1"/>
+              </a:solidFill>
+              <a:tailEnd type="triangle"/>
+            </a:ln>
+          </p:spPr>
+          <p:style>
+            <a:lnRef idx="1">
+              <a:schemeClr val="accent1"/>
+            </a:lnRef>
+            <a:fillRef idx="0">
+              <a:schemeClr val="accent1"/>
+            </a:fillRef>
+            <a:effectRef idx="0">
+              <a:schemeClr val="accent1"/>
+            </a:effectRef>
+            <a:fontRef idx="minor">
+              <a:schemeClr val="tx1"/>
+            </a:fontRef>
+          </p:style>
+        </p:cxnSp>
+        <p:cxnSp>
+          <p:nvCxnSpPr>
+            <p:cNvPr id="118" name="Gerade Verbindung mit Pfeil 117">
+              <a:extLst>
+                <a:ext uri="{FF2B5EF4-FFF2-40B4-BE49-F238E27FC236}">
+                  <a16:creationId xmlns:a16="http://schemas.microsoft.com/office/drawing/2014/main" id="{16DED357-8C0F-4F6D-B177-462048CD7424}"/>
+                </a:ext>
+              </a:extLst>
+            </p:cNvPr>
+            <p:cNvCxnSpPr>
+              <a:cxnSpLocks/>
+            </p:cNvCxnSpPr>
+            <p:nvPr/>
+          </p:nvCxnSpPr>
+          <p:spPr>
+            <a:xfrm flipV="1">
+              <a:off x="4811068" y="-3668275"/>
+              <a:ext cx="774772" cy="1882331"/>
+            </a:xfrm>
+            <a:prstGeom prst="straightConnector1">
+              <a:avLst/>
+            </a:prstGeom>
+            <a:ln w="25400">
+              <a:solidFill>
+                <a:schemeClr val="tx1"/>
+              </a:solidFill>
+              <a:tailEnd type="triangle"/>
+            </a:ln>
+          </p:spPr>
+          <p:style>
+            <a:lnRef idx="1">
+              <a:schemeClr val="accent1"/>
+            </a:lnRef>
+            <a:fillRef idx="0">
+              <a:schemeClr val="accent1"/>
+            </a:fillRef>
+            <a:effectRef idx="0">
+              <a:schemeClr val="accent1"/>
+            </a:effectRef>
+            <a:fontRef idx="minor">
+              <a:schemeClr val="tx1"/>
+            </a:fontRef>
+          </p:style>
+        </p:cxnSp>
+        <p:cxnSp>
+          <p:nvCxnSpPr>
+            <p:cNvPr id="119" name="Gerade Verbindung mit Pfeil 118">
+              <a:extLst>
+                <a:ext uri="{FF2B5EF4-FFF2-40B4-BE49-F238E27FC236}">
+                  <a16:creationId xmlns:a16="http://schemas.microsoft.com/office/drawing/2014/main" id="{EAC172F1-B6AF-4838-8C60-57248E242B03}"/>
+                </a:ext>
+              </a:extLst>
+            </p:cNvPr>
+            <p:cNvCxnSpPr>
+              <a:cxnSpLocks/>
+            </p:cNvCxnSpPr>
+            <p:nvPr/>
+          </p:nvCxnSpPr>
+          <p:spPr>
+            <a:xfrm>
+              <a:off x="10676000" y="-3780822"/>
+              <a:ext cx="563880" cy="0"/>
+            </a:xfrm>
+            <a:prstGeom prst="straightConnector1">
+              <a:avLst/>
+            </a:prstGeom>
+            <a:ln w="25400">
+              <a:solidFill>
+                <a:schemeClr val="tx1"/>
+              </a:solidFill>
+              <a:tailEnd type="triangle"/>
+            </a:ln>
+          </p:spPr>
+          <p:style>
+            <a:lnRef idx="1">
+              <a:schemeClr val="accent1"/>
+            </a:lnRef>
+            <a:fillRef idx="0">
+              <a:schemeClr val="accent1"/>
+            </a:fillRef>
+            <a:effectRef idx="0">
+              <a:schemeClr val="accent1"/>
+            </a:effectRef>
+            <a:fontRef idx="minor">
+              <a:schemeClr val="tx1"/>
+            </a:fontRef>
+          </p:style>
+        </p:cxnSp>
+        <p:pic>
+          <p:nvPicPr>
+            <p:cNvPr id="136" name="Grafik 135">
+              <a:extLst>
+                <a:ext uri="{FF2B5EF4-FFF2-40B4-BE49-F238E27FC236}">
+                  <a16:creationId xmlns:a16="http://schemas.microsoft.com/office/drawing/2014/main" id="{56AA014F-8B71-4BF7-80D2-243697C8CD97}"/>
+                </a:ext>
+              </a:extLst>
+            </p:cNvPr>
+            <p:cNvPicPr>
+              <a:picLocks noChangeAspect="1"/>
+            </p:cNvPicPr>
+            <p:nvPr>
+              <p:custDataLst>
+                <p:tags r:id="rId5"/>
+              </p:custDataLst>
+            </p:nvPr>
+          </p:nvPicPr>
+          <p:blipFill>
+            <a:blip r:embed="rId28">
+              <a:extLst>
+                <a:ext uri="{28A0092B-C50C-407E-A947-70E740481C1C}">
+                  <a14:useLocalDpi xmlns:a14="http://schemas.microsoft.com/office/drawing/2010/main" val="0"/>
+                </a:ext>
+              </a:extLst>
+            </a:blip>
+            <a:stretch>
+              <a:fillRect/>
+            </a:stretch>
+          </p:blipFill>
+          <p:spPr>
+            <a:xfrm>
+              <a:off x="7227028" y="-6102064"/>
+              <a:ext cx="1705157" cy="390251"/>
+            </a:xfrm>
+            <a:prstGeom prst="rect">
+              <a:avLst/>
+            </a:prstGeom>
+          </p:spPr>
+        </p:pic>
+        <p:pic>
+          <p:nvPicPr>
+            <p:cNvPr id="141" name="Grafik 140">
+              <a:extLst>
+                <a:ext uri="{FF2B5EF4-FFF2-40B4-BE49-F238E27FC236}">
+                  <a16:creationId xmlns:a16="http://schemas.microsoft.com/office/drawing/2014/main" id="{68BE4C9A-1347-4AE6-BEAF-14795A1DA3D1}"/>
+                </a:ext>
+              </a:extLst>
+            </p:cNvPr>
+            <p:cNvPicPr>
+              <a:picLocks noChangeAspect="1"/>
+            </p:cNvPicPr>
+            <p:nvPr>
+              <p:custDataLst>
+                <p:tags r:id="rId6"/>
+              </p:custDataLst>
+            </p:nvPr>
+          </p:nvPicPr>
+          <p:blipFill>
+            <a:blip r:embed="rId29">
+              <a:extLst>
+                <a:ext uri="{28A0092B-C50C-407E-A947-70E740481C1C}">
+                  <a14:useLocalDpi xmlns:a14="http://schemas.microsoft.com/office/drawing/2010/main" val="0"/>
+                </a:ext>
+              </a:extLst>
+            </a:blip>
+            <a:stretch>
+              <a:fillRect/>
+            </a:stretch>
+          </p:blipFill>
+          <p:spPr>
+            <a:xfrm>
+              <a:off x="11631345" y="-6100511"/>
+              <a:ext cx="4421792" cy="397386"/>
+            </a:xfrm>
+            <a:prstGeom prst="rect">
+              <a:avLst/>
+            </a:prstGeom>
+          </p:spPr>
+        </p:pic>
+      </p:grpSp>
+      <p:sp>
+        <p:nvSpPr>
+          <p:cNvPr id="143" name="Textfeld 142">
+            <a:extLst>
+              <a:ext uri="{FF2B5EF4-FFF2-40B4-BE49-F238E27FC236}">
+                <a16:creationId xmlns:a16="http://schemas.microsoft.com/office/drawing/2014/main" id="{AEA92FC3-4327-4BBA-B91F-A5F6E3BA24E7}"/>
+              </a:ext>
+            </a:extLst>
+          </p:cNvPr>
+          <p:cNvSpPr txBox="1"/>
+          <p:nvPr/>
+        </p:nvSpPr>
+        <p:spPr>
+          <a:xfrm>
+            <a:off x="76199" y="66675"/>
+            <a:ext cx="2088017" cy="369332"/>
+          </a:xfrm>
+          <a:prstGeom prst="rect">
+            <a:avLst/>
+          </a:prstGeom>
+          <a:noFill/>
+        </p:spPr>
+        <p:txBody>
+          <a:bodyPr wrap="square" rtlCol="0">
+            <a:spAutoFit/>
+          </a:bodyPr>
+          <a:lstStyle/>
+          <a:p>
+            <a:r>
+              <a:rPr lang="de-DE" dirty="0"/>
+              <a:t>Image Processing</a:t>
+            </a:r>
+            <a:endParaRPr lang="en-GB" dirty="0"/>
+          </a:p>
+        </p:txBody>
+      </p:sp>
+    </p:spTree>
+    <p:extLst>
+      <p:ext uri="{BB962C8B-B14F-4D97-AF65-F5344CB8AC3E}">
+        <p14:creationId xmlns:p14="http://schemas.microsoft.com/office/powerpoint/2010/main" val="2932421867"/>
       </p:ext>
     </p:extLst>
   </p:cSld>
@@ -19751,6 +20740,44 @@
 </p:tagLst>
 </file>
 
+<file path=ppt/tags/tag78.xml><?xml version="1.0" encoding="utf-8"?>
+<p:tagLst xmlns:a="http://schemas.openxmlformats.org/drawingml/2006/main" xmlns:r="http://schemas.openxmlformats.org/officeDocument/2006/relationships" xmlns:p="http://schemas.openxmlformats.org/presentationml/2006/main">
+  <p:tag name="OUTPUTDPI" val="1200"/>
+  <p:tag name="ORIGINALHEIGHT" val="113,2358"/>
+  <p:tag name="ORIGINALWIDTH" val="1247,094"/>
+  <p:tag name="LATEXADDIN" val="\documentclass{article}&#10;\usepackage{amsmath}&#10;\usepackage{color}&#10;\pagestyle{empty}&#10;\begin{document}&#10;%\color{white}&#10;Left Right Consistency&#10;\end{document}"/>
+  <p:tag name="IGUANATEXSIZE" val="20"/>
+  <p:tag name="IGUANATEXCURSOR" val="136"/>
+  <p:tag name="TRANSPARENCY" val="Wahr"/>
+  <p:tag name="FILENAME" val=""/>
+  <p:tag name="LATEXENGINEID" val="0"/>
+  <p:tag name="TEMPFOLDER" val="c:\temp\"/>
+  <p:tag name="LATEXFORMHEIGHT" val="312"/>
+  <p:tag name="LATEXFORMWIDTH" val="384"/>
+  <p:tag name="LATEXFORMWRAP" val="Wahr"/>
+  <p:tag name="BITMAPVECTOR" val="0"/>
+</p:tagLst>
+</file>
+
+<file path=ppt/tags/tag79.xml><?xml version="1.0" encoding="utf-8"?>
+<p:tagLst xmlns:a="http://schemas.openxmlformats.org/drawingml/2006/main" xmlns:r="http://schemas.openxmlformats.org/officeDocument/2006/relationships" xmlns:p="http://schemas.openxmlformats.org/presentationml/2006/main">
+  <p:tag name="OUTPUTDPI" val="1200"/>
+  <p:tag name="ORIGINALHEIGHT" val="110,2362"/>
+  <p:tag name="ORIGINALWIDTH" val="783,652"/>
+  <p:tag name="LATEXADDIN" val="\documentclass{article}&#10;\usepackage{amsmath}&#10;\usepackage{color}&#10;\pagestyle{empty}&#10;\begin{document}&#10;%\color{white}&#10;Disparity Map&#10;\end{document}"/>
+  <p:tag name="IGUANATEXSIZE" val="20"/>
+  <p:tag name="IGUANATEXCURSOR" val="114"/>
+  <p:tag name="TRANSPARENCY" val="Wahr"/>
+  <p:tag name="FILENAME" val=""/>
+  <p:tag name="LATEXENGINEID" val="0"/>
+  <p:tag name="TEMPFOLDER" val="c:\temp\"/>
+  <p:tag name="LATEXFORMHEIGHT" val="312"/>
+  <p:tag name="LATEXFORMWIDTH" val="384"/>
+  <p:tag name="LATEXFORMWRAP" val="Wahr"/>
+  <p:tag name="BITMAPVECTOR" val="0"/>
+</p:tagLst>
+</file>
+
 <file path=ppt/tags/tag8.xml><?xml version="1.0" encoding="utf-8"?>
 <p:tagLst xmlns:a="http://schemas.openxmlformats.org/drawingml/2006/main" xmlns:r="http://schemas.openxmlformats.org/officeDocument/2006/relationships" xmlns:p="http://schemas.openxmlformats.org/presentationml/2006/main">
   <p:tag name="OUTPUTDPI" val="1200"/>
@@ -19759,6 +20786,158 @@
   <p:tag name="LATEXADDIN" val="\documentclass{article}&#10;\usepackage{amsmath}&#10;\usepackage{color}&#10;\pagestyle{empty}&#10;\begin{document}&#10;\color{white}&#10;\begin{equation}&#10;x&#10;\nonumber&#10;\end{equation}&#10;\end{document}"/>
   <p:tag name="IGUANATEXSIZE" val="20"/>
   <p:tag name="IGUANATEXCURSOR" val="99"/>
+  <p:tag name="TRANSPARENCY" val="Wahr"/>
+  <p:tag name="FILENAME" val=""/>
+  <p:tag name="LATEXENGINEID" val="0"/>
+  <p:tag name="TEMPFOLDER" val="c:\temp\"/>
+  <p:tag name="LATEXFORMHEIGHT" val="312"/>
+  <p:tag name="LATEXFORMWIDTH" val="384"/>
+  <p:tag name="LATEXFORMWRAP" val="Wahr"/>
+  <p:tag name="BITMAPVECTOR" val="0"/>
+</p:tagLst>
+</file>
+
+<file path=ppt/tags/tag80.xml><?xml version="1.0" encoding="utf-8"?>
+<p:tagLst xmlns:a="http://schemas.openxmlformats.org/drawingml/2006/main" xmlns:r="http://schemas.openxmlformats.org/officeDocument/2006/relationships" xmlns:p="http://schemas.openxmlformats.org/presentationml/2006/main">
+  <p:tag name="OUTPUTDPI" val="1200"/>
+  <p:tag name="ORIGINALHEIGHT" val="113,2358"/>
+  <p:tag name="ORIGINALWIDTH" val="1135,358"/>
+  <p:tag name="LATEXADDIN" val="\documentclass{article}&#10;\usepackage{amsmath}&#10;\usepackage{color}&#10;\pagestyle{empty}&#10;\begin{document}&#10;%\color{white}&#10;Confidence Weighted&#10;\end{document}"/>
+  <p:tag name="IGUANATEXSIZE" val="20"/>
+  <p:tag name="IGUANATEXCURSOR" val="133"/>
+  <p:tag name="TRANSPARENCY" val="Wahr"/>
+  <p:tag name="FILENAME" val=""/>
+  <p:tag name="LATEXENGINEID" val="0"/>
+  <p:tag name="TEMPFOLDER" val="c:\temp\"/>
+  <p:tag name="LATEXFORMHEIGHT" val="312"/>
+  <p:tag name="LATEXFORMWIDTH" val="384"/>
+  <p:tag name="LATEXFORMWRAP" val="Wahr"/>
+  <p:tag name="BITMAPVECTOR" val="0"/>
+</p:tagLst>
+</file>
+
+<file path=ppt/tags/tag81.xml><?xml version="1.0" encoding="utf-8"?>
+<p:tagLst xmlns:a="http://schemas.openxmlformats.org/drawingml/2006/main" xmlns:r="http://schemas.openxmlformats.org/officeDocument/2006/relationships" xmlns:p="http://schemas.openxmlformats.org/presentationml/2006/main">
+  <p:tag name="OUTPUTDPI" val="1200"/>
+  <p:tag name="ORIGINALHEIGHT" val="113,2358"/>
+  <p:tag name="ORIGINALWIDTH" val="1188,601"/>
+  <p:tag name="LATEXADDIN" val="\documentclass{article}&#10;\usepackage{amsmath}&#10;\usepackage{color}&#10;\pagestyle{empty}&#10;\begin{document}&#10;%\color{white}&#10;Consistency Weighted&#10;\end{document}"/>
+  <p:tag name="IGUANATEXSIZE" val="20"/>
+  <p:tag name="IGUANATEXCURSOR" val="134"/>
+  <p:tag name="TRANSPARENCY" val="Wahr"/>
+  <p:tag name="FILENAME" val=""/>
+  <p:tag name="LATEXENGINEID" val="0"/>
+  <p:tag name="TEMPFOLDER" val="c:\temp\"/>
+  <p:tag name="LATEXFORMHEIGHT" val="312"/>
+  <p:tag name="LATEXFORMWIDTH" val="384"/>
+  <p:tag name="LATEXFORMWRAP" val="Wahr"/>
+  <p:tag name="BITMAPVECTOR" val="0"/>
+</p:tagLst>
+</file>
+
+<file path=ppt/tags/tag82.xml><?xml version="1.0" encoding="utf-8"?>
+<p:tagLst xmlns:a="http://schemas.openxmlformats.org/drawingml/2006/main" xmlns:r="http://schemas.openxmlformats.org/officeDocument/2006/relationships" xmlns:p="http://schemas.openxmlformats.org/presentationml/2006/main">
+  <p:tag name="OUTPUTDPI" val="1200"/>
+  <p:tag name="ORIGINALHEIGHT" val="110,2362"/>
+  <p:tag name="ORIGINALWIDTH" val="498,6877"/>
+  <p:tag name="LATEXADDIN" val="\documentclass{article}&#10;\usepackage{amsmath}&#10;\usepackage{color}&#10;\pagestyle{empty}&#10;\begin{document}&#10;%\color{white}&#10;Disparity&#10;\end{document}"/>
+  <p:tag name="IGUANATEXSIZE" val="20"/>
+  <p:tag name="IGUANATEXCURSOR" val="114"/>
+  <p:tag name="TRANSPARENCY" val="Wahr"/>
+  <p:tag name="FILENAME" val=""/>
+  <p:tag name="LATEXENGINEID" val="0"/>
+  <p:tag name="TEMPFOLDER" val="c:\temp\"/>
+  <p:tag name="LATEXFORMHEIGHT" val="312"/>
+  <p:tag name="LATEXFORMWIDTH" val="384"/>
+  <p:tag name="LATEXFORMWRAP" val="Wahr"/>
+  <p:tag name="BITMAPVECTOR" val="0"/>
+</p:tagLst>
+</file>
+
+<file path=ppt/tags/tag83.xml><?xml version="1.0" encoding="utf-8"?>
+<p:tagLst xmlns:a="http://schemas.openxmlformats.org/drawingml/2006/main" xmlns:r="http://schemas.openxmlformats.org/officeDocument/2006/relationships" xmlns:p="http://schemas.openxmlformats.org/presentationml/2006/main">
+  <p:tag name="OUTPUTDPI" val="1200"/>
+  <p:tag name="ORIGINALHEIGHT" val="112,4859"/>
+  <p:tag name="ORIGINALWIDTH" val="1293,588"/>
+  <p:tag name="LATEXADDIN" val="\documentclass{article}&#10;\usepackage{amsmath}&#10;\usepackage{color}&#10;\pagestyle{empty}&#10;\begin{document}&#10;%\color{white}&#10;Least Squares Disparity&#10;\end{document}"/>
+  <p:tag name="IGUANATEXSIZE" val="20"/>
+  <p:tag name="IGUANATEXCURSOR" val="114"/>
+  <p:tag name="TRANSPARENCY" val="Wahr"/>
+  <p:tag name="FILENAME" val=""/>
+  <p:tag name="LATEXENGINEID" val="0"/>
+  <p:tag name="TEMPFOLDER" val="c:\temp\"/>
+  <p:tag name="LATEXFORMHEIGHT" val="312"/>
+  <p:tag name="LATEXFORMWIDTH" val="384"/>
+  <p:tag name="LATEXFORMWRAP" val="Wahr"/>
+  <p:tag name="BITMAPVECTOR" val="0"/>
+</p:tagLst>
+</file>
+
+<file path=ppt/tags/tag84.xml><?xml version="1.0" encoding="utf-8"?>
+<p:tagLst xmlns:a="http://schemas.openxmlformats.org/drawingml/2006/main" xmlns:r="http://schemas.openxmlformats.org/officeDocument/2006/relationships" xmlns:p="http://schemas.openxmlformats.org/presentationml/2006/main">
+  <p:tag name="OUTPUTDPI" val="1200"/>
+  <p:tag name="ORIGINALHEIGHT" val="113,9857"/>
+  <p:tag name="ORIGINALWIDTH" val="979,3776"/>
+  <p:tag name="LATEXADDIN" val="\documentclass{article}&#10;\usepackage{amsmath}&#10;\usepackage{color}&#10;\pagestyle{empty}&#10;\begin{document}&#10;%\color{white}&#10;Average Disparity&#10;\end{document}"/>
+  <p:tag name="IGUANATEXSIZE" val="20"/>
+  <p:tag name="IGUANATEXCURSOR" val="131"/>
+  <p:tag name="TRANSPARENCY" val="Wahr"/>
+  <p:tag name="FILENAME" val=""/>
+  <p:tag name="LATEXENGINEID" val="0"/>
+  <p:tag name="TEMPFOLDER" val="c:\temp\"/>
+  <p:tag name="LATEXFORMHEIGHT" val="312"/>
+  <p:tag name="LATEXFORMWIDTH" val="384"/>
+  <p:tag name="LATEXFORMWRAP" val="Wahr"/>
+  <p:tag name="BITMAPVECTOR" val="0"/>
+</p:tagLst>
+</file>
+
+<file path=ppt/tags/tag85.xml><?xml version="1.0" encoding="utf-8"?>
+<p:tagLst xmlns:a="http://schemas.openxmlformats.org/drawingml/2006/main" xmlns:r="http://schemas.openxmlformats.org/officeDocument/2006/relationships" xmlns:p="http://schemas.openxmlformats.org/presentationml/2006/main">
+  <p:tag name="OUTPUTDPI" val="1200"/>
+  <p:tag name="ORIGINALHEIGHT" val="113,9857"/>
+  <p:tag name="ORIGINALWIDTH" val="1460,817"/>
+  <p:tag name="LATEXADDIN" val="\documentclass{article}&#10;\usepackage{amsmath}&#10;\usepackage{color}&#10;\pagestyle{empty}&#10;\begin{document}&#10;%\color{white}&#10;Average Squared Disparity &#10;\end{document}"/>
+  <p:tag name="IGUANATEXSIZE" val="20"/>
+  <p:tag name="IGUANATEXCURSOR" val="129"/>
+  <p:tag name="TRANSPARENCY" val="Wahr"/>
+  <p:tag name="FILENAME" val=""/>
+  <p:tag name="LATEXENGINEID" val="0"/>
+  <p:tag name="TEMPFOLDER" val="c:\temp\"/>
+  <p:tag name="LATEXFORMHEIGHT" val="312"/>
+  <p:tag name="LATEXFORMWIDTH" val="384"/>
+  <p:tag name="LATEXFORMWRAP" val="Wahr"/>
+  <p:tag name="BITMAPVECTOR" val="0"/>
+</p:tagLst>
+</file>
+
+<file path=ppt/tags/tag86.xml><?xml version="1.0" encoding="utf-8"?>
+<p:tagLst xmlns:a="http://schemas.openxmlformats.org/drawingml/2006/main" xmlns:r="http://schemas.openxmlformats.org/officeDocument/2006/relationships" xmlns:p="http://schemas.openxmlformats.org/presentationml/2006/main">
+  <p:tag name="OUTPUTDPI" val="1200"/>
+  <p:tag name="ORIGINALHEIGHT" val="110,9861"/>
+  <p:tag name="ORIGINALWIDTH" val="1008,624"/>
+  <p:tag name="LATEXADDIN" val="\documentclass{article}&#10;\usepackage{amsmath}&#10;\usepackage{color}&#10;\pagestyle{empty}&#10;\begin{document}&#10;%\color{white}&#10;Disparity Variance&#10;\end{document}"/>
+  <p:tag name="IGUANATEXSIZE" val="20"/>
+  <p:tag name="IGUANATEXCURSOR" val="124"/>
+  <p:tag name="TRANSPARENCY" val="Wahr"/>
+  <p:tag name="FILENAME" val=""/>
+  <p:tag name="LATEXENGINEID" val="0"/>
+  <p:tag name="TEMPFOLDER" val="c:\temp\"/>
+  <p:tag name="LATEXFORMHEIGHT" val="312"/>
+  <p:tag name="LATEXFORMWIDTH" val="384"/>
+  <p:tag name="LATEXFORMWRAP" val="Wahr"/>
+  <p:tag name="BITMAPVECTOR" val="0"/>
+</p:tagLst>
+</file>
+
+<file path=ppt/tags/tag87.xml><?xml version="1.0" encoding="utf-8"?>
+<p:tagLst xmlns:a="http://schemas.openxmlformats.org/drawingml/2006/main" xmlns:r="http://schemas.openxmlformats.org/officeDocument/2006/relationships" xmlns:p="http://schemas.openxmlformats.org/presentationml/2006/main">
+  <p:tag name="OUTPUTDPI" val="1200"/>
+  <p:tag name="ORIGINALHEIGHT" val="113,2358"/>
+  <p:tag name="ORIGINALWIDTH" val="1133,108"/>
+  <p:tag name="LATEXADDIN" val="\documentclass{article}&#10;\usepackage{amsmath}&#10;\usepackage{color}&#10;\pagestyle{empty}&#10;\begin{document}&#10;%\color{white}&#10;Disparity Confidence&#10;\end{document}"/>
+  <p:tag name="IGUANATEXSIZE" val="20"/>
+  <p:tag name="IGUANATEXCURSOR" val="124"/>
   <p:tag name="TRANSPARENCY" val="Wahr"/>
   <p:tag name="FILENAME" val=""/>
   <p:tag name="LATEXENGINEID" val="0"/>

</xml_diff>

<commit_message>
windows: stereo camera img
</commit_message>
<xml_diff>
--- a/windows/masters_thesis_imgs.pptx
+++ b/windows/masters_thesis_imgs.pptx
@@ -14,6 +14,7 @@
     <p:sldId id="262" r:id="rId8"/>
     <p:sldId id="263" r:id="rId9"/>
     <p:sldId id="264" r:id="rId10"/>
+    <p:sldId id="265" r:id="rId11"/>
   </p:sldIdLst>
   <p:sldSz cx="12192000" cy="6858000"/>
   <p:notesSz cx="6858000" cy="9144000"/>
@@ -280,7 +281,7 @@
           <a:p>
             <a:fld id="{E9193408-0E9E-4716-B232-5E8342DA9E48}" type="datetimeFigureOut">
               <a:rPr lang="en-GB" smtClean="0"/>
-              <a:t>12/06/2019</a:t>
+              <a:t>18/06/2019</a:t>
             </a:fld>
             <a:endParaRPr lang="en-GB"/>
           </a:p>
@@ -480,7 +481,7 @@
           <a:p>
             <a:fld id="{E9193408-0E9E-4716-B232-5E8342DA9E48}" type="datetimeFigureOut">
               <a:rPr lang="en-GB" smtClean="0"/>
-              <a:t>12/06/2019</a:t>
+              <a:t>18/06/2019</a:t>
             </a:fld>
             <a:endParaRPr lang="en-GB"/>
           </a:p>
@@ -690,7 +691,7 @@
           <a:p>
             <a:fld id="{E9193408-0E9E-4716-B232-5E8342DA9E48}" type="datetimeFigureOut">
               <a:rPr lang="en-GB" smtClean="0"/>
-              <a:t>12/06/2019</a:t>
+              <a:t>18/06/2019</a:t>
             </a:fld>
             <a:endParaRPr lang="en-GB"/>
           </a:p>
@@ -890,7 +891,7 @@
           <a:p>
             <a:fld id="{E9193408-0E9E-4716-B232-5E8342DA9E48}" type="datetimeFigureOut">
               <a:rPr lang="en-GB" smtClean="0"/>
-              <a:t>12/06/2019</a:t>
+              <a:t>18/06/2019</a:t>
             </a:fld>
             <a:endParaRPr lang="en-GB"/>
           </a:p>
@@ -1166,7 +1167,7 @@
           <a:p>
             <a:fld id="{E9193408-0E9E-4716-B232-5E8342DA9E48}" type="datetimeFigureOut">
               <a:rPr lang="en-GB" smtClean="0"/>
-              <a:t>12/06/2019</a:t>
+              <a:t>18/06/2019</a:t>
             </a:fld>
             <a:endParaRPr lang="en-GB"/>
           </a:p>
@@ -1434,7 +1435,7 @@
           <a:p>
             <a:fld id="{E9193408-0E9E-4716-B232-5E8342DA9E48}" type="datetimeFigureOut">
               <a:rPr lang="en-GB" smtClean="0"/>
-              <a:t>12/06/2019</a:t>
+              <a:t>18/06/2019</a:t>
             </a:fld>
             <a:endParaRPr lang="en-GB"/>
           </a:p>
@@ -1849,7 +1850,7 @@
           <a:p>
             <a:fld id="{E9193408-0E9E-4716-B232-5E8342DA9E48}" type="datetimeFigureOut">
               <a:rPr lang="en-GB" smtClean="0"/>
-              <a:t>12/06/2019</a:t>
+              <a:t>18/06/2019</a:t>
             </a:fld>
             <a:endParaRPr lang="en-GB"/>
           </a:p>
@@ -1991,7 +1992,7 @@
           <a:p>
             <a:fld id="{E9193408-0E9E-4716-B232-5E8342DA9E48}" type="datetimeFigureOut">
               <a:rPr lang="en-GB" smtClean="0"/>
-              <a:t>12/06/2019</a:t>
+              <a:t>18/06/2019</a:t>
             </a:fld>
             <a:endParaRPr lang="en-GB"/>
           </a:p>
@@ -2104,7 +2105,7 @@
           <a:p>
             <a:fld id="{E9193408-0E9E-4716-B232-5E8342DA9E48}" type="datetimeFigureOut">
               <a:rPr lang="en-GB" smtClean="0"/>
-              <a:t>12/06/2019</a:t>
+              <a:t>18/06/2019</a:t>
             </a:fld>
             <a:endParaRPr lang="en-GB"/>
           </a:p>
@@ -2417,7 +2418,7 @@
           <a:p>
             <a:fld id="{E9193408-0E9E-4716-B232-5E8342DA9E48}" type="datetimeFigureOut">
               <a:rPr lang="en-GB" smtClean="0"/>
-              <a:t>12/06/2019</a:t>
+              <a:t>18/06/2019</a:t>
             </a:fld>
             <a:endParaRPr lang="en-GB"/>
           </a:p>
@@ -2706,7 +2707,7 @@
           <a:p>
             <a:fld id="{E9193408-0E9E-4716-B232-5E8342DA9E48}" type="datetimeFigureOut">
               <a:rPr lang="en-GB" smtClean="0"/>
-              <a:t>12/06/2019</a:t>
+              <a:t>18/06/2019</a:t>
             </a:fld>
             <a:endParaRPr lang="en-GB"/>
           </a:p>
@@ -2949,7 +2950,7 @@
           <a:p>
             <a:fld id="{E9193408-0E9E-4716-B232-5E8342DA9E48}" type="datetimeFigureOut">
               <a:rPr lang="en-GB" smtClean="0"/>
-              <a:t>12/06/2019</a:t>
+              <a:t>18/06/2019</a:t>
             </a:fld>
             <a:endParaRPr lang="en-GB"/>
           </a:p>
@@ -5939,6 +5940,72 @@
     <p:extLst>
       <p:ext uri="{BB962C8B-B14F-4D97-AF65-F5344CB8AC3E}">
         <p14:creationId xmlns:p14="http://schemas.microsoft.com/office/powerpoint/2010/main" val="3139634709"/>
+      </p:ext>
+    </p:extLst>
+  </p:cSld>
+  <p:clrMapOvr>
+    <a:masterClrMapping/>
+  </p:clrMapOvr>
+</p:sld>
+</file>
+
+<file path=ppt/slides/slide10.xml><?xml version="1.0" encoding="utf-8"?>
+<p:sld xmlns:a="http://schemas.openxmlformats.org/drawingml/2006/main" xmlns:r="http://schemas.openxmlformats.org/officeDocument/2006/relationships" xmlns:p="http://schemas.openxmlformats.org/presentationml/2006/main">
+  <p:cSld>
+    <p:spTree>
+      <p:nvGrpSpPr>
+        <p:cNvPr id="1" name=""/>
+        <p:cNvGrpSpPr/>
+        <p:nvPr/>
+      </p:nvGrpSpPr>
+      <p:grpSpPr>
+        <a:xfrm>
+          <a:off x="0" y="0"/>
+          <a:ext cx="0" cy="0"/>
+          <a:chOff x="0" y="0"/>
+          <a:chExt cx="0" cy="0"/>
+        </a:xfrm>
+      </p:grpSpPr>
+      <p:sp>
+        <p:nvSpPr>
+          <p:cNvPr id="4" name="Textfeld 3">
+            <a:extLst>
+              <a:ext uri="{FF2B5EF4-FFF2-40B4-BE49-F238E27FC236}">
+                <a16:creationId xmlns:a16="http://schemas.microsoft.com/office/drawing/2014/main" id="{096AD078-A7C5-4D47-97E2-8A1E5033A962}"/>
+              </a:ext>
+            </a:extLst>
+          </p:cNvPr>
+          <p:cNvSpPr txBox="1"/>
+          <p:nvPr/>
+        </p:nvSpPr>
+        <p:spPr>
+          <a:xfrm>
+            <a:off x="76199" y="66675"/>
+            <a:ext cx="2088017" cy="369332"/>
+          </a:xfrm>
+          <a:prstGeom prst="rect">
+            <a:avLst/>
+          </a:prstGeom>
+          <a:noFill/>
+        </p:spPr>
+        <p:txBody>
+          <a:bodyPr wrap="square" rtlCol="0">
+            <a:spAutoFit/>
+          </a:bodyPr>
+          <a:lstStyle/>
+          <a:p>
+            <a:r>
+              <a:rPr lang="de-DE" dirty="0"/>
+              <a:t>Image Processing</a:t>
+            </a:r>
+            <a:endParaRPr lang="en-GB" dirty="0"/>
+          </a:p>
+        </p:txBody>
+      </p:sp>
+    </p:spTree>
+    <p:extLst>
+      <p:ext uri="{BB962C8B-B14F-4D97-AF65-F5344CB8AC3E}">
+        <p14:creationId xmlns:p14="http://schemas.microsoft.com/office/powerpoint/2010/main" val="542058477"/>
       </p:ext>
     </p:extLst>
   </p:cSld>

</xml_diff>

<commit_message>
windows: stereo cam new
</commit_message>
<xml_diff>
--- a/windows/masters_thesis_imgs.pptx
+++ b/windows/masters_thesis_imgs.pptx
@@ -3594,7 +3594,7 @@
               <a:lstStyle/>
               <a:p>
                 <a:pPr algn="ctr"/>
-                <a:endParaRPr lang="en-GB">
+                <a:endParaRPr lang="en-GB" dirty="0">
                   <a:solidFill>
                     <a:schemeClr val="tx1"/>
                   </a:solidFill>
@@ -3652,7 +3652,7 @@
               <a:lstStyle/>
               <a:p>
                 <a:pPr algn="ctr"/>
-                <a:endParaRPr lang="en-GB">
+                <a:endParaRPr lang="en-GB" dirty="0">
                   <a:solidFill>
                     <a:schemeClr val="tx1"/>
                   </a:solidFill>
@@ -3798,7 +3798,7 @@
               <a:lstStyle/>
               <a:p>
                 <a:pPr algn="ctr"/>
-                <a:endParaRPr lang="en-GB">
+                <a:endParaRPr lang="en-GB" dirty="0">
                   <a:solidFill>
                     <a:schemeClr val="tx1"/>
                   </a:solidFill>
@@ -4019,7 +4019,7 @@
             <a:lstStyle/>
             <a:p>
               <a:pPr algn="ctr"/>
-              <a:endParaRPr lang="en-GB"/>
+              <a:endParaRPr lang="en-GB" dirty="0"/>
             </a:p>
           </p:txBody>
         </p:sp>
@@ -4091,7 +4091,7 @@
               <a:lstStyle/>
               <a:p>
                 <a:pPr algn="ctr"/>
-                <a:endParaRPr lang="en-GB"/>
+                <a:endParaRPr lang="en-GB" dirty="0"/>
               </a:p>
             </p:txBody>
           </p:sp>
@@ -4143,7 +4143,7 @@
               <a:lstStyle/>
               <a:p>
                 <a:pPr algn="ctr"/>
-                <a:endParaRPr lang="en-GB"/>
+                <a:endParaRPr lang="en-GB" dirty="0"/>
               </a:p>
             </p:txBody>
           </p:sp>
@@ -4195,7 +4195,7 @@
               <a:lstStyle/>
               <a:p>
                 <a:pPr algn="ctr"/>
-                <a:endParaRPr lang="en-GB"/>
+                <a:endParaRPr lang="en-GB" dirty="0"/>
               </a:p>
             </p:txBody>
           </p:sp>
@@ -4248,7 +4248,7 @@
             <a:lstStyle/>
             <a:p>
               <a:pPr algn="ctr"/>
-              <a:endParaRPr lang="en-GB"/>
+              <a:endParaRPr lang="en-GB" dirty="0"/>
             </a:p>
           </p:txBody>
         </p:sp>
@@ -4300,7 +4300,7 @@
             <a:lstStyle/>
             <a:p>
               <a:pPr algn="ctr"/>
-              <a:endParaRPr lang="en-GB"/>
+              <a:endParaRPr lang="en-GB" dirty="0"/>
             </a:p>
           </p:txBody>
         </p:sp>
@@ -4372,7 +4372,7 @@
               <a:lstStyle/>
               <a:p>
                 <a:pPr algn="ctr"/>
-                <a:endParaRPr lang="en-GB"/>
+                <a:endParaRPr lang="en-GB" dirty="0"/>
               </a:p>
             </p:txBody>
           </p:sp>
@@ -4424,7 +4424,7 @@
               <a:lstStyle/>
               <a:p>
                 <a:pPr algn="ctr"/>
-                <a:endParaRPr lang="en-GB"/>
+                <a:endParaRPr lang="en-GB" dirty="0"/>
               </a:p>
             </p:txBody>
           </p:sp>
@@ -4477,7 +4477,7 @@
             <a:lstStyle/>
             <a:p>
               <a:pPr algn="ctr"/>
-              <a:endParaRPr lang="en-GB"/>
+              <a:endParaRPr lang="en-GB" dirty="0"/>
             </a:p>
           </p:txBody>
         </p:sp>
@@ -4529,7 +4529,7 @@
             <a:lstStyle/>
             <a:p>
               <a:pPr algn="ctr"/>
-              <a:endParaRPr lang="en-GB"/>
+              <a:endParaRPr lang="en-GB" dirty="0"/>
             </a:p>
           </p:txBody>
         </p:sp>
@@ -4761,7 +4761,7 @@
               <a:lstStyle/>
               <a:p>
                 <a:pPr algn="ctr"/>
-                <a:endParaRPr lang="en-GB"/>
+                <a:endParaRPr lang="en-GB" dirty="0"/>
               </a:p>
             </p:txBody>
           </p:sp>
@@ -4813,7 +4813,7 @@
               <a:lstStyle/>
               <a:p>
                 <a:pPr algn="ctr"/>
-                <a:endParaRPr lang="en-GB"/>
+                <a:endParaRPr lang="en-GB" dirty="0"/>
               </a:p>
             </p:txBody>
           </p:sp>
@@ -4865,7 +4865,7 @@
               <a:lstStyle/>
               <a:p>
                 <a:pPr algn="ctr"/>
-                <a:endParaRPr lang="en-GB"/>
+                <a:endParaRPr lang="en-GB" dirty="0"/>
               </a:p>
             </p:txBody>
           </p:sp>
@@ -4938,7 +4938,7 @@
               <a:lstStyle/>
               <a:p>
                 <a:pPr algn="ctr"/>
-                <a:endParaRPr lang="en-GB"/>
+                <a:endParaRPr lang="en-GB" dirty="0"/>
               </a:p>
             </p:txBody>
           </p:sp>
@@ -4990,7 +4990,7 @@
               <a:lstStyle/>
               <a:p>
                 <a:pPr algn="ctr"/>
-                <a:endParaRPr lang="en-GB"/>
+                <a:endParaRPr lang="en-GB" dirty="0"/>
               </a:p>
             </p:txBody>
           </p:sp>
@@ -5559,7 +5559,7 @@
             <a:lstStyle/>
             <a:p>
               <a:pPr algn="ctr"/>
-              <a:endParaRPr lang="en-GB">
+              <a:endParaRPr lang="en-GB" dirty="0">
                 <a:solidFill>
                   <a:schemeClr val="tx1"/>
                 </a:solidFill>
@@ -5617,7 +5617,7 @@
             <a:lstStyle/>
             <a:p>
               <a:pPr algn="ctr"/>
-              <a:endParaRPr lang="en-GB">
+              <a:endParaRPr lang="en-GB" dirty="0">
                 <a:solidFill>
                   <a:schemeClr val="tx1"/>
                 </a:solidFill>
@@ -5763,7 +5763,7 @@
             <a:lstStyle/>
             <a:p>
               <a:pPr algn="ctr"/>
-              <a:endParaRPr lang="en-GB">
+              <a:endParaRPr lang="en-GB" dirty="0">
                 <a:solidFill>
                   <a:schemeClr val="tx1"/>
                 </a:solidFill>
@@ -6002,6 +6002,1446 @@
           </a:p>
         </p:txBody>
       </p:sp>
+      <p:grpSp>
+        <p:nvGrpSpPr>
+          <p:cNvPr id="50" name="Gruppieren 49">
+            <a:extLst>
+              <a:ext uri="{FF2B5EF4-FFF2-40B4-BE49-F238E27FC236}">
+                <a16:creationId xmlns:a16="http://schemas.microsoft.com/office/drawing/2014/main" id="{234E240E-EE18-4707-A6AB-3D111E71612F}"/>
+              </a:ext>
+            </a:extLst>
+          </p:cNvPr>
+          <p:cNvGrpSpPr/>
+          <p:nvPr/>
+        </p:nvGrpSpPr>
+        <p:grpSpPr>
+          <a:xfrm>
+            <a:off x="2215327" y="2879837"/>
+            <a:ext cx="3162757" cy="1756962"/>
+            <a:chOff x="569407" y="2239757"/>
+            <a:chExt cx="3162757" cy="1756962"/>
+          </a:xfrm>
+        </p:grpSpPr>
+        <p:grpSp>
+          <p:nvGrpSpPr>
+            <p:cNvPr id="15" name="Gruppieren 14">
+              <a:extLst>
+                <a:ext uri="{FF2B5EF4-FFF2-40B4-BE49-F238E27FC236}">
+                  <a16:creationId xmlns:a16="http://schemas.microsoft.com/office/drawing/2014/main" id="{8A8624F9-9698-4579-8C59-E4E204452C5A}"/>
+                </a:ext>
+              </a:extLst>
+            </p:cNvPr>
+            <p:cNvGrpSpPr/>
+            <p:nvPr/>
+          </p:nvGrpSpPr>
+          <p:grpSpPr>
+            <a:xfrm>
+              <a:off x="569407" y="3805599"/>
+              <a:ext cx="221167" cy="191120"/>
+              <a:chOff x="2655383" y="3237880"/>
+              <a:chExt cx="221167" cy="191120"/>
+            </a:xfrm>
+          </p:grpSpPr>
+          <p:cxnSp>
+            <p:nvCxnSpPr>
+              <p:cNvPr id="8" name="Gerader Verbinder 7">
+                <a:extLst>
+                  <a:ext uri="{FF2B5EF4-FFF2-40B4-BE49-F238E27FC236}">
+                    <a16:creationId xmlns:a16="http://schemas.microsoft.com/office/drawing/2014/main" id="{510D90FB-E68B-4918-9234-FCBEA47A6C09}"/>
+                  </a:ext>
+                </a:extLst>
+              </p:cNvPr>
+              <p:cNvCxnSpPr>
+                <a:cxnSpLocks/>
+              </p:cNvCxnSpPr>
+              <p:nvPr/>
+            </p:nvCxnSpPr>
+            <p:spPr>
+              <a:xfrm flipH="1">
+                <a:off x="2655383" y="3237880"/>
+                <a:ext cx="221167" cy="191120"/>
+              </a:xfrm>
+              <a:prstGeom prst="line">
+                <a:avLst/>
+              </a:prstGeom>
+              <a:ln w="25400">
+                <a:solidFill>
+                  <a:schemeClr val="tx1"/>
+                </a:solidFill>
+              </a:ln>
+            </p:spPr>
+            <p:style>
+              <a:lnRef idx="1">
+                <a:schemeClr val="accent1"/>
+              </a:lnRef>
+              <a:fillRef idx="0">
+                <a:schemeClr val="accent1"/>
+              </a:fillRef>
+              <a:effectRef idx="0">
+                <a:schemeClr val="accent1"/>
+              </a:effectRef>
+              <a:fontRef idx="minor">
+                <a:schemeClr val="tx1"/>
+              </a:fontRef>
+            </p:style>
+          </p:cxnSp>
+          <p:cxnSp>
+            <p:nvCxnSpPr>
+              <p:cNvPr id="10" name="Gerader Verbinder 9">
+                <a:extLst>
+                  <a:ext uri="{FF2B5EF4-FFF2-40B4-BE49-F238E27FC236}">
+                    <a16:creationId xmlns:a16="http://schemas.microsoft.com/office/drawing/2014/main" id="{B6033C50-9010-4EEB-9DF6-749772F1B043}"/>
+                  </a:ext>
+                </a:extLst>
+              </p:cNvPr>
+              <p:cNvCxnSpPr>
+                <a:cxnSpLocks/>
+              </p:cNvCxnSpPr>
+              <p:nvPr/>
+            </p:nvCxnSpPr>
+            <p:spPr>
+              <a:xfrm>
+                <a:off x="2655383" y="3237880"/>
+                <a:ext cx="221167" cy="191120"/>
+              </a:xfrm>
+              <a:prstGeom prst="line">
+                <a:avLst/>
+              </a:prstGeom>
+              <a:ln w="25400">
+                <a:solidFill>
+                  <a:schemeClr val="tx1"/>
+                </a:solidFill>
+              </a:ln>
+            </p:spPr>
+            <p:style>
+              <a:lnRef idx="1">
+                <a:schemeClr val="accent1"/>
+              </a:lnRef>
+              <a:fillRef idx="0">
+                <a:schemeClr val="accent1"/>
+              </a:fillRef>
+              <a:effectRef idx="0">
+                <a:schemeClr val="accent1"/>
+              </a:effectRef>
+              <a:fontRef idx="minor">
+                <a:schemeClr val="tx1"/>
+              </a:fontRef>
+            </p:style>
+          </p:cxnSp>
+        </p:grpSp>
+        <p:pic>
+          <p:nvPicPr>
+            <p:cNvPr id="48" name="Grafik 47" descr="Ein Bild, das orange, Himmel enthält.&#10;&#10;Automatisch generierte Beschreibung">
+              <a:extLst>
+                <a:ext uri="{FF2B5EF4-FFF2-40B4-BE49-F238E27FC236}">
+                  <a16:creationId xmlns:a16="http://schemas.microsoft.com/office/drawing/2014/main" id="{DFA28C6E-041A-4FBA-B7F5-A08515AD24F9}"/>
+                </a:ext>
+              </a:extLst>
+            </p:cNvPr>
+            <p:cNvPicPr>
+              <a:picLocks noChangeAspect="1"/>
+            </p:cNvPicPr>
+            <p:nvPr/>
+          </p:nvPicPr>
+          <p:blipFill>
+            <a:blip r:embed="rId12">
+              <a:extLst>
+                <a:ext uri="{28A0092B-C50C-407E-A947-70E740481C1C}">
+                  <a14:useLocalDpi xmlns:a14="http://schemas.microsoft.com/office/drawing/2010/main" val="0"/>
+                </a:ext>
+              </a:extLst>
+            </a:blip>
+            <a:stretch>
+              <a:fillRect/>
+            </a:stretch>
+          </p:blipFill>
+          <p:spPr>
+            <a:xfrm>
+              <a:off x="2052240" y="2239757"/>
+              <a:ext cx="1679924" cy="1259943"/>
+            </a:xfrm>
+            <a:prstGeom prst="rect">
+              <a:avLst/>
+            </a:prstGeom>
+            <a:scene3d>
+              <a:camera prst="orthographicFront">
+                <a:rot lat="1200000" lon="3000000" rev="0"/>
+              </a:camera>
+              <a:lightRig rig="threePt" dir="t"/>
+            </a:scene3d>
+          </p:spPr>
+        </p:pic>
+      </p:grpSp>
+      <p:grpSp>
+        <p:nvGrpSpPr>
+          <p:cNvPr id="91" name="Gruppieren 90">
+            <a:extLst>
+              <a:ext uri="{FF2B5EF4-FFF2-40B4-BE49-F238E27FC236}">
+                <a16:creationId xmlns:a16="http://schemas.microsoft.com/office/drawing/2014/main" id="{C6E8A7EE-EA90-4D9E-A08D-32965F8D7867}"/>
+              </a:ext>
+            </a:extLst>
+          </p:cNvPr>
+          <p:cNvGrpSpPr/>
+          <p:nvPr/>
+        </p:nvGrpSpPr>
+        <p:grpSpPr>
+          <a:xfrm>
+            <a:off x="5141185" y="5606242"/>
+            <a:ext cx="221167" cy="191120"/>
+            <a:chOff x="2655383" y="3237880"/>
+            <a:chExt cx="221167" cy="191120"/>
+          </a:xfrm>
+        </p:grpSpPr>
+        <p:cxnSp>
+          <p:nvCxnSpPr>
+            <p:cNvPr id="97" name="Gerader Verbinder 96">
+              <a:extLst>
+                <a:ext uri="{FF2B5EF4-FFF2-40B4-BE49-F238E27FC236}">
+                  <a16:creationId xmlns:a16="http://schemas.microsoft.com/office/drawing/2014/main" id="{55715199-5258-4A5F-8C07-FD5F751F1187}"/>
+                </a:ext>
+              </a:extLst>
+            </p:cNvPr>
+            <p:cNvCxnSpPr>
+              <a:cxnSpLocks/>
+            </p:cNvCxnSpPr>
+            <p:nvPr/>
+          </p:nvCxnSpPr>
+          <p:spPr>
+            <a:xfrm flipH="1">
+              <a:off x="2655383" y="3237880"/>
+              <a:ext cx="221167" cy="191120"/>
+            </a:xfrm>
+            <a:prstGeom prst="line">
+              <a:avLst/>
+            </a:prstGeom>
+            <a:ln w="25400">
+              <a:solidFill>
+                <a:schemeClr val="tx1"/>
+              </a:solidFill>
+            </a:ln>
+          </p:spPr>
+          <p:style>
+            <a:lnRef idx="1">
+              <a:schemeClr val="accent1"/>
+            </a:lnRef>
+            <a:fillRef idx="0">
+              <a:schemeClr val="accent1"/>
+            </a:fillRef>
+            <a:effectRef idx="0">
+              <a:schemeClr val="accent1"/>
+            </a:effectRef>
+            <a:fontRef idx="minor">
+              <a:schemeClr val="tx1"/>
+            </a:fontRef>
+          </p:style>
+        </p:cxnSp>
+        <p:cxnSp>
+          <p:nvCxnSpPr>
+            <p:cNvPr id="98" name="Gerader Verbinder 97">
+              <a:extLst>
+                <a:ext uri="{FF2B5EF4-FFF2-40B4-BE49-F238E27FC236}">
+                  <a16:creationId xmlns:a16="http://schemas.microsoft.com/office/drawing/2014/main" id="{4C0F7030-861F-4C21-852D-01A904F470BD}"/>
+                </a:ext>
+              </a:extLst>
+            </p:cNvPr>
+            <p:cNvCxnSpPr>
+              <a:cxnSpLocks/>
+            </p:cNvCxnSpPr>
+            <p:nvPr/>
+          </p:nvCxnSpPr>
+          <p:spPr>
+            <a:xfrm>
+              <a:off x="2655383" y="3237880"/>
+              <a:ext cx="221167" cy="191120"/>
+            </a:xfrm>
+            <a:prstGeom prst="line">
+              <a:avLst/>
+            </a:prstGeom>
+            <a:ln w="25400">
+              <a:solidFill>
+                <a:schemeClr val="tx1"/>
+              </a:solidFill>
+            </a:ln>
+          </p:spPr>
+          <p:style>
+            <a:lnRef idx="1">
+              <a:schemeClr val="accent1"/>
+            </a:lnRef>
+            <a:fillRef idx="0">
+              <a:schemeClr val="accent1"/>
+            </a:fillRef>
+            <a:effectRef idx="0">
+              <a:schemeClr val="accent1"/>
+            </a:effectRef>
+            <a:fontRef idx="minor">
+              <a:schemeClr val="tx1"/>
+            </a:fontRef>
+          </p:style>
+        </p:cxnSp>
+      </p:grpSp>
+      <p:grpSp>
+        <p:nvGrpSpPr>
+          <p:cNvPr id="30" name="Gruppieren 29">
+            <a:extLst>
+              <a:ext uri="{FF2B5EF4-FFF2-40B4-BE49-F238E27FC236}">
+                <a16:creationId xmlns:a16="http://schemas.microsoft.com/office/drawing/2014/main" id="{27131192-326D-40A1-8CBD-DA107BC63B6F}"/>
+              </a:ext>
+            </a:extLst>
+          </p:cNvPr>
+          <p:cNvGrpSpPr/>
+          <p:nvPr/>
+        </p:nvGrpSpPr>
+        <p:grpSpPr>
+          <a:xfrm>
+            <a:off x="1163083" y="-578273"/>
+            <a:ext cx="10694889" cy="6912559"/>
+            <a:chOff x="1163083" y="-578273"/>
+            <a:chExt cx="10694889" cy="6912559"/>
+          </a:xfrm>
+        </p:grpSpPr>
+        <p:grpSp>
+          <p:nvGrpSpPr>
+            <p:cNvPr id="18" name="Gruppieren 17">
+              <a:extLst>
+                <a:ext uri="{FF2B5EF4-FFF2-40B4-BE49-F238E27FC236}">
+                  <a16:creationId xmlns:a16="http://schemas.microsoft.com/office/drawing/2014/main" id="{B0703ABB-68C3-4190-8133-4CE0798D4947}"/>
+                </a:ext>
+              </a:extLst>
+            </p:cNvPr>
+            <p:cNvGrpSpPr/>
+            <p:nvPr/>
+          </p:nvGrpSpPr>
+          <p:grpSpPr>
+            <a:xfrm>
+              <a:off x="1163083" y="-578273"/>
+              <a:ext cx="10694889" cy="6912559"/>
+              <a:chOff x="1163083" y="-578273"/>
+              <a:chExt cx="10694889" cy="6912559"/>
+            </a:xfrm>
+          </p:grpSpPr>
+          <p:pic>
+            <p:nvPicPr>
+              <p:cNvPr id="19" name="Grafik 18" descr="Ein Bild, das orange, Himmel enthält.&#10;&#10;Automatisch generierte Beschreibung">
+                <a:extLst>
+                  <a:ext uri="{FF2B5EF4-FFF2-40B4-BE49-F238E27FC236}">
+                    <a16:creationId xmlns:a16="http://schemas.microsoft.com/office/drawing/2014/main" id="{F6D51A8E-FA2E-4AC1-AC94-7129A1B086D6}"/>
+                  </a:ext>
+                </a:extLst>
+              </p:cNvPr>
+              <p:cNvPicPr>
+                <a:picLocks noChangeAspect="1"/>
+              </p:cNvPicPr>
+              <p:nvPr/>
+            </p:nvPicPr>
+            <p:blipFill>
+              <a:blip r:embed="rId12">
+                <a:extLst>
+                  <a:ext uri="{28A0092B-C50C-407E-A947-70E740481C1C}">
+                    <a14:useLocalDpi xmlns:a14="http://schemas.microsoft.com/office/drawing/2010/main" val="0"/>
+                  </a:ext>
+                </a:extLst>
+              </a:blip>
+              <a:stretch>
+                <a:fillRect/>
+              </a:stretch>
+            </p:blipFill>
+            <p:spPr>
+              <a:xfrm>
+                <a:off x="7985661" y="-141985"/>
+                <a:ext cx="3872311" cy="2904233"/>
+              </a:xfrm>
+              <a:prstGeom prst="rect">
+                <a:avLst/>
+              </a:prstGeom>
+              <a:scene3d>
+                <a:camera prst="orthographicFront">
+                  <a:rot lat="1200000" lon="3000000" rev="0"/>
+                </a:camera>
+                <a:lightRig rig="threePt" dir="t"/>
+              </a:scene3d>
+            </p:spPr>
+          </p:pic>
+          <p:cxnSp>
+            <p:nvCxnSpPr>
+              <p:cNvPr id="60" name="Gerader Verbinder 59">
+                <a:extLst>
+                  <a:ext uri="{FF2B5EF4-FFF2-40B4-BE49-F238E27FC236}">
+                    <a16:creationId xmlns:a16="http://schemas.microsoft.com/office/drawing/2014/main" id="{F8F9FBB4-8107-4D18-8590-F51D6D09841A}"/>
+                  </a:ext>
+                </a:extLst>
+              </p:cNvPr>
+              <p:cNvCxnSpPr>
+                <a:cxnSpLocks/>
+              </p:cNvCxnSpPr>
+              <p:nvPr/>
+            </p:nvCxnSpPr>
+            <p:spPr>
+              <a:xfrm flipH="1">
+                <a:off x="2325911" y="1932460"/>
+                <a:ext cx="7665356" cy="2623110"/>
+              </a:xfrm>
+              <a:prstGeom prst="line">
+                <a:avLst/>
+              </a:prstGeom>
+              <a:ln w="25400">
+                <a:solidFill>
+                  <a:schemeClr val="tx1"/>
+                </a:solidFill>
+                <a:prstDash val="solid"/>
+              </a:ln>
+            </p:spPr>
+            <p:style>
+              <a:lnRef idx="1">
+                <a:schemeClr val="accent1"/>
+              </a:lnRef>
+              <a:fillRef idx="0">
+                <a:schemeClr val="accent1"/>
+              </a:fillRef>
+              <a:effectRef idx="0">
+                <a:schemeClr val="accent1"/>
+              </a:effectRef>
+              <a:fontRef idx="minor">
+                <a:schemeClr val="tx1"/>
+              </a:fontRef>
+            </p:style>
+          </p:cxnSp>
+          <p:pic>
+            <p:nvPicPr>
+              <p:cNvPr id="95" name="Grafik 94" descr="Ein Bild, das orange, Himmel enthält.&#10;&#10;Automatisch generierte Beschreibung">
+                <a:extLst>
+                  <a:ext uri="{FF2B5EF4-FFF2-40B4-BE49-F238E27FC236}">
+                    <a16:creationId xmlns:a16="http://schemas.microsoft.com/office/drawing/2014/main" id="{A341A4CE-B60D-4172-8E16-9D40A4981AD4}"/>
+                  </a:ext>
+                </a:extLst>
+              </p:cNvPr>
+              <p:cNvPicPr>
+                <a:picLocks noChangeAspect="1"/>
+              </p:cNvPicPr>
+              <p:nvPr/>
+            </p:nvPicPr>
+            <p:blipFill>
+              <a:blip r:embed="rId12">
+                <a:extLst>
+                  <a:ext uri="{28A0092B-C50C-407E-A947-70E740481C1C}">
+                    <a14:useLocalDpi xmlns:a14="http://schemas.microsoft.com/office/drawing/2010/main" val="0"/>
+                  </a:ext>
+                </a:extLst>
+              </a:blip>
+              <a:stretch>
+                <a:fillRect/>
+              </a:stretch>
+            </p:blipFill>
+            <p:spPr>
+              <a:xfrm>
+                <a:off x="5710268" y="3654981"/>
+                <a:ext cx="1679924" cy="1259943"/>
+              </a:xfrm>
+              <a:prstGeom prst="rect">
+                <a:avLst/>
+              </a:prstGeom>
+              <a:scene3d>
+                <a:camera prst="orthographicFront">
+                  <a:rot lat="1200000" lon="3000000" rev="0"/>
+                </a:camera>
+                <a:lightRig rig="threePt" dir="t"/>
+              </a:scene3d>
+            </p:spPr>
+          </p:pic>
+          <p:cxnSp>
+            <p:nvCxnSpPr>
+              <p:cNvPr id="110" name="Gerader Verbinder 109">
+                <a:extLst>
+                  <a:ext uri="{FF2B5EF4-FFF2-40B4-BE49-F238E27FC236}">
+                    <a16:creationId xmlns:a16="http://schemas.microsoft.com/office/drawing/2014/main" id="{02708BEE-3D79-46AF-A3AF-2E68E2B8D0DD}"/>
+                  </a:ext>
+                </a:extLst>
+              </p:cNvPr>
+              <p:cNvCxnSpPr>
+                <a:cxnSpLocks/>
+              </p:cNvCxnSpPr>
+              <p:nvPr/>
+            </p:nvCxnSpPr>
+            <p:spPr>
+              <a:xfrm flipH="1" flipV="1">
+                <a:off x="3474720" y="3394573"/>
+                <a:ext cx="4225185" cy="1578005"/>
+              </a:xfrm>
+              <a:prstGeom prst="line">
+                <a:avLst/>
+              </a:prstGeom>
+              <a:ln w="25400">
+                <a:solidFill>
+                  <a:schemeClr val="tx1"/>
+                </a:solidFill>
+                <a:prstDash val="solid"/>
+              </a:ln>
+            </p:spPr>
+            <p:style>
+              <a:lnRef idx="1">
+                <a:schemeClr val="accent1"/>
+              </a:lnRef>
+              <a:fillRef idx="0">
+                <a:schemeClr val="accent1"/>
+              </a:fillRef>
+              <a:effectRef idx="0">
+                <a:schemeClr val="accent1"/>
+              </a:effectRef>
+              <a:fontRef idx="minor">
+                <a:schemeClr val="tx1"/>
+              </a:fontRef>
+            </p:style>
+          </p:cxnSp>
+          <p:cxnSp>
+            <p:nvCxnSpPr>
+              <p:cNvPr id="115" name="Gerader Verbinder 114">
+                <a:extLst>
+                  <a:ext uri="{FF2B5EF4-FFF2-40B4-BE49-F238E27FC236}">
+                    <a16:creationId xmlns:a16="http://schemas.microsoft.com/office/drawing/2014/main" id="{89534D19-91A0-4CE1-9412-D10BEB3317DD}"/>
+                  </a:ext>
+                </a:extLst>
+              </p:cNvPr>
+              <p:cNvCxnSpPr>
+                <a:cxnSpLocks/>
+              </p:cNvCxnSpPr>
+              <p:nvPr/>
+            </p:nvCxnSpPr>
+            <p:spPr>
+              <a:xfrm flipH="1">
+                <a:off x="5262187" y="2730970"/>
+                <a:ext cx="2437721" cy="2970832"/>
+              </a:xfrm>
+              <a:prstGeom prst="line">
+                <a:avLst/>
+              </a:prstGeom>
+              <a:ln w="25400">
+                <a:solidFill>
+                  <a:schemeClr val="tx1"/>
+                </a:solidFill>
+                <a:prstDash val="dash"/>
+              </a:ln>
+            </p:spPr>
+            <p:style>
+              <a:lnRef idx="1">
+                <a:schemeClr val="accent1"/>
+              </a:lnRef>
+              <a:fillRef idx="0">
+                <a:schemeClr val="accent1"/>
+              </a:fillRef>
+              <a:effectRef idx="0">
+                <a:schemeClr val="accent1"/>
+              </a:effectRef>
+              <a:fontRef idx="minor">
+                <a:schemeClr val="tx1"/>
+              </a:fontRef>
+            </p:style>
+          </p:cxnSp>
+          <p:cxnSp>
+            <p:nvCxnSpPr>
+              <p:cNvPr id="118" name="Gerader Verbinder 117">
+                <a:extLst>
+                  <a:ext uri="{FF2B5EF4-FFF2-40B4-BE49-F238E27FC236}">
+                    <a16:creationId xmlns:a16="http://schemas.microsoft.com/office/drawing/2014/main" id="{B31F6BB1-2049-4078-9C23-16743C24F4A4}"/>
+                  </a:ext>
+                </a:extLst>
+              </p:cNvPr>
+              <p:cNvCxnSpPr>
+                <a:cxnSpLocks/>
+              </p:cNvCxnSpPr>
+              <p:nvPr/>
+            </p:nvCxnSpPr>
+            <p:spPr>
+              <a:xfrm flipH="1">
+                <a:off x="5262187" y="1932460"/>
+                <a:ext cx="4741739" cy="3744406"/>
+              </a:xfrm>
+              <a:prstGeom prst="line">
+                <a:avLst/>
+              </a:prstGeom>
+              <a:ln w="25400">
+                <a:solidFill>
+                  <a:schemeClr val="tx1"/>
+                </a:solidFill>
+                <a:prstDash val="dash"/>
+              </a:ln>
+            </p:spPr>
+            <p:style>
+              <a:lnRef idx="1">
+                <a:schemeClr val="accent1"/>
+              </a:lnRef>
+              <a:fillRef idx="0">
+                <a:schemeClr val="accent1"/>
+              </a:fillRef>
+              <a:effectRef idx="0">
+                <a:schemeClr val="accent1"/>
+              </a:effectRef>
+              <a:fontRef idx="minor">
+                <a:schemeClr val="tx1"/>
+              </a:fontRef>
+            </p:style>
+          </p:cxnSp>
+          <p:cxnSp>
+            <p:nvCxnSpPr>
+              <p:cNvPr id="121" name="Gerader Verbinder 120">
+                <a:extLst>
+                  <a:ext uri="{FF2B5EF4-FFF2-40B4-BE49-F238E27FC236}">
+                    <a16:creationId xmlns:a16="http://schemas.microsoft.com/office/drawing/2014/main" id="{D9A054D6-1C6A-429A-804B-4DD8B8914460}"/>
+                  </a:ext>
+                </a:extLst>
+              </p:cNvPr>
+              <p:cNvCxnSpPr>
+                <a:cxnSpLocks/>
+              </p:cNvCxnSpPr>
+              <p:nvPr/>
+            </p:nvCxnSpPr>
+            <p:spPr>
+              <a:xfrm flipH="1">
+                <a:off x="5262187" y="3201664"/>
+                <a:ext cx="1089471" cy="2511770"/>
+              </a:xfrm>
+              <a:prstGeom prst="line">
+                <a:avLst/>
+              </a:prstGeom>
+              <a:ln w="25400">
+                <a:solidFill>
+                  <a:schemeClr val="tx1"/>
+                </a:solidFill>
+                <a:prstDash val="dash"/>
+              </a:ln>
+            </p:spPr>
+            <p:style>
+              <a:lnRef idx="1">
+                <a:schemeClr val="accent1"/>
+              </a:lnRef>
+              <a:fillRef idx="0">
+                <a:schemeClr val="accent1"/>
+              </a:fillRef>
+              <a:effectRef idx="0">
+                <a:schemeClr val="accent1"/>
+              </a:effectRef>
+              <a:fontRef idx="minor">
+                <a:schemeClr val="tx1"/>
+              </a:fontRef>
+            </p:style>
+          </p:cxnSp>
+          <p:pic>
+            <p:nvPicPr>
+              <p:cNvPr id="126" name="Grafik 125">
+                <a:extLst>
+                  <a:ext uri="{FF2B5EF4-FFF2-40B4-BE49-F238E27FC236}">
+                    <a16:creationId xmlns:a16="http://schemas.microsoft.com/office/drawing/2014/main" id="{95A10C0E-076D-453C-BAAB-4D7CAF6A26C9}"/>
+                  </a:ext>
+                </a:extLst>
+              </p:cNvPr>
+              <p:cNvPicPr>
+                <a:picLocks noChangeAspect="1"/>
+              </p:cNvPicPr>
+              <p:nvPr>
+                <p:custDataLst>
+                  <p:tags r:id="rId4"/>
+                </p:custDataLst>
+              </p:nvPr>
+            </p:nvPicPr>
+            <p:blipFill>
+              <a:blip r:embed="rId13">
+                <a:extLst>
+                  <a:ext uri="{28A0092B-C50C-407E-A947-70E740481C1C}">
+                    <a14:useLocalDpi xmlns:a14="http://schemas.microsoft.com/office/drawing/2010/main" val="0"/>
+                  </a:ext>
+                </a:extLst>
+              </a:blip>
+              <a:stretch>
+                <a:fillRect/>
+              </a:stretch>
+            </p:blipFill>
+            <p:spPr>
+              <a:xfrm>
+                <a:off x="7845613" y="4836693"/>
+                <a:ext cx="2531180" cy="389462"/>
+              </a:xfrm>
+              <a:prstGeom prst="rect">
+                <a:avLst/>
+              </a:prstGeom>
+            </p:spPr>
+          </p:pic>
+          <p:pic>
+            <p:nvPicPr>
+              <p:cNvPr id="12" name="Grafik 11">
+                <a:extLst>
+                  <a:ext uri="{FF2B5EF4-FFF2-40B4-BE49-F238E27FC236}">
+                    <a16:creationId xmlns:a16="http://schemas.microsoft.com/office/drawing/2014/main" id="{4F055771-8ABA-42EF-A871-EA189398900F}"/>
+                  </a:ext>
+                </a:extLst>
+              </p:cNvPr>
+              <p:cNvPicPr>
+                <a:picLocks noChangeAspect="1"/>
+              </p:cNvPicPr>
+              <p:nvPr>
+                <p:custDataLst>
+                  <p:tags r:id="rId5"/>
+                </p:custDataLst>
+              </p:nvPr>
+            </p:nvPicPr>
+            <p:blipFill>
+              <a:blip r:embed="rId14">
+                <a:extLst>
+                  <a:ext uri="{28A0092B-C50C-407E-A947-70E740481C1C}">
+                    <a14:useLocalDpi xmlns:a14="http://schemas.microsoft.com/office/drawing/2010/main" val="0"/>
+                  </a:ext>
+                </a:extLst>
+              </a:blip>
+              <a:stretch>
+                <a:fillRect/>
+              </a:stretch>
+            </p:blipFill>
+            <p:spPr>
+              <a:xfrm>
+                <a:off x="1163083" y="4763253"/>
+                <a:ext cx="2325653" cy="323903"/>
+              </a:xfrm>
+              <a:prstGeom prst="rect">
+                <a:avLst/>
+              </a:prstGeom>
+            </p:spPr>
+          </p:pic>
+          <p:pic>
+            <p:nvPicPr>
+              <p:cNvPr id="17" name="Grafik 16">
+                <a:extLst>
+                  <a:ext uri="{FF2B5EF4-FFF2-40B4-BE49-F238E27FC236}">
+                    <a16:creationId xmlns:a16="http://schemas.microsoft.com/office/drawing/2014/main" id="{B2903039-7CEA-427D-841E-74D74695497F}"/>
+                  </a:ext>
+                </a:extLst>
+              </p:cNvPr>
+              <p:cNvPicPr>
+                <a:picLocks noChangeAspect="1"/>
+              </p:cNvPicPr>
+              <p:nvPr>
+                <p:custDataLst>
+                  <p:tags r:id="rId6"/>
+                </p:custDataLst>
+              </p:nvPr>
+            </p:nvPicPr>
+            <p:blipFill>
+              <a:blip r:embed="rId15">
+                <a:extLst>
+                  <a:ext uri="{28A0092B-C50C-407E-A947-70E740481C1C}">
+                    <a14:useLocalDpi xmlns:a14="http://schemas.microsoft.com/office/drawing/2010/main" val="0"/>
+                  </a:ext>
+                </a:extLst>
+              </a:blip>
+              <a:stretch>
+                <a:fillRect/>
+              </a:stretch>
+            </p:blipFill>
+            <p:spPr>
+              <a:xfrm>
+                <a:off x="3954992" y="5926759"/>
+                <a:ext cx="2614389" cy="407527"/>
+              </a:xfrm>
+              <a:prstGeom prst="rect">
+                <a:avLst/>
+              </a:prstGeom>
+            </p:spPr>
+          </p:pic>
+          <p:pic>
+            <p:nvPicPr>
+              <p:cNvPr id="135" name="Grafik 134">
+                <a:extLst>
+                  <a:ext uri="{FF2B5EF4-FFF2-40B4-BE49-F238E27FC236}">
+                    <a16:creationId xmlns:a16="http://schemas.microsoft.com/office/drawing/2014/main" id="{C3D820E6-0587-4CA1-A444-48A3936A8CCF}"/>
+                  </a:ext>
+                </a:extLst>
+              </p:cNvPr>
+              <p:cNvPicPr>
+                <a:picLocks noChangeAspect="1"/>
+              </p:cNvPicPr>
+              <p:nvPr>
+                <p:custDataLst>
+                  <p:tags r:id="rId7"/>
+                </p:custDataLst>
+              </p:nvPr>
+            </p:nvPicPr>
+            <p:blipFill>
+              <a:blip r:embed="rId16">
+                <a:extLst>
+                  <a:ext uri="{28A0092B-C50C-407E-A947-70E740481C1C}">
+                    <a14:useLocalDpi xmlns:a14="http://schemas.microsoft.com/office/drawing/2010/main" val="0"/>
+                  </a:ext>
+                </a:extLst>
+              </a:blip>
+              <a:stretch>
+                <a:fillRect/>
+              </a:stretch>
+            </p:blipFill>
+            <p:spPr>
+              <a:xfrm>
+                <a:off x="10376793" y="-578273"/>
+                <a:ext cx="1225786" cy="404209"/>
+              </a:xfrm>
+              <a:prstGeom prst="rect">
+                <a:avLst/>
+              </a:prstGeom>
+            </p:spPr>
+          </p:pic>
+          <p:pic>
+            <p:nvPicPr>
+              <p:cNvPr id="138" name="Grafik 137">
+                <a:extLst>
+                  <a:ext uri="{FF2B5EF4-FFF2-40B4-BE49-F238E27FC236}">
+                    <a16:creationId xmlns:a16="http://schemas.microsoft.com/office/drawing/2014/main" id="{2D79FC15-8486-461A-A31D-1DF530639632}"/>
+                  </a:ext>
+                </a:extLst>
+              </p:cNvPr>
+              <p:cNvPicPr>
+                <a:picLocks noChangeAspect="1"/>
+              </p:cNvPicPr>
+              <p:nvPr>
+                <p:custDataLst>
+                  <p:tags r:id="rId8"/>
+                </p:custDataLst>
+              </p:nvPr>
+            </p:nvPicPr>
+            <p:blipFill>
+              <a:blip r:embed="rId17">
+                <a:extLst>
+                  <a:ext uri="{28A0092B-C50C-407E-A947-70E740481C1C}">
+                    <a14:useLocalDpi xmlns:a14="http://schemas.microsoft.com/office/drawing/2010/main" val="0"/>
+                  </a:ext>
+                </a:extLst>
+              </a:blip>
+              <a:stretch>
+                <a:fillRect/>
+              </a:stretch>
+            </p:blipFill>
+            <p:spPr>
+              <a:xfrm>
+                <a:off x="3758609" y="2163868"/>
+                <a:ext cx="1104614" cy="397005"/>
+              </a:xfrm>
+              <a:prstGeom prst="rect">
+                <a:avLst/>
+              </a:prstGeom>
+            </p:spPr>
+          </p:pic>
+          <p:cxnSp>
+            <p:nvCxnSpPr>
+              <p:cNvPr id="166" name="Gerade Verbindung mit Pfeil 165">
+                <a:extLst>
+                  <a:ext uri="{FF2B5EF4-FFF2-40B4-BE49-F238E27FC236}">
+                    <a16:creationId xmlns:a16="http://schemas.microsoft.com/office/drawing/2014/main" id="{7B47F6A9-677D-4E0B-AAA6-8CF15E83609D}"/>
+                  </a:ext>
+                </a:extLst>
+              </p:cNvPr>
+              <p:cNvCxnSpPr>
+                <a:cxnSpLocks/>
+              </p:cNvCxnSpPr>
+              <p:nvPr/>
+            </p:nvCxnSpPr>
+            <p:spPr>
+              <a:xfrm flipH="1">
+                <a:off x="6464331" y="1911494"/>
+                <a:ext cx="887855" cy="1091449"/>
+              </a:xfrm>
+              <a:prstGeom prst="straightConnector1">
+                <a:avLst/>
+              </a:prstGeom>
+              <a:ln w="25400">
+                <a:solidFill>
+                  <a:schemeClr val="tx1"/>
+                </a:solidFill>
+                <a:tailEnd type="triangle"/>
+              </a:ln>
+            </p:spPr>
+            <p:style>
+              <a:lnRef idx="1">
+                <a:schemeClr val="accent1"/>
+              </a:lnRef>
+              <a:fillRef idx="0">
+                <a:schemeClr val="accent1"/>
+              </a:fillRef>
+              <a:effectRef idx="0">
+                <a:schemeClr val="accent1"/>
+              </a:effectRef>
+              <a:fontRef idx="minor">
+                <a:schemeClr val="tx1"/>
+              </a:fontRef>
+            </p:style>
+          </p:cxnSp>
+          <p:cxnSp>
+            <p:nvCxnSpPr>
+              <p:cNvPr id="170" name="Gerade Verbindung mit Pfeil 169">
+                <a:extLst>
+                  <a:ext uri="{FF2B5EF4-FFF2-40B4-BE49-F238E27FC236}">
+                    <a16:creationId xmlns:a16="http://schemas.microsoft.com/office/drawing/2014/main" id="{68F56966-186F-449C-8B18-E437FF900DBB}"/>
+                  </a:ext>
+                </a:extLst>
+              </p:cNvPr>
+              <p:cNvCxnSpPr>
+                <a:cxnSpLocks/>
+              </p:cNvCxnSpPr>
+              <p:nvPr/>
+            </p:nvCxnSpPr>
+            <p:spPr>
+              <a:xfrm>
+                <a:off x="7352186" y="1911494"/>
+                <a:ext cx="347719" cy="685466"/>
+              </a:xfrm>
+              <a:prstGeom prst="straightConnector1">
+                <a:avLst/>
+              </a:prstGeom>
+              <a:ln w="25400">
+                <a:solidFill>
+                  <a:schemeClr val="tx1"/>
+                </a:solidFill>
+                <a:tailEnd type="triangle"/>
+              </a:ln>
+            </p:spPr>
+            <p:style>
+              <a:lnRef idx="1">
+                <a:schemeClr val="accent1"/>
+              </a:lnRef>
+              <a:fillRef idx="0">
+                <a:schemeClr val="accent1"/>
+              </a:fillRef>
+              <a:effectRef idx="0">
+                <a:schemeClr val="accent1"/>
+              </a:effectRef>
+              <a:fontRef idx="minor">
+                <a:schemeClr val="tx1"/>
+              </a:fontRef>
+            </p:style>
+          </p:cxnSp>
+          <p:cxnSp>
+            <p:nvCxnSpPr>
+              <p:cNvPr id="176" name="Gerade Verbindung mit Pfeil 175">
+                <a:extLst>
+                  <a:ext uri="{FF2B5EF4-FFF2-40B4-BE49-F238E27FC236}">
+                    <a16:creationId xmlns:a16="http://schemas.microsoft.com/office/drawing/2014/main" id="{B6304F45-E607-4FA2-9F8C-486013899ABA}"/>
+                  </a:ext>
+                </a:extLst>
+              </p:cNvPr>
+              <p:cNvCxnSpPr>
+                <a:cxnSpLocks/>
+              </p:cNvCxnSpPr>
+              <p:nvPr/>
+            </p:nvCxnSpPr>
+            <p:spPr>
+              <a:xfrm flipV="1">
+                <a:off x="7352186" y="1874806"/>
+                <a:ext cx="2431894" cy="36688"/>
+              </a:xfrm>
+              <a:prstGeom prst="straightConnector1">
+                <a:avLst/>
+              </a:prstGeom>
+              <a:ln w="25400">
+                <a:solidFill>
+                  <a:schemeClr val="tx1"/>
+                </a:solidFill>
+                <a:tailEnd type="triangle"/>
+              </a:ln>
+            </p:spPr>
+            <p:style>
+              <a:lnRef idx="1">
+                <a:schemeClr val="accent1"/>
+              </a:lnRef>
+              <a:fillRef idx="0">
+                <a:schemeClr val="accent1"/>
+              </a:fillRef>
+              <a:effectRef idx="0">
+                <a:schemeClr val="accent1"/>
+              </a:effectRef>
+              <a:fontRef idx="minor">
+                <a:schemeClr val="tx1"/>
+              </a:fontRef>
+            </p:style>
+          </p:cxnSp>
+          <p:cxnSp>
+            <p:nvCxnSpPr>
+              <p:cNvPr id="179" name="Gerade Verbindung mit Pfeil 178">
+                <a:extLst>
+                  <a:ext uri="{FF2B5EF4-FFF2-40B4-BE49-F238E27FC236}">
+                    <a16:creationId xmlns:a16="http://schemas.microsoft.com/office/drawing/2014/main" id="{88C61D6A-C857-401A-B3CE-2BE5F48AF910}"/>
+                  </a:ext>
+                </a:extLst>
+              </p:cNvPr>
+              <p:cNvCxnSpPr>
+                <a:cxnSpLocks/>
+              </p:cNvCxnSpPr>
+              <p:nvPr/>
+            </p:nvCxnSpPr>
+            <p:spPr>
+              <a:xfrm flipH="1" flipV="1">
+                <a:off x="5991567" y="4452191"/>
+                <a:ext cx="912194" cy="1025104"/>
+              </a:xfrm>
+              <a:prstGeom prst="straightConnector1">
+                <a:avLst/>
+              </a:prstGeom>
+              <a:ln w="25400">
+                <a:solidFill>
+                  <a:schemeClr val="tx1"/>
+                </a:solidFill>
+                <a:tailEnd type="triangle"/>
+              </a:ln>
+            </p:spPr>
+            <p:style>
+              <a:lnRef idx="1">
+                <a:schemeClr val="accent1"/>
+              </a:lnRef>
+              <a:fillRef idx="0">
+                <a:schemeClr val="accent1"/>
+              </a:fillRef>
+              <a:effectRef idx="0">
+                <a:schemeClr val="accent1"/>
+              </a:effectRef>
+              <a:fontRef idx="minor">
+                <a:schemeClr val="tx1"/>
+              </a:fontRef>
+            </p:style>
+          </p:cxnSp>
+          <p:cxnSp>
+            <p:nvCxnSpPr>
+              <p:cNvPr id="182" name="Gerade Verbindung mit Pfeil 181">
+                <a:extLst>
+                  <a:ext uri="{FF2B5EF4-FFF2-40B4-BE49-F238E27FC236}">
+                    <a16:creationId xmlns:a16="http://schemas.microsoft.com/office/drawing/2014/main" id="{17DE96F8-E245-4120-8B80-D1DC68CAAD6E}"/>
+                  </a:ext>
+                </a:extLst>
+              </p:cNvPr>
+              <p:cNvCxnSpPr>
+                <a:cxnSpLocks/>
+              </p:cNvCxnSpPr>
+              <p:nvPr/>
+            </p:nvCxnSpPr>
+            <p:spPr>
+              <a:xfrm flipH="1" flipV="1">
+                <a:off x="6683842" y="4710440"/>
+                <a:ext cx="219919" cy="766855"/>
+              </a:xfrm>
+              <a:prstGeom prst="straightConnector1">
+                <a:avLst/>
+              </a:prstGeom>
+              <a:ln w="25400">
+                <a:solidFill>
+                  <a:schemeClr val="tx1"/>
+                </a:solidFill>
+                <a:tailEnd type="triangle"/>
+              </a:ln>
+            </p:spPr>
+            <p:style>
+              <a:lnRef idx="1">
+                <a:schemeClr val="accent1"/>
+              </a:lnRef>
+              <a:fillRef idx="0">
+                <a:schemeClr val="accent1"/>
+              </a:fillRef>
+              <a:effectRef idx="0">
+                <a:schemeClr val="accent1"/>
+              </a:effectRef>
+              <a:fontRef idx="minor">
+                <a:schemeClr val="tx1"/>
+              </a:fontRef>
+            </p:style>
+          </p:cxnSp>
+          <p:cxnSp>
+            <p:nvCxnSpPr>
+              <p:cNvPr id="185" name="Gerade Verbindung mit Pfeil 184">
+                <a:extLst>
+                  <a:ext uri="{FF2B5EF4-FFF2-40B4-BE49-F238E27FC236}">
+                    <a16:creationId xmlns:a16="http://schemas.microsoft.com/office/drawing/2014/main" id="{D1E26E59-4A96-4440-9908-4103477A58EC}"/>
+                  </a:ext>
+                </a:extLst>
+              </p:cNvPr>
+              <p:cNvCxnSpPr>
+                <a:cxnSpLocks/>
+              </p:cNvCxnSpPr>
+              <p:nvPr/>
+            </p:nvCxnSpPr>
+            <p:spPr>
+              <a:xfrm flipH="1" flipV="1">
+                <a:off x="6369886" y="4586108"/>
+                <a:ext cx="533875" cy="891187"/>
+              </a:xfrm>
+              <a:prstGeom prst="straightConnector1">
+                <a:avLst/>
+              </a:prstGeom>
+              <a:ln w="25400">
+                <a:solidFill>
+                  <a:schemeClr val="tx1"/>
+                </a:solidFill>
+                <a:tailEnd type="triangle"/>
+              </a:ln>
+            </p:spPr>
+            <p:style>
+              <a:lnRef idx="1">
+                <a:schemeClr val="accent1"/>
+              </a:lnRef>
+              <a:fillRef idx="0">
+                <a:schemeClr val="accent1"/>
+              </a:fillRef>
+              <a:effectRef idx="0">
+                <a:schemeClr val="accent1"/>
+              </a:effectRef>
+              <a:fontRef idx="minor">
+                <a:schemeClr val="tx1"/>
+              </a:fontRef>
+            </p:style>
+          </p:cxnSp>
+          <p:pic>
+            <p:nvPicPr>
+              <p:cNvPr id="196" name="Grafik 195">
+                <a:extLst>
+                  <a:ext uri="{FF2B5EF4-FFF2-40B4-BE49-F238E27FC236}">
+                    <a16:creationId xmlns:a16="http://schemas.microsoft.com/office/drawing/2014/main" id="{BB73518F-E2B0-410E-867F-94CF13E1F6AB}"/>
+                  </a:ext>
+                </a:extLst>
+              </p:cNvPr>
+              <p:cNvPicPr>
+                <a:picLocks noChangeAspect="1"/>
+              </p:cNvPicPr>
+              <p:nvPr>
+                <p:custDataLst>
+                  <p:tags r:id="rId9"/>
+                </p:custDataLst>
+              </p:nvPr>
+            </p:nvPicPr>
+            <p:blipFill>
+              <a:blip r:embed="rId18">
+                <a:extLst>
+                  <a:ext uri="{28A0092B-C50C-407E-A947-70E740481C1C}">
+                    <a14:useLocalDpi xmlns:a14="http://schemas.microsoft.com/office/drawing/2010/main" val="0"/>
+                  </a:ext>
+                </a:extLst>
+              </a:blip>
+              <a:stretch>
+                <a:fillRect/>
+              </a:stretch>
+            </p:blipFill>
+            <p:spPr>
+              <a:xfrm>
+                <a:off x="7059206" y="1528415"/>
+                <a:ext cx="330986" cy="256771"/>
+              </a:xfrm>
+              <a:prstGeom prst="rect">
+                <a:avLst/>
+              </a:prstGeom>
+            </p:spPr>
+          </p:pic>
+          <p:pic>
+            <p:nvPicPr>
+              <p:cNvPr id="197" name="Grafik 196">
+                <a:extLst>
+                  <a:ext uri="{FF2B5EF4-FFF2-40B4-BE49-F238E27FC236}">
+                    <a16:creationId xmlns:a16="http://schemas.microsoft.com/office/drawing/2014/main" id="{E80B4F40-B12B-480E-8623-A92B86C4BC04}"/>
+                  </a:ext>
+                </a:extLst>
+              </p:cNvPr>
+              <p:cNvPicPr>
+                <a:picLocks noChangeAspect="1"/>
+              </p:cNvPicPr>
+              <p:nvPr>
+                <p:custDataLst>
+                  <p:tags r:id="rId10"/>
+                </p:custDataLst>
+              </p:nvPr>
+            </p:nvPicPr>
+            <p:blipFill>
+              <a:blip r:embed="rId19">
+                <a:extLst>
+                  <a:ext uri="{28A0092B-C50C-407E-A947-70E740481C1C}">
+                    <a14:useLocalDpi xmlns:a14="http://schemas.microsoft.com/office/drawing/2010/main" val="0"/>
+                  </a:ext>
+                </a:extLst>
+              </a:blip>
+              <a:stretch>
+                <a:fillRect/>
+              </a:stretch>
+            </p:blipFill>
+            <p:spPr>
+              <a:xfrm>
+                <a:off x="6903164" y="5460189"/>
+                <a:ext cx="306277" cy="311739"/>
+              </a:xfrm>
+              <a:prstGeom prst="rect">
+                <a:avLst/>
+              </a:prstGeom>
+            </p:spPr>
+          </p:pic>
+        </p:grpSp>
+        <p:grpSp>
+          <p:nvGrpSpPr>
+            <p:cNvPr id="24" name="Gruppieren 23">
+              <a:extLst>
+                <a:ext uri="{FF2B5EF4-FFF2-40B4-BE49-F238E27FC236}">
+                  <a16:creationId xmlns:a16="http://schemas.microsoft.com/office/drawing/2014/main" id="{9D2C5B3F-A6B9-48CE-96E0-9A45AE5B6F2A}"/>
+                </a:ext>
+              </a:extLst>
+            </p:cNvPr>
+            <p:cNvGrpSpPr/>
+            <p:nvPr/>
+          </p:nvGrpSpPr>
+          <p:grpSpPr>
+            <a:xfrm>
+              <a:off x="1712778" y="3766512"/>
+              <a:ext cx="1086562" cy="789059"/>
+              <a:chOff x="1683677" y="2886166"/>
+              <a:chExt cx="1086562" cy="789059"/>
+            </a:xfrm>
+          </p:grpSpPr>
+          <p:cxnSp>
+            <p:nvCxnSpPr>
+              <p:cNvPr id="37" name="Gerade Verbindung mit Pfeil 36">
+                <a:extLst>
+                  <a:ext uri="{FF2B5EF4-FFF2-40B4-BE49-F238E27FC236}">
+                    <a16:creationId xmlns:a16="http://schemas.microsoft.com/office/drawing/2014/main" id="{0CD91C7E-55EA-4AB0-B39D-2A839A48BB43}"/>
+                  </a:ext>
+                </a:extLst>
+              </p:cNvPr>
+              <p:cNvCxnSpPr>
+                <a:cxnSpLocks/>
+              </p:cNvCxnSpPr>
+              <p:nvPr/>
+            </p:nvCxnSpPr>
+            <p:spPr>
+              <a:xfrm flipH="1" flipV="1">
+                <a:off x="1895814" y="3509808"/>
+                <a:ext cx="411741" cy="165417"/>
+              </a:xfrm>
+              <a:prstGeom prst="straightConnector1">
+                <a:avLst/>
+              </a:prstGeom>
+              <a:ln w="25400">
+                <a:solidFill>
+                  <a:schemeClr val="tx1"/>
+                </a:solidFill>
+                <a:tailEnd type="triangle"/>
+              </a:ln>
+            </p:spPr>
+            <p:style>
+              <a:lnRef idx="1">
+                <a:schemeClr val="accent1"/>
+              </a:lnRef>
+              <a:fillRef idx="0">
+                <a:schemeClr val="accent1"/>
+              </a:fillRef>
+              <a:effectRef idx="0">
+                <a:schemeClr val="accent1"/>
+              </a:effectRef>
+              <a:fontRef idx="minor">
+                <a:schemeClr val="tx1"/>
+              </a:fontRef>
+            </p:style>
+          </p:cxnSp>
+          <p:cxnSp>
+            <p:nvCxnSpPr>
+              <p:cNvPr id="38" name="Gerade Verbindung mit Pfeil 37">
+                <a:extLst>
+                  <a:ext uri="{FF2B5EF4-FFF2-40B4-BE49-F238E27FC236}">
+                    <a16:creationId xmlns:a16="http://schemas.microsoft.com/office/drawing/2014/main" id="{6F50EEC5-1FD2-4E50-BAB9-7D22614CD851}"/>
+                  </a:ext>
+                </a:extLst>
+              </p:cNvPr>
+              <p:cNvCxnSpPr>
+                <a:cxnSpLocks/>
+              </p:cNvCxnSpPr>
+              <p:nvPr/>
+            </p:nvCxnSpPr>
+            <p:spPr>
+              <a:xfrm flipV="1">
+                <a:off x="2298098" y="3171440"/>
+                <a:ext cx="9455" cy="501697"/>
+              </a:xfrm>
+              <a:prstGeom prst="straightConnector1">
+                <a:avLst/>
+              </a:prstGeom>
+              <a:ln w="25400">
+                <a:solidFill>
+                  <a:schemeClr val="tx1"/>
+                </a:solidFill>
+                <a:tailEnd type="triangle"/>
+              </a:ln>
+            </p:spPr>
+            <p:style>
+              <a:lnRef idx="1">
+                <a:schemeClr val="accent1"/>
+              </a:lnRef>
+              <a:fillRef idx="0">
+                <a:schemeClr val="accent1"/>
+              </a:fillRef>
+              <a:effectRef idx="0">
+                <a:schemeClr val="accent1"/>
+              </a:effectRef>
+              <a:fontRef idx="minor">
+                <a:schemeClr val="tx1"/>
+              </a:fontRef>
+            </p:style>
+          </p:cxnSp>
+          <p:cxnSp>
+            <p:nvCxnSpPr>
+              <p:cNvPr id="40" name="Gerade Verbindung mit Pfeil 39">
+                <a:extLst>
+                  <a:ext uri="{FF2B5EF4-FFF2-40B4-BE49-F238E27FC236}">
+                    <a16:creationId xmlns:a16="http://schemas.microsoft.com/office/drawing/2014/main" id="{7B5971D7-BAFB-4C2E-89CE-2E0151110924}"/>
+                  </a:ext>
+                </a:extLst>
+              </p:cNvPr>
+              <p:cNvCxnSpPr>
+                <a:cxnSpLocks/>
+              </p:cNvCxnSpPr>
+              <p:nvPr/>
+            </p:nvCxnSpPr>
+            <p:spPr>
+              <a:xfrm flipV="1">
+                <a:off x="2298098" y="3509808"/>
+                <a:ext cx="472141" cy="163330"/>
+              </a:xfrm>
+              <a:prstGeom prst="straightConnector1">
+                <a:avLst/>
+              </a:prstGeom>
+              <a:ln w="25400">
+                <a:solidFill>
+                  <a:schemeClr val="tx1"/>
+                </a:solidFill>
+                <a:tailEnd type="triangle"/>
+              </a:ln>
+            </p:spPr>
+            <p:style>
+              <a:lnRef idx="1">
+                <a:schemeClr val="accent1"/>
+              </a:lnRef>
+              <a:fillRef idx="0">
+                <a:schemeClr val="accent1"/>
+              </a:fillRef>
+              <a:effectRef idx="0">
+                <a:schemeClr val="accent1"/>
+              </a:effectRef>
+              <a:fontRef idx="minor">
+                <a:schemeClr val="tx1"/>
+              </a:fontRef>
+            </p:style>
+          </p:cxnSp>
+          <p:pic>
+            <p:nvPicPr>
+              <p:cNvPr id="41" name="Grafik 40">
+                <a:extLst>
+                  <a:ext uri="{FF2B5EF4-FFF2-40B4-BE49-F238E27FC236}">
+                    <a16:creationId xmlns:a16="http://schemas.microsoft.com/office/drawing/2014/main" id="{2A8908B3-3248-4FBF-A029-8681CE78DBB0}"/>
+                  </a:ext>
+                </a:extLst>
+              </p:cNvPr>
+              <p:cNvPicPr>
+                <a:picLocks noChangeAspect="1"/>
+              </p:cNvPicPr>
+              <p:nvPr>
+                <p:custDataLst>
+                  <p:tags r:id="rId1"/>
+                </p:custDataLst>
+              </p:nvPr>
+            </p:nvPicPr>
+            <p:blipFill>
+              <a:blip r:embed="rId20">
+                <a:extLst>
+                  <a:ext uri="{28A0092B-C50C-407E-A947-70E740481C1C}">
+                    <a14:useLocalDpi xmlns:a14="http://schemas.microsoft.com/office/drawing/2010/main" val="0"/>
+                  </a:ext>
+                </a:extLst>
+              </a:blip>
+              <a:stretch>
+                <a:fillRect/>
+              </a:stretch>
+            </p:blipFill>
+            <p:spPr>
+              <a:xfrm>
+                <a:off x="1683677" y="3359106"/>
+                <a:ext cx="150448" cy="120055"/>
+              </a:xfrm>
+              <a:prstGeom prst="rect">
+                <a:avLst/>
+              </a:prstGeom>
+            </p:spPr>
+          </p:pic>
+          <p:pic>
+            <p:nvPicPr>
+              <p:cNvPr id="42" name="Grafik 41">
+                <a:extLst>
+                  <a:ext uri="{FF2B5EF4-FFF2-40B4-BE49-F238E27FC236}">
+                    <a16:creationId xmlns:a16="http://schemas.microsoft.com/office/drawing/2014/main" id="{31216ED0-35BD-43EE-9688-54F836D11CF6}"/>
+                  </a:ext>
+                </a:extLst>
+              </p:cNvPr>
+              <p:cNvPicPr>
+                <a:picLocks noChangeAspect="1"/>
+              </p:cNvPicPr>
+              <p:nvPr>
+                <p:custDataLst>
+                  <p:tags r:id="rId2"/>
+                </p:custDataLst>
+              </p:nvPr>
+            </p:nvPicPr>
+            <p:blipFill>
+              <a:blip r:embed="rId21">
+                <a:extLst>
+                  <a:ext uri="{28A0092B-C50C-407E-A947-70E740481C1C}">
+                    <a14:useLocalDpi xmlns:a14="http://schemas.microsoft.com/office/drawing/2010/main" val="0"/>
+                  </a:ext>
+                </a:extLst>
+              </a:blip>
+              <a:stretch>
+                <a:fillRect/>
+              </a:stretch>
+            </p:blipFill>
+            <p:spPr>
+              <a:xfrm>
+                <a:off x="2235121" y="2886166"/>
+                <a:ext cx="144864" cy="166279"/>
+              </a:xfrm>
+              <a:prstGeom prst="rect">
+                <a:avLst/>
+              </a:prstGeom>
+            </p:spPr>
+          </p:pic>
+          <p:pic>
+            <p:nvPicPr>
+              <p:cNvPr id="43" name="Grafik 42">
+                <a:extLst>
+                  <a:ext uri="{FF2B5EF4-FFF2-40B4-BE49-F238E27FC236}">
+                    <a16:creationId xmlns:a16="http://schemas.microsoft.com/office/drawing/2014/main" id="{0368EF09-43E2-44DA-8851-384D710F0D1F}"/>
+                  </a:ext>
+                </a:extLst>
+              </p:cNvPr>
+              <p:cNvPicPr>
+                <a:picLocks noChangeAspect="1"/>
+              </p:cNvPicPr>
+              <p:nvPr>
+                <p:custDataLst>
+                  <p:tags r:id="rId3"/>
+                </p:custDataLst>
+              </p:nvPr>
+            </p:nvPicPr>
+            <p:blipFill>
+              <a:blip r:embed="rId22">
+                <a:extLst>
+                  <a:ext uri="{28A0092B-C50C-407E-A947-70E740481C1C}">
+                    <a14:useLocalDpi xmlns:a14="http://schemas.microsoft.com/office/drawing/2010/main" val="0"/>
+                  </a:ext>
+                </a:extLst>
+              </a:blip>
+              <a:stretch>
+                <a:fillRect/>
+              </a:stretch>
+            </p:blipFill>
+            <p:spPr>
+              <a:xfrm>
+                <a:off x="2623274" y="3323699"/>
+                <a:ext cx="132360" cy="117677"/>
+              </a:xfrm>
+              <a:prstGeom prst="rect">
+                <a:avLst/>
+              </a:prstGeom>
+            </p:spPr>
+          </p:pic>
+        </p:grpSp>
+      </p:grpSp>
     </p:spTree>
     <p:extLst>
       <p:ext uri="{BB962C8B-B14F-4D97-AF65-F5344CB8AC3E}">
@@ -6239,7 +7679,7 @@
             <a:lstStyle/>
             <a:p>
               <a:pPr algn="ctr"/>
-              <a:endParaRPr lang="en-GB">
+              <a:endParaRPr lang="en-GB" dirty="0">
                 <a:solidFill>
                   <a:schemeClr val="tx1"/>
                 </a:solidFill>
@@ -6297,7 +7737,7 @@
             <a:lstStyle/>
             <a:p>
               <a:pPr algn="ctr"/>
-              <a:endParaRPr lang="en-GB">
+              <a:endParaRPr lang="en-GB" dirty="0">
                 <a:solidFill>
                   <a:schemeClr val="tx1"/>
                 </a:solidFill>
@@ -6443,7 +7883,7 @@
             <a:lstStyle/>
             <a:p>
               <a:pPr algn="ctr"/>
-              <a:endParaRPr lang="en-GB">
+              <a:endParaRPr lang="en-GB" dirty="0">
                 <a:solidFill>
                   <a:schemeClr val="tx1"/>
                 </a:solidFill>
@@ -6663,7 +8103,7 @@
             <a:lstStyle/>
             <a:p>
               <a:pPr algn="ctr"/>
-              <a:endParaRPr lang="en-GB"/>
+              <a:endParaRPr lang="en-GB" dirty="0"/>
             </a:p>
           </p:txBody>
         </p:sp>
@@ -6735,7 +8175,7 @@
               <a:lstStyle/>
               <a:p>
                 <a:pPr algn="ctr"/>
-                <a:endParaRPr lang="en-GB"/>
+                <a:endParaRPr lang="en-GB" dirty="0"/>
               </a:p>
             </p:txBody>
           </p:sp>
@@ -6787,7 +8227,7 @@
               <a:lstStyle/>
               <a:p>
                 <a:pPr algn="ctr"/>
-                <a:endParaRPr lang="en-GB"/>
+                <a:endParaRPr lang="en-GB" dirty="0"/>
               </a:p>
             </p:txBody>
           </p:sp>
@@ -6839,7 +8279,7 @@
               <a:lstStyle/>
               <a:p>
                 <a:pPr algn="ctr"/>
-                <a:endParaRPr lang="en-GB"/>
+                <a:endParaRPr lang="en-GB" dirty="0"/>
               </a:p>
             </p:txBody>
           </p:sp>
@@ -6892,7 +8332,7 @@
             <a:lstStyle/>
             <a:p>
               <a:pPr algn="ctr"/>
-              <a:endParaRPr lang="en-GB"/>
+              <a:endParaRPr lang="en-GB" dirty="0"/>
             </a:p>
           </p:txBody>
         </p:sp>
@@ -6944,7 +8384,7 @@
             <a:lstStyle/>
             <a:p>
               <a:pPr algn="ctr"/>
-              <a:endParaRPr lang="en-GB"/>
+              <a:endParaRPr lang="en-GB" dirty="0"/>
             </a:p>
           </p:txBody>
         </p:sp>
@@ -7016,7 +8456,7 @@
               <a:lstStyle/>
               <a:p>
                 <a:pPr algn="ctr"/>
-                <a:endParaRPr lang="en-GB"/>
+                <a:endParaRPr lang="en-GB" dirty="0"/>
               </a:p>
             </p:txBody>
           </p:sp>
@@ -7068,7 +8508,7 @@
               <a:lstStyle/>
               <a:p>
                 <a:pPr algn="ctr"/>
-                <a:endParaRPr lang="en-GB"/>
+                <a:endParaRPr lang="en-GB" dirty="0"/>
               </a:p>
             </p:txBody>
           </p:sp>
@@ -7121,7 +8561,7 @@
             <a:lstStyle/>
             <a:p>
               <a:pPr algn="ctr"/>
-              <a:endParaRPr lang="en-GB"/>
+              <a:endParaRPr lang="en-GB" dirty="0"/>
             </a:p>
           </p:txBody>
         </p:sp>
@@ -7173,7 +8613,7 @@
             <a:lstStyle/>
             <a:p>
               <a:pPr algn="ctr"/>
-              <a:endParaRPr lang="en-GB"/>
+              <a:endParaRPr lang="en-GB" dirty="0"/>
             </a:p>
           </p:txBody>
         </p:sp>
@@ -7405,7 +8845,7 @@
               <a:lstStyle/>
               <a:p>
                 <a:pPr algn="ctr"/>
-                <a:endParaRPr lang="en-GB"/>
+                <a:endParaRPr lang="en-GB" dirty="0"/>
               </a:p>
             </p:txBody>
           </p:sp>
@@ -7457,7 +8897,7 @@
               <a:lstStyle/>
               <a:p>
                 <a:pPr algn="ctr"/>
-                <a:endParaRPr lang="en-GB"/>
+                <a:endParaRPr lang="en-GB" dirty="0"/>
               </a:p>
             </p:txBody>
           </p:sp>
@@ -7509,7 +8949,7 @@
               <a:lstStyle/>
               <a:p>
                 <a:pPr algn="ctr"/>
-                <a:endParaRPr lang="en-GB"/>
+                <a:endParaRPr lang="en-GB" dirty="0"/>
               </a:p>
             </p:txBody>
           </p:sp>
@@ -7582,7 +9022,7 @@
               <a:lstStyle/>
               <a:p>
                 <a:pPr algn="ctr"/>
-                <a:endParaRPr lang="en-GB"/>
+                <a:endParaRPr lang="en-GB" dirty="0"/>
               </a:p>
             </p:txBody>
           </p:sp>
@@ -7634,7 +9074,7 @@
               <a:lstStyle/>
               <a:p>
                 <a:pPr algn="ctr"/>
-                <a:endParaRPr lang="en-GB"/>
+                <a:endParaRPr lang="en-GB" dirty="0"/>
               </a:p>
             </p:txBody>
           </p:sp>
@@ -21016,6 +22456,44 @@
 </p:tagLst>
 </file>
 
+<file path=ppt/tags/tag88.xml><?xml version="1.0" encoding="utf-8"?>
+<p:tagLst xmlns:a="http://schemas.openxmlformats.org/drawingml/2006/main" xmlns:r="http://schemas.openxmlformats.org/officeDocument/2006/relationships" xmlns:p="http://schemas.openxmlformats.org/presentationml/2006/main">
+  <p:tag name="OUTPUTDPI" val="1200"/>
+  <p:tag name="ORIGINALHEIGHT" val="56,99291"/>
+  <p:tag name="ORIGINALWIDTH" val="71,2411"/>
+  <p:tag name="LATEXADDIN" val="\documentclass{article}&#10;\usepackage{amsmath}&#10;\usepackage{bm}&#10;\usepackage{color}&#10;\pagestyle{empty}&#10;\begin{document}&#10;\begin{equation}&#10;\bm{x}&#10;\nonumber&#10;\end{equation}&#10;\end{document}"/>
+  <p:tag name="IGUANATEXSIZE" val="20"/>
+  <p:tag name="IGUANATEXCURSOR" val="135"/>
+  <p:tag name="TRANSPARENCY" val="Wahr"/>
+  <p:tag name="FILENAME" val=""/>
+  <p:tag name="LATEXENGINEID" val="0"/>
+  <p:tag name="TEMPFOLDER" val="c:\temp\"/>
+  <p:tag name="LATEXFORMHEIGHT" val="312"/>
+  <p:tag name="LATEXFORMWIDTH" val="384"/>
+  <p:tag name="LATEXFORMWRAP" val="Wahr"/>
+  <p:tag name="BITMAPVECTOR" val="0"/>
+</p:tagLst>
+</file>
+
+<file path=ppt/tags/tag89.xml><?xml version="1.0" encoding="utf-8"?>
+<p:tagLst xmlns:a="http://schemas.openxmlformats.org/drawingml/2006/main" xmlns:r="http://schemas.openxmlformats.org/officeDocument/2006/relationships" xmlns:p="http://schemas.openxmlformats.org/presentationml/2006/main">
+  <p:tag name="OUTPUTDPI" val="1200"/>
+  <p:tag name="ORIGINALHEIGHT" val="80,98985"/>
+  <p:tag name="ORIGINALWIDTH" val="68,99134"/>
+  <p:tag name="LATEXADDIN" val="\documentclass{article}&#10;\usepackage{amsmath}&#10;\usepackage{bm}&#10;\usepackage{color}&#10;\pagestyle{empty}&#10;\begin{document}&#10;\begin{equation}&#10;\bm{y}&#10;\nonumber&#10;\end{equation}&#10;\end{document}"/>
+  <p:tag name="IGUANATEXSIZE" val="20"/>
+  <p:tag name="IGUANATEXCURSOR" val="59"/>
+  <p:tag name="TRANSPARENCY" val="Wahr"/>
+  <p:tag name="FILENAME" val=""/>
+  <p:tag name="LATEXENGINEID" val="0"/>
+  <p:tag name="TEMPFOLDER" val="c:\temp\"/>
+  <p:tag name="LATEXFORMHEIGHT" val="312"/>
+  <p:tag name="LATEXFORMWIDTH" val="384"/>
+  <p:tag name="LATEXFORMWRAP" val="Wahr"/>
+  <p:tag name="BITMAPVECTOR" val="0"/>
+</p:tagLst>
+</file>
+
 <file path=ppt/tags/tag9.xml><?xml version="1.0" encoding="utf-8"?>
 <p:tagLst xmlns:a="http://schemas.openxmlformats.org/drawingml/2006/main" xmlns:r="http://schemas.openxmlformats.org/officeDocument/2006/relationships" xmlns:p="http://schemas.openxmlformats.org/presentationml/2006/main">
   <p:tag name="OUTPUTDPI" val="1200"/>
@@ -21024,6 +22502,158 @@
   <p:tag name="LATEXADDIN" val="\documentclass{article}&#10;\usepackage{amsmath}&#10;\usepackage{color}&#10;\pagestyle{empty}&#10;\begin{document}&#10;\color{white}&#10;\begin{equation}&#10;y&#10;\nonumber&#10;\end{equation}&#10;\end{document}"/>
   <p:tag name="IGUANATEXSIZE" val="20"/>
   <p:tag name="IGUANATEXCURSOR" val="131"/>
+  <p:tag name="TRANSPARENCY" val="Wahr"/>
+  <p:tag name="FILENAME" val=""/>
+  <p:tag name="LATEXENGINEID" val="0"/>
+  <p:tag name="TEMPFOLDER" val="c:\temp\"/>
+  <p:tag name="LATEXFORMHEIGHT" val="312"/>
+  <p:tag name="LATEXFORMWIDTH" val="384"/>
+  <p:tag name="LATEXFORMWRAP" val="Wahr"/>
+  <p:tag name="BITMAPVECTOR" val="0"/>
+</p:tagLst>
+</file>
+
+<file path=ppt/tags/tag90.xml><?xml version="1.0" encoding="utf-8"?>
+<p:tagLst xmlns:a="http://schemas.openxmlformats.org/drawingml/2006/main" xmlns:r="http://schemas.openxmlformats.org/officeDocument/2006/relationships" xmlns:p="http://schemas.openxmlformats.org/presentationml/2006/main">
+  <p:tag name="OUTPUTDPI" val="1200"/>
+  <p:tag name="ORIGINALHEIGHT" val="56,99291"/>
+  <p:tag name="ORIGINALWIDTH" val="62,99213"/>
+  <p:tag name="LATEXADDIN" val="\documentclass{article}&#10;\usepackage{amsmath}&#10;\usepackage{bm}&#10;\usepackage{color}&#10;\pagestyle{empty}&#10;\begin{document}&#10;\begin{equation}&#10;\bm{z}&#10;\nonumber&#10;\end{equation}&#10;\end{document}"/>
+  <p:tag name="IGUANATEXSIZE" val="20"/>
+  <p:tag name="IGUANATEXCURSOR" val="138"/>
+  <p:tag name="TRANSPARENCY" val="Wahr"/>
+  <p:tag name="FILENAME" val=""/>
+  <p:tag name="LATEXENGINEID" val="0"/>
+  <p:tag name="TEMPFOLDER" val="c:\temp\"/>
+  <p:tag name="LATEXFORMHEIGHT" val="312"/>
+  <p:tag name="LATEXFORMWIDTH" val="384"/>
+  <p:tag name="LATEXFORMWRAP" val="Wahr"/>
+  <p:tag name="BITMAPVECTOR" val="0"/>
+</p:tagLst>
+</file>
+
+<file path=ppt/tags/tag91.xml><?xml version="1.0" encoding="utf-8"?>
+<p:tagLst xmlns:a="http://schemas.openxmlformats.org/drawingml/2006/main" xmlns:r="http://schemas.openxmlformats.org/officeDocument/2006/relationships" xmlns:p="http://schemas.openxmlformats.org/presentationml/2006/main">
+  <p:tag name="OUTPUTDPI" val="1200"/>
+  <p:tag name="ORIGINALHEIGHT" val="110,2362"/>
+  <p:tag name="ORIGINALWIDTH" val="740,1575"/>
+  <p:tag name="LATEXADDIN" val="\documentclass{article}&#10;\usepackage{amsmath}&#10;\usepackage{color}&#10;\pagestyle{empty}&#10;\begin{document}&#10;%\color{white}&#10;Epipolar Line&#10;\end{document}"/>
+  <p:tag name="IGUANATEXSIZE" val="20"/>
+  <p:tag name="IGUANATEXCURSOR" val="127"/>
+  <p:tag name="TRANSPARENCY" val="Wahr"/>
+  <p:tag name="FILENAME" val=""/>
+  <p:tag name="LATEXENGINEID" val="0"/>
+  <p:tag name="TEMPFOLDER" val="c:\temp\"/>
+  <p:tag name="LATEXFORMHEIGHT" val="312"/>
+  <p:tag name="LATEXFORMWIDTH" val="384"/>
+  <p:tag name="LATEXFORMWRAP" val="Wahr"/>
+  <p:tag name="BITMAPVECTOR" val="0"/>
+</p:tagLst>
+</file>
+
+<file path=ppt/tags/tag92.xml><?xml version="1.0" encoding="utf-8"?>
+<p:tagLst xmlns:a="http://schemas.openxmlformats.org/drawingml/2006/main" xmlns:r="http://schemas.openxmlformats.org/officeDocument/2006/relationships" xmlns:p="http://schemas.openxmlformats.org/presentationml/2006/main">
+  <p:tag name="OUTPUTDPI" val="1200"/>
+  <p:tag name="ORIGINALHEIGHT" val="90,73866"/>
+  <p:tag name="ORIGINALWIDTH" val="678,6652"/>
+  <p:tag name="LATEXADDIN" val="\documentclass{article}&#10;\usepackage{amsmath}&#10;\usepackage{color}&#10;\pagestyle{empty}&#10;\begin{document}&#10;%\color{white}&#10;Left Camera&#10;\end{document}"/>
+  <p:tag name="IGUANATEXSIZE" val="20"/>
+  <p:tag name="IGUANATEXCURSOR" val="125"/>
+  <p:tag name="TRANSPARENCY" val="Wahr"/>
+  <p:tag name="FILENAME" val=""/>
+  <p:tag name="LATEXENGINEID" val="0"/>
+  <p:tag name="TEMPFOLDER" val="c:\temp\"/>
+  <p:tag name="LATEXFORMHEIGHT" val="312"/>
+  <p:tag name="LATEXFORMWIDTH" val="384"/>
+  <p:tag name="LATEXFORMWRAP" val="Wahr"/>
+  <p:tag name="BITMAPVECTOR" val="0"/>
+</p:tagLst>
+</file>
+
+<file path=ppt/tags/tag93.xml><?xml version="1.0" encoding="utf-8"?>
+<p:tagLst xmlns:a="http://schemas.openxmlformats.org/drawingml/2006/main" xmlns:r="http://schemas.openxmlformats.org/officeDocument/2006/relationships" xmlns:p="http://schemas.openxmlformats.org/presentationml/2006/main">
+  <p:tag name="OUTPUTDPI" val="1200"/>
+  <p:tag name="ORIGINALHEIGHT" val="113,2358"/>
+  <p:tag name="ORIGINALWIDTH" val="761,9047"/>
+  <p:tag name="LATEXADDIN" val="\documentclass{article}&#10;\usepackage{amsmath}&#10;\usepackage{color}&#10;\pagestyle{empty}&#10;\begin{document}&#10;%\color{white}&#10;Right Camera&#10;\end{document}"/>
+  <p:tag name="IGUANATEXSIZE" val="20"/>
+  <p:tag name="IGUANATEXCURSOR" val="120"/>
+  <p:tag name="TRANSPARENCY" val="Wahr"/>
+  <p:tag name="FILENAME" val=""/>
+  <p:tag name="LATEXENGINEID" val="0"/>
+  <p:tag name="TEMPFOLDER" val="c:\temp\"/>
+  <p:tag name="LATEXFORMHEIGHT" val="312"/>
+  <p:tag name="LATEXFORMWIDTH" val="384"/>
+  <p:tag name="LATEXFORMWRAP" val="Wahr"/>
+  <p:tag name="BITMAPVECTOR" val="0"/>
+</p:tagLst>
+</file>
+
+<file path=ppt/tags/tag94.xml><?xml version="1.0" encoding="utf-8"?>
+<p:tagLst xmlns:a="http://schemas.openxmlformats.org/drawingml/2006/main" xmlns:r="http://schemas.openxmlformats.org/officeDocument/2006/relationships" xmlns:p="http://schemas.openxmlformats.org/presentationml/2006/main">
+  <p:tag name="OUTPUTDPI" val="1200"/>
+  <p:tag name="ORIGINALHEIGHT" val="113,2358"/>
+  <p:tag name="ORIGINALWIDTH" val="357,7053"/>
+  <p:tag name="LATEXADDIN" val="\documentclass{article}&#10;\usepackage{amsmath}&#10;\usepackage{color}&#10;\pagestyle{empty}&#10;\begin{document}&#10;%\color{white}&#10;Object&#10;\end{document}"/>
+  <p:tag name="IGUANATEXSIZE" val="20"/>
+  <p:tag name="IGUANATEXCURSOR" val="120"/>
+  <p:tag name="TRANSPARENCY" val="Wahr"/>
+  <p:tag name="FILENAME" val=""/>
+  <p:tag name="LATEXENGINEID" val="0"/>
+  <p:tag name="TEMPFOLDER" val="c:\temp\"/>
+  <p:tag name="LATEXFORMHEIGHT" val="312"/>
+  <p:tag name="LATEXFORMWIDTH" val="384"/>
+  <p:tag name="LATEXFORMWRAP" val="Wahr"/>
+  <p:tag name="BITMAPVECTOR" val="0"/>
+</p:tagLst>
+</file>
+
+<file path=ppt/tags/tag95.xml><?xml version="1.0" encoding="utf-8"?>
+<p:tagLst xmlns:a="http://schemas.openxmlformats.org/drawingml/2006/main" xmlns:r="http://schemas.openxmlformats.org/officeDocument/2006/relationships" xmlns:p="http://schemas.openxmlformats.org/presentationml/2006/main">
+  <p:tag name="OUTPUTDPI" val="1200"/>
+  <p:tag name="ORIGINALHEIGHT" val="110,9861"/>
+  <p:tag name="ORIGINALWIDTH" val="321,7098"/>
+  <p:tag name="LATEXADDIN" val="\documentclass{article}&#10;\usepackage{amsmath}&#10;\usepackage{color}&#10;\pagestyle{empty}&#10;\begin{document}&#10;%\color{white}&#10;Image&#10;\end{document}"/>
+  <p:tag name="IGUANATEXSIZE" val="20"/>
+  <p:tag name="IGUANATEXCURSOR" val="119"/>
+  <p:tag name="TRANSPARENCY" val="Wahr"/>
+  <p:tag name="FILENAME" val=""/>
+  <p:tag name="LATEXENGINEID" val="0"/>
+  <p:tag name="TEMPFOLDER" val="c:\temp\"/>
+  <p:tag name="LATEXFORMHEIGHT" val="312"/>
+  <p:tag name="LATEXFORMWIDTH" val="384"/>
+  <p:tag name="LATEXFORMWRAP" val="Wahr"/>
+  <p:tag name="BITMAPVECTOR" val="0"/>
+</p:tagLst>
+</file>
+
+<file path=ppt/tags/tag96.xml><?xml version="1.0" encoding="utf-8"?>
+<p:tagLst xmlns:a="http://schemas.openxmlformats.org/drawingml/2006/main" xmlns:r="http://schemas.openxmlformats.org/officeDocument/2006/relationships" xmlns:p="http://schemas.openxmlformats.org/presentationml/2006/main">
+  <p:tag name="OUTPUTDPI" val="1200"/>
+  <p:tag name="ORIGINALHEIGHT" val="85,48929"/>
+  <p:tag name="ORIGINALWIDTH" val="114,7357"/>
+  <p:tag name="LATEXADDIN" val="\documentclass{article}&#10;\usepackage{amsmath}&#10;\usepackage{bm}&#10;\usepackage{color}&#10;\pagestyle{empty}&#10;\begin{document}&#10;%\color{white}&#10;\begin{equation}&#10;\bm{X}&#10;\nonumber&#10;\end{equation}&#10;\end{document}"/>
+  <p:tag name="IGUANATEXSIZE" val="20"/>
+  <p:tag name="IGUANATEXCURSOR" val="163"/>
+  <p:tag name="TRANSPARENCY" val="Wahr"/>
+  <p:tag name="FILENAME" val=""/>
+  <p:tag name="LATEXENGINEID" val="0"/>
+  <p:tag name="TEMPFOLDER" val="c:\temp\"/>
+  <p:tag name="LATEXFORMHEIGHT" val="312"/>
+  <p:tag name="LATEXFORMWIDTH" val="384"/>
+  <p:tag name="LATEXFORMWRAP" val="Wahr"/>
+  <p:tag name="BITMAPVECTOR" val="0"/>
+</p:tagLst>
+</file>
+
+<file path=ppt/tags/tag97.xml><?xml version="1.0" encoding="utf-8"?>
+<p:tagLst xmlns:a="http://schemas.openxmlformats.org/drawingml/2006/main" xmlns:r="http://schemas.openxmlformats.org/officeDocument/2006/relationships" xmlns:p="http://schemas.openxmlformats.org/presentationml/2006/main">
+  <p:tag name="OUTPUTDPI" val="1200"/>
+  <p:tag name="ORIGINALHEIGHT" val="101,2373"/>
+  <p:tag name="ORIGINALWIDTH" val="103,4871"/>
+  <p:tag name="LATEXADDIN" val="\documentclass{article}&#10;\usepackage{amsmath}&#10;\usepackage{bm}&#10;\usepackage{color}&#10;\pagestyle{empty}&#10;\begin{document}&#10;%\color{white}&#10;\begin{equation}&#10;\bm{x}'&#10;\nonumber&#10;\end{equation}&#10;\end{document}"/>
+  <p:tag name="IGUANATEXSIZE" val="20"/>
+  <p:tag name="IGUANATEXCURSOR" val="154"/>
   <p:tag name="TRANSPARENCY" val="Wahr"/>
   <p:tag name="FILENAME" val=""/>
   <p:tag name="LATEXENGINEID" val="0"/>

</xml_diff>